<commit_message>
Feat #22 U1 and U2 basic features done
</commit_message>
<xml_diff>
--- a/RawImages/imagePPT.pptx
+++ b/RawImages/imagePPT.pptx
@@ -104,6 +104,11 @@
       </a:defRPr>
     </a:lvl9pPr>
   </p:defaultTextStyle>
+  <p:extLst>
+    <p:ext uri="{EFAFB233-063F-42B5-8137-9DF3F51BA10A}">
+      <p15:sldGuideLst xmlns:p15="http://schemas.microsoft.com/office/powerpoint/2012/main"/>
+    </p:ext>
+  </p:extLst>
 </p:presentation>
 </file>
 
@@ -254,7 +259,7 @@
           <a:p>
             <a:fld id="{F3E3B444-461C-43DF-9895-EF8F91AA3F26}" type="datetimeFigureOut">
               <a:rPr lang="ko-KR" altLang="en-US" smtClean="0"/>
-              <a:t>2025-05-16</a:t>
+              <a:t>2025-05-18</a:t>
             </a:fld>
             <a:endParaRPr lang="ko-KR" altLang="en-US"/>
           </a:p>
@@ -452,7 +457,7 @@
           <a:p>
             <a:fld id="{F3E3B444-461C-43DF-9895-EF8F91AA3F26}" type="datetimeFigureOut">
               <a:rPr lang="ko-KR" altLang="en-US" smtClean="0"/>
-              <a:t>2025-05-16</a:t>
+              <a:t>2025-05-18</a:t>
             </a:fld>
             <a:endParaRPr lang="ko-KR" altLang="en-US"/>
           </a:p>
@@ -660,7 +665,7 @@
           <a:p>
             <a:fld id="{F3E3B444-461C-43DF-9895-EF8F91AA3F26}" type="datetimeFigureOut">
               <a:rPr lang="ko-KR" altLang="en-US" smtClean="0"/>
-              <a:t>2025-05-16</a:t>
+              <a:t>2025-05-18</a:t>
             </a:fld>
             <a:endParaRPr lang="ko-KR" altLang="en-US"/>
           </a:p>
@@ -858,7 +863,7 @@
           <a:p>
             <a:fld id="{F3E3B444-461C-43DF-9895-EF8F91AA3F26}" type="datetimeFigureOut">
               <a:rPr lang="ko-KR" altLang="en-US" smtClean="0"/>
-              <a:t>2025-05-16</a:t>
+              <a:t>2025-05-18</a:t>
             </a:fld>
             <a:endParaRPr lang="ko-KR" altLang="en-US"/>
           </a:p>
@@ -1133,7 +1138,7 @@
           <a:p>
             <a:fld id="{F3E3B444-461C-43DF-9895-EF8F91AA3F26}" type="datetimeFigureOut">
               <a:rPr lang="ko-KR" altLang="en-US" smtClean="0"/>
-              <a:t>2025-05-16</a:t>
+              <a:t>2025-05-18</a:t>
             </a:fld>
             <a:endParaRPr lang="ko-KR" altLang="en-US"/>
           </a:p>
@@ -1398,7 +1403,7 @@
           <a:p>
             <a:fld id="{F3E3B444-461C-43DF-9895-EF8F91AA3F26}" type="datetimeFigureOut">
               <a:rPr lang="ko-KR" altLang="en-US" smtClean="0"/>
-              <a:t>2025-05-16</a:t>
+              <a:t>2025-05-18</a:t>
             </a:fld>
             <a:endParaRPr lang="ko-KR" altLang="en-US"/>
           </a:p>
@@ -1810,7 +1815,7 @@
           <a:p>
             <a:fld id="{F3E3B444-461C-43DF-9895-EF8F91AA3F26}" type="datetimeFigureOut">
               <a:rPr lang="ko-KR" altLang="en-US" smtClean="0"/>
-              <a:t>2025-05-16</a:t>
+              <a:t>2025-05-18</a:t>
             </a:fld>
             <a:endParaRPr lang="ko-KR" altLang="en-US"/>
           </a:p>
@@ -1951,7 +1956,7 @@
           <a:p>
             <a:fld id="{F3E3B444-461C-43DF-9895-EF8F91AA3F26}" type="datetimeFigureOut">
               <a:rPr lang="ko-KR" altLang="en-US" smtClean="0"/>
-              <a:t>2025-05-16</a:t>
+              <a:t>2025-05-18</a:t>
             </a:fld>
             <a:endParaRPr lang="ko-KR" altLang="en-US"/>
           </a:p>
@@ -2064,7 +2069,7 @@
           <a:p>
             <a:fld id="{F3E3B444-461C-43DF-9895-EF8F91AA3F26}" type="datetimeFigureOut">
               <a:rPr lang="ko-KR" altLang="en-US" smtClean="0"/>
-              <a:t>2025-05-16</a:t>
+              <a:t>2025-05-18</a:t>
             </a:fld>
             <a:endParaRPr lang="ko-KR" altLang="en-US"/>
           </a:p>
@@ -2375,7 +2380,7 @@
           <a:p>
             <a:fld id="{F3E3B444-461C-43DF-9895-EF8F91AA3F26}" type="datetimeFigureOut">
               <a:rPr lang="ko-KR" altLang="en-US" smtClean="0"/>
-              <a:t>2025-05-16</a:t>
+              <a:t>2025-05-18</a:t>
             </a:fld>
             <a:endParaRPr lang="ko-KR" altLang="en-US"/>
           </a:p>
@@ -2663,7 +2668,7 @@
           <a:p>
             <a:fld id="{F3E3B444-461C-43DF-9895-EF8F91AA3F26}" type="datetimeFigureOut">
               <a:rPr lang="ko-KR" altLang="en-US" smtClean="0"/>
-              <a:t>2025-05-16</a:t>
+              <a:t>2025-05-18</a:t>
             </a:fld>
             <a:endParaRPr lang="ko-KR" altLang="en-US"/>
           </a:p>
@@ -2904,7 +2909,7 @@
           <a:p>
             <a:fld id="{F3E3B444-461C-43DF-9895-EF8F91AA3F26}" type="datetimeFigureOut">
               <a:rPr lang="ko-KR" altLang="en-US" smtClean="0"/>
-              <a:t>2025-05-16</a:t>
+              <a:t>2025-05-18</a:t>
             </a:fld>
             <a:endParaRPr lang="ko-KR" altLang="en-US"/>
           </a:p>
@@ -3534,6 +3539,79 @@
           </a:fontRef>
         </p:style>
       </p:cxnSp>
+      <p:sp>
+        <p:nvSpPr>
+          <p:cNvPr id="2" name="막힌 원호 1">
+            <a:extLst>
+              <a:ext uri="{FF2B5EF4-FFF2-40B4-BE49-F238E27FC236}">
+                <a16:creationId xmlns:a16="http://schemas.microsoft.com/office/drawing/2014/main" id="{B8D28C53-BDD9-1AE6-54C5-A5F3E83073EA}"/>
+              </a:ext>
+            </a:extLst>
+          </p:cNvPr>
+          <p:cNvSpPr/>
+          <p:nvPr/>
+        </p:nvSpPr>
+        <p:spPr>
+          <a:xfrm rot="20090500">
+            <a:off x="4925027" y="1852598"/>
+            <a:ext cx="1800000" cy="1800000"/>
+          </a:xfrm>
+          <a:prstGeom prst="blockArc">
+            <a:avLst>
+              <a:gd name="adj1" fmla="val 10904526"/>
+              <a:gd name="adj2" fmla="val 158579"/>
+              <a:gd name="adj3" fmla="val 14035"/>
+            </a:avLst>
+          </a:prstGeom>
+          <a:solidFill>
+            <a:srgbClr val="FF0000">
+              <a:alpha val="10000"/>
+            </a:srgbClr>
+          </a:solidFill>
+          <a:ln>
+            <a:solidFill>
+              <a:srgbClr val="FF0000">
+                <a:alpha val="50000"/>
+              </a:srgbClr>
+            </a:solidFill>
+          </a:ln>
+          <a:effectLst>
+            <a:glow rad="38100">
+              <a:srgbClr val="FF0000">
+                <a:alpha val="20000"/>
+              </a:srgbClr>
+            </a:glow>
+          </a:effectLst>
+        </p:spPr>
+        <p:style>
+          <a:lnRef idx="2">
+            <a:schemeClr val="accent1">
+              <a:shade val="15000"/>
+            </a:schemeClr>
+          </a:lnRef>
+          <a:fillRef idx="1">
+            <a:schemeClr val="accent1"/>
+          </a:fillRef>
+          <a:effectRef idx="0">
+            <a:schemeClr val="accent1"/>
+          </a:effectRef>
+          <a:fontRef idx="minor">
+            <a:schemeClr val="lt1"/>
+          </a:fontRef>
+        </p:style>
+        <p:txBody>
+          <a:bodyPr rtlCol="0" anchor="ctr"/>
+          <a:lstStyle/>
+          <a:p>
+            <a:pPr algn="ctr"/>
+            <a:endParaRPr lang="ko-KR" altLang="en-US">
+              <a:solidFill>
+                <a:schemeClr val="tx1"/>
+              </a:solidFill>
+            </a:endParaRPr>
+          </a:p>
+        </p:txBody>
+      </p:sp>
     </p:spTree>
     <p:extLst>
       <p:ext uri="{BB962C8B-B14F-4D97-AF65-F5344CB8AC3E}">

</xml_diff>

<commit_message>
Feat #29 Bug Fixed
</commit_message>
<xml_diff>
--- a/RawImages/imagePPT.pptx
+++ b/RawImages/imagePPT.pptx
@@ -3340,7 +3340,7 @@
         </p:nvSpPr>
         <p:spPr>
           <a:xfrm rot="1247646">
-            <a:off x="7326023" y="2325038"/>
+            <a:off x="6676432" y="2638854"/>
             <a:ext cx="1800000" cy="1800000"/>
           </a:xfrm>
           <a:prstGeom prst="blockArc">
@@ -3388,81 +3388,6 @@
           </a:p>
         </p:txBody>
       </p:sp>
-      <p:sp>
-        <p:nvSpPr>
-          <p:cNvPr id="8" name="막힌 원호 7">
-            <a:extLst>
-              <a:ext uri="{FF2B5EF4-FFF2-40B4-BE49-F238E27FC236}">
-                <a16:creationId xmlns:a16="http://schemas.microsoft.com/office/drawing/2014/main" id="{306BC659-B8FE-6DE7-9768-927B3D9C56F6}"/>
-              </a:ext>
-            </a:extLst>
-          </p:cNvPr>
-          <p:cNvSpPr/>
-          <p:nvPr/>
-        </p:nvSpPr>
-        <p:spPr>
-          <a:xfrm rot="1247646">
-            <a:off x="6749760" y="2325039"/>
-            <a:ext cx="1800000" cy="1800000"/>
-          </a:xfrm>
-          <a:prstGeom prst="blockArc">
-            <a:avLst>
-              <a:gd name="adj1" fmla="val 8145941"/>
-              <a:gd name="adj2" fmla="val 158579"/>
-              <a:gd name="adj3" fmla="val 14035"/>
-            </a:avLst>
-          </a:prstGeom>
-          <a:gradFill flip="none" rotWithShape="1">
-            <a:gsLst>
-              <a:gs pos="0">
-                <a:srgbClr val="FF0000"/>
-              </a:gs>
-              <a:gs pos="42000">
-                <a:srgbClr val="FFC000"/>
-              </a:gs>
-              <a:gs pos="76000">
-                <a:srgbClr val="92D050"/>
-              </a:gs>
-              <a:gs pos="100000">
-                <a:srgbClr val="00B050"/>
-              </a:gs>
-            </a:gsLst>
-            <a:lin ang="10200000" scaled="0"/>
-            <a:tileRect/>
-          </a:gradFill>
-          <a:ln>
-            <a:noFill/>
-          </a:ln>
-        </p:spPr>
-        <p:style>
-          <a:lnRef idx="2">
-            <a:schemeClr val="accent1">
-              <a:shade val="15000"/>
-            </a:schemeClr>
-          </a:lnRef>
-          <a:fillRef idx="1">
-            <a:schemeClr val="accent1"/>
-          </a:fillRef>
-          <a:effectRef idx="0">
-            <a:schemeClr val="accent1"/>
-          </a:effectRef>
-          <a:fontRef idx="minor">
-            <a:schemeClr val="lt1"/>
-          </a:fontRef>
-        </p:style>
-        <p:txBody>
-          <a:bodyPr rtlCol="0" anchor="ctr"/>
-          <a:lstStyle/>
-          <a:p>
-            <a:pPr algn="ctr"/>
-            <a:endParaRPr lang="ko-KR" altLang="en-US">
-              <a:solidFill>
-                <a:schemeClr val="tx1"/>
-              </a:solidFill>
-            </a:endParaRPr>
-          </a:p>
-        </p:txBody>
-      </p:sp>
       <p:cxnSp>
         <p:nvCxnSpPr>
           <p:cNvPr id="10" name="직선 연결선 9">
@@ -3553,7 +3478,7 @@
         </p:nvSpPr>
         <p:spPr>
           <a:xfrm rot="20090500">
-            <a:off x="4925027" y="1852598"/>
+            <a:off x="5945001" y="1586183"/>
             <a:ext cx="1800000" cy="1800000"/>
           </a:xfrm>
           <a:prstGeom prst="blockArc">
@@ -3582,6 +3507,677 @@
               </a:srgbClr>
             </a:glow>
           </a:effectLst>
+        </p:spPr>
+        <p:style>
+          <a:lnRef idx="2">
+            <a:schemeClr val="accent1">
+              <a:shade val="15000"/>
+            </a:schemeClr>
+          </a:lnRef>
+          <a:fillRef idx="1">
+            <a:schemeClr val="accent1"/>
+          </a:fillRef>
+          <a:effectRef idx="0">
+            <a:schemeClr val="accent1"/>
+          </a:effectRef>
+          <a:fontRef idx="minor">
+            <a:schemeClr val="lt1"/>
+          </a:fontRef>
+        </p:style>
+        <p:txBody>
+          <a:bodyPr rtlCol="0" anchor="ctr"/>
+          <a:lstStyle/>
+          <a:p>
+            <a:pPr algn="ctr"/>
+            <a:endParaRPr lang="ko-KR" altLang="en-US" dirty="0">
+              <a:solidFill>
+                <a:schemeClr val="tx1"/>
+              </a:solidFill>
+            </a:endParaRPr>
+          </a:p>
+        </p:txBody>
+      </p:sp>
+      <p:grpSp>
+        <p:nvGrpSpPr>
+          <p:cNvPr id="4" name="그룹 3">
+            <a:extLst>
+              <a:ext uri="{FF2B5EF4-FFF2-40B4-BE49-F238E27FC236}">
+                <a16:creationId xmlns:a16="http://schemas.microsoft.com/office/drawing/2014/main" id="{D51887C1-DDD2-D154-62C5-BED8D5455A5B}"/>
+              </a:ext>
+            </a:extLst>
+          </p:cNvPr>
+          <p:cNvGrpSpPr/>
+          <p:nvPr/>
+        </p:nvGrpSpPr>
+        <p:grpSpPr>
+          <a:xfrm>
+            <a:off x="1968267" y="2693718"/>
+            <a:ext cx="1800000" cy="1800827"/>
+            <a:chOff x="1969219" y="2683780"/>
+            <a:chExt cx="1801905" cy="1800827"/>
+          </a:xfrm>
+        </p:grpSpPr>
+        <p:sp>
+          <p:nvSpPr>
+            <p:cNvPr id="8" name="막힌 원호 7">
+              <a:extLst>
+                <a:ext uri="{FF2B5EF4-FFF2-40B4-BE49-F238E27FC236}">
+                  <a16:creationId xmlns:a16="http://schemas.microsoft.com/office/drawing/2014/main" id="{306BC659-B8FE-6DE7-9768-927B3D9C56F6}"/>
+                </a:ext>
+              </a:extLst>
+            </p:cNvPr>
+            <p:cNvSpPr/>
+            <p:nvPr/>
+          </p:nvSpPr>
+          <p:spPr>
+            <a:xfrm rot="1247646">
+              <a:off x="1969219" y="2683780"/>
+              <a:ext cx="1800000" cy="1800000"/>
+            </a:xfrm>
+            <a:prstGeom prst="blockArc">
+              <a:avLst>
+                <a:gd name="adj1" fmla="val 8145941"/>
+                <a:gd name="adj2" fmla="val 158579"/>
+                <a:gd name="adj3" fmla="val 14035"/>
+              </a:avLst>
+            </a:prstGeom>
+            <a:gradFill flip="none" rotWithShape="1">
+              <a:gsLst>
+                <a:gs pos="0">
+                  <a:srgbClr val="FF0000"/>
+                </a:gs>
+                <a:gs pos="42000">
+                  <a:srgbClr val="FFC000"/>
+                </a:gs>
+                <a:gs pos="76000">
+                  <a:srgbClr val="92D050"/>
+                </a:gs>
+                <a:gs pos="100000">
+                  <a:srgbClr val="00B050"/>
+                </a:gs>
+              </a:gsLst>
+              <a:lin ang="10200000" scaled="0"/>
+              <a:tileRect/>
+            </a:gradFill>
+            <a:ln>
+              <a:noFill/>
+            </a:ln>
+          </p:spPr>
+          <p:style>
+            <a:lnRef idx="2">
+              <a:schemeClr val="accent1">
+                <a:shade val="15000"/>
+              </a:schemeClr>
+            </a:lnRef>
+            <a:fillRef idx="1">
+              <a:schemeClr val="accent1"/>
+            </a:fillRef>
+            <a:effectRef idx="0">
+              <a:schemeClr val="accent1"/>
+            </a:effectRef>
+            <a:fontRef idx="minor">
+              <a:schemeClr val="lt1"/>
+            </a:fontRef>
+          </p:style>
+          <p:txBody>
+            <a:bodyPr rtlCol="0" anchor="ctr"/>
+            <a:lstStyle/>
+            <a:p>
+              <a:pPr algn="ctr"/>
+              <a:endParaRPr lang="ko-KR" altLang="en-US">
+                <a:solidFill>
+                  <a:schemeClr val="tx1"/>
+                </a:solidFill>
+              </a:endParaRPr>
+            </a:p>
+          </p:txBody>
+        </p:sp>
+        <p:sp>
+          <p:nvSpPr>
+            <p:cNvPr id="3" name="막힌 원호 2">
+              <a:extLst>
+                <a:ext uri="{FF2B5EF4-FFF2-40B4-BE49-F238E27FC236}">
+                  <a16:creationId xmlns:a16="http://schemas.microsoft.com/office/drawing/2014/main" id="{3D140C06-9901-D102-9F78-C15CB39150C8}"/>
+                </a:ext>
+              </a:extLst>
+            </p:cNvPr>
+            <p:cNvSpPr/>
+            <p:nvPr/>
+          </p:nvSpPr>
+          <p:spPr>
+            <a:xfrm rot="9240000">
+              <a:off x="1971124" y="2684607"/>
+              <a:ext cx="1800000" cy="1800000"/>
+            </a:xfrm>
+            <a:prstGeom prst="blockArc">
+              <a:avLst>
+                <a:gd name="adj1" fmla="val 13772017"/>
+                <a:gd name="adj2" fmla="val 158579"/>
+                <a:gd name="adj3" fmla="val 14035"/>
+              </a:avLst>
+            </a:prstGeom>
+            <a:solidFill>
+              <a:schemeClr val="tx1">
+                <a:alpha val="0"/>
+              </a:schemeClr>
+            </a:solidFill>
+            <a:ln>
+              <a:noFill/>
+            </a:ln>
+          </p:spPr>
+          <p:style>
+            <a:lnRef idx="2">
+              <a:schemeClr val="accent1">
+                <a:shade val="15000"/>
+              </a:schemeClr>
+            </a:lnRef>
+            <a:fillRef idx="1">
+              <a:schemeClr val="accent1"/>
+            </a:fillRef>
+            <a:effectRef idx="0">
+              <a:schemeClr val="accent1"/>
+            </a:effectRef>
+            <a:fontRef idx="minor">
+              <a:schemeClr val="lt1"/>
+            </a:fontRef>
+          </p:style>
+          <p:txBody>
+            <a:bodyPr rtlCol="0" anchor="ctr"/>
+            <a:lstStyle/>
+            <a:p>
+              <a:pPr algn="ctr"/>
+              <a:endParaRPr lang="ko-KR" altLang="en-US">
+                <a:solidFill>
+                  <a:schemeClr val="tx1"/>
+                </a:solidFill>
+              </a:endParaRPr>
+            </a:p>
+          </p:txBody>
+        </p:sp>
+      </p:grpSp>
+      <p:grpSp>
+        <p:nvGrpSpPr>
+          <p:cNvPr id="6" name="그룹 5">
+            <a:extLst>
+              <a:ext uri="{FF2B5EF4-FFF2-40B4-BE49-F238E27FC236}">
+                <a16:creationId xmlns:a16="http://schemas.microsoft.com/office/drawing/2014/main" id="{7495A107-1395-307B-017B-F56383A18B1E}"/>
+              </a:ext>
+            </a:extLst>
+          </p:cNvPr>
+          <p:cNvGrpSpPr/>
+          <p:nvPr/>
+        </p:nvGrpSpPr>
+        <p:grpSpPr>
+          <a:xfrm>
+            <a:off x="4350694" y="3291164"/>
+            <a:ext cx="1800000" cy="1800827"/>
+            <a:chOff x="1969219" y="2683780"/>
+            <a:chExt cx="1801905" cy="1800827"/>
+          </a:xfrm>
+        </p:grpSpPr>
+        <p:sp>
+          <p:nvSpPr>
+            <p:cNvPr id="7" name="막힌 원호 6">
+              <a:extLst>
+                <a:ext uri="{FF2B5EF4-FFF2-40B4-BE49-F238E27FC236}">
+                  <a16:creationId xmlns:a16="http://schemas.microsoft.com/office/drawing/2014/main" id="{83BC9897-8C57-FDA4-FFB1-32F96C674F21}"/>
+                </a:ext>
+              </a:extLst>
+            </p:cNvPr>
+            <p:cNvSpPr/>
+            <p:nvPr/>
+          </p:nvSpPr>
+          <p:spPr>
+            <a:xfrm rot="1247646">
+              <a:off x="1969219" y="2683780"/>
+              <a:ext cx="1800000" cy="1800000"/>
+            </a:xfrm>
+            <a:prstGeom prst="blockArc">
+              <a:avLst>
+                <a:gd name="adj1" fmla="val 8145941"/>
+                <a:gd name="adj2" fmla="val 158579"/>
+                <a:gd name="adj3" fmla="val 14035"/>
+              </a:avLst>
+            </a:prstGeom>
+            <a:solidFill>
+              <a:srgbClr val="FF0000">
+                <a:alpha val="10000"/>
+              </a:srgbClr>
+            </a:solidFill>
+            <a:ln>
+              <a:solidFill>
+                <a:srgbClr val="FF0000">
+                  <a:alpha val="50000"/>
+                </a:srgbClr>
+              </a:solidFill>
+            </a:ln>
+            <a:effectLst>
+              <a:glow rad="38100">
+                <a:srgbClr val="FF0000">
+                  <a:alpha val="20000"/>
+                </a:srgbClr>
+              </a:glow>
+            </a:effectLst>
+          </p:spPr>
+          <p:style>
+            <a:lnRef idx="2">
+              <a:schemeClr val="accent1">
+                <a:shade val="15000"/>
+              </a:schemeClr>
+            </a:lnRef>
+            <a:fillRef idx="1">
+              <a:schemeClr val="accent1"/>
+            </a:fillRef>
+            <a:effectRef idx="0">
+              <a:schemeClr val="accent1"/>
+            </a:effectRef>
+            <a:fontRef idx="minor">
+              <a:schemeClr val="lt1"/>
+            </a:fontRef>
+          </p:style>
+          <p:txBody>
+            <a:bodyPr rtlCol="0" anchor="ctr"/>
+            <a:lstStyle/>
+            <a:p>
+              <a:pPr algn="ctr"/>
+              <a:endParaRPr lang="ko-KR" altLang="en-US">
+                <a:solidFill>
+                  <a:schemeClr val="tx1"/>
+                </a:solidFill>
+              </a:endParaRPr>
+            </a:p>
+          </p:txBody>
+        </p:sp>
+        <p:sp>
+          <p:nvSpPr>
+            <p:cNvPr id="9" name="막힌 원호 8">
+              <a:extLst>
+                <a:ext uri="{FF2B5EF4-FFF2-40B4-BE49-F238E27FC236}">
+                  <a16:creationId xmlns:a16="http://schemas.microsoft.com/office/drawing/2014/main" id="{56BCFBAD-B308-B4AC-2E8B-E62BC65F3B7F}"/>
+                </a:ext>
+              </a:extLst>
+            </p:cNvPr>
+            <p:cNvSpPr/>
+            <p:nvPr/>
+          </p:nvSpPr>
+          <p:spPr>
+            <a:xfrm rot="9240000">
+              <a:off x="1971124" y="2684607"/>
+              <a:ext cx="1800000" cy="1800000"/>
+            </a:xfrm>
+            <a:prstGeom prst="blockArc">
+              <a:avLst>
+                <a:gd name="adj1" fmla="val 13772017"/>
+                <a:gd name="adj2" fmla="val 158579"/>
+                <a:gd name="adj3" fmla="val 14035"/>
+              </a:avLst>
+            </a:prstGeom>
+            <a:solidFill>
+              <a:srgbClr val="FFFFFF">
+                <a:alpha val="0"/>
+              </a:srgbClr>
+            </a:solidFill>
+            <a:ln>
+              <a:noFill/>
+            </a:ln>
+          </p:spPr>
+          <p:style>
+            <a:lnRef idx="2">
+              <a:schemeClr val="accent1">
+                <a:shade val="15000"/>
+              </a:schemeClr>
+            </a:lnRef>
+            <a:fillRef idx="1">
+              <a:schemeClr val="accent1"/>
+            </a:fillRef>
+            <a:effectRef idx="0">
+              <a:schemeClr val="accent1"/>
+            </a:effectRef>
+            <a:fontRef idx="minor">
+              <a:schemeClr val="lt1"/>
+            </a:fontRef>
+          </p:style>
+          <p:txBody>
+            <a:bodyPr rtlCol="0" anchor="ctr"/>
+            <a:lstStyle/>
+            <a:p>
+              <a:pPr algn="ctr"/>
+              <a:endParaRPr lang="ko-KR" altLang="en-US">
+                <a:solidFill>
+                  <a:schemeClr val="tx1"/>
+                </a:solidFill>
+              </a:endParaRPr>
+            </a:p>
+          </p:txBody>
+        </p:sp>
+      </p:grpSp>
+      <p:grpSp>
+        <p:nvGrpSpPr>
+          <p:cNvPr id="15" name="그룹 14">
+            <a:extLst>
+              <a:ext uri="{FF2B5EF4-FFF2-40B4-BE49-F238E27FC236}">
+                <a16:creationId xmlns:a16="http://schemas.microsoft.com/office/drawing/2014/main" id="{AEB6A27A-DEE1-5479-39D8-A1EAB9540438}"/>
+              </a:ext>
+            </a:extLst>
+          </p:cNvPr>
+          <p:cNvGrpSpPr/>
+          <p:nvPr/>
+        </p:nvGrpSpPr>
+        <p:grpSpPr>
+          <a:xfrm>
+            <a:off x="2940295" y="3736171"/>
+            <a:ext cx="1800001" cy="1800000"/>
+            <a:chOff x="1812762" y="2531379"/>
+            <a:chExt cx="1800001" cy="1800000"/>
+          </a:xfrm>
+        </p:grpSpPr>
+        <p:sp>
+          <p:nvSpPr>
+            <p:cNvPr id="16" name="막힌 원호 15">
+              <a:extLst>
+                <a:ext uri="{FF2B5EF4-FFF2-40B4-BE49-F238E27FC236}">
+                  <a16:creationId xmlns:a16="http://schemas.microsoft.com/office/drawing/2014/main" id="{A8FE214D-6626-C632-A036-8FE31D4FB4CF}"/>
+                </a:ext>
+              </a:extLst>
+            </p:cNvPr>
+            <p:cNvSpPr/>
+            <p:nvPr/>
+          </p:nvSpPr>
+          <p:spPr>
+            <a:xfrm rot="1247646">
+              <a:off x="1812763" y="2531379"/>
+              <a:ext cx="1800000" cy="1800000"/>
+            </a:xfrm>
+            <a:prstGeom prst="blockArc">
+              <a:avLst>
+                <a:gd name="adj1" fmla="val 8145941"/>
+                <a:gd name="adj2" fmla="val 18758978"/>
+                <a:gd name="adj3" fmla="val 14057"/>
+              </a:avLst>
+            </a:prstGeom>
+            <a:solidFill>
+              <a:srgbClr val="FF0000">
+                <a:alpha val="10000"/>
+              </a:srgbClr>
+            </a:solidFill>
+            <a:ln>
+              <a:solidFill>
+                <a:srgbClr val="FF0000">
+                  <a:alpha val="50000"/>
+                </a:srgbClr>
+              </a:solidFill>
+            </a:ln>
+            <a:effectLst>
+              <a:glow rad="38100">
+                <a:srgbClr val="FF0000">
+                  <a:alpha val="20000"/>
+                </a:srgbClr>
+              </a:glow>
+            </a:effectLst>
+          </p:spPr>
+          <p:style>
+            <a:lnRef idx="2">
+              <a:schemeClr val="accent1">
+                <a:shade val="15000"/>
+              </a:schemeClr>
+            </a:lnRef>
+            <a:fillRef idx="1">
+              <a:schemeClr val="accent1"/>
+            </a:fillRef>
+            <a:effectRef idx="0">
+              <a:schemeClr val="accent1"/>
+            </a:effectRef>
+            <a:fontRef idx="minor">
+              <a:schemeClr val="lt1"/>
+            </a:fontRef>
+          </p:style>
+          <p:txBody>
+            <a:bodyPr rtlCol="0" anchor="ctr"/>
+            <a:lstStyle/>
+            <a:p>
+              <a:pPr algn="ctr"/>
+              <a:endParaRPr lang="ko-KR" altLang="en-US" dirty="0">
+                <a:solidFill>
+                  <a:schemeClr val="tx1"/>
+                </a:solidFill>
+              </a:endParaRPr>
+            </a:p>
+          </p:txBody>
+        </p:sp>
+        <p:sp>
+          <p:nvSpPr>
+            <p:cNvPr id="17" name="막힌 원호 16">
+              <a:extLst>
+                <a:ext uri="{FF2B5EF4-FFF2-40B4-BE49-F238E27FC236}">
+                  <a16:creationId xmlns:a16="http://schemas.microsoft.com/office/drawing/2014/main" id="{92C1B69A-8EFC-804E-8FCB-5770C8F25C33}"/>
+                </a:ext>
+              </a:extLst>
+            </p:cNvPr>
+            <p:cNvSpPr/>
+            <p:nvPr/>
+          </p:nvSpPr>
+          <p:spPr>
+            <a:xfrm rot="9240000">
+              <a:off x="1812762" y="2531379"/>
+              <a:ext cx="1800000" cy="1800000"/>
+            </a:xfrm>
+            <a:prstGeom prst="blockArc">
+              <a:avLst>
+                <a:gd name="adj1" fmla="val 10774825"/>
+                <a:gd name="adj2" fmla="val 158579"/>
+                <a:gd name="adj3" fmla="val 14035"/>
+              </a:avLst>
+            </a:prstGeom>
+            <a:solidFill>
+              <a:schemeClr val="tx1">
+                <a:alpha val="0"/>
+              </a:schemeClr>
+            </a:solidFill>
+            <a:ln>
+              <a:noFill/>
+            </a:ln>
+          </p:spPr>
+          <p:style>
+            <a:lnRef idx="2">
+              <a:schemeClr val="accent1">
+                <a:shade val="15000"/>
+              </a:schemeClr>
+            </a:lnRef>
+            <a:fillRef idx="1">
+              <a:schemeClr val="accent1"/>
+            </a:fillRef>
+            <a:effectRef idx="0">
+              <a:schemeClr val="accent1"/>
+            </a:effectRef>
+            <a:fontRef idx="minor">
+              <a:schemeClr val="lt1"/>
+            </a:fontRef>
+          </p:style>
+          <p:txBody>
+            <a:bodyPr rtlCol="0" anchor="ctr"/>
+            <a:lstStyle/>
+            <a:p>
+              <a:pPr algn="ctr"/>
+              <a:endParaRPr lang="ko-KR" altLang="en-US">
+                <a:solidFill>
+                  <a:schemeClr val="tx1"/>
+                </a:solidFill>
+              </a:endParaRPr>
+            </a:p>
+          </p:txBody>
+        </p:sp>
+      </p:grpSp>
+      <p:pic>
+        <p:nvPicPr>
+          <p:cNvPr id="19" name="그림 18" descr="블랙, 그래픽, 원이(가) 표시된 사진&#10;&#10;AI가 생성한 콘텐츠는 부정확할 수 있습니다.">
+            <a:extLst>
+              <a:ext uri="{FF2B5EF4-FFF2-40B4-BE49-F238E27FC236}">
+                <a16:creationId xmlns:a16="http://schemas.microsoft.com/office/drawing/2014/main" id="{BC5D50E0-0508-8D7D-39AB-F5A386842946}"/>
+              </a:ext>
+            </a:extLst>
+          </p:cNvPr>
+          <p:cNvPicPr>
+            <a:picLocks noChangeAspect="1"/>
+          </p:cNvPicPr>
+          <p:nvPr/>
+        </p:nvPicPr>
+        <p:blipFill>
+          <a:blip r:embed="rId2">
+            <a:extLst>
+              <a:ext uri="{28A0092B-C50C-407E-A947-70E740481C1C}">
+                <a14:useLocalDpi xmlns:a14="http://schemas.microsoft.com/office/drawing/2010/main" val="0"/>
+              </a:ext>
+            </a:extLst>
+          </a:blip>
+          <a:stretch>
+            <a:fillRect/>
+          </a:stretch>
+        </p:blipFill>
+        <p:spPr>
+          <a:xfrm>
+            <a:off x="8833537" y="2087019"/>
+            <a:ext cx="1801108" cy="1803879"/>
+          </a:xfrm>
+          <a:prstGeom prst="rect">
+            <a:avLst/>
+          </a:prstGeom>
+        </p:spPr>
+      </p:pic>
+      <p:cxnSp>
+        <p:nvCxnSpPr>
+          <p:cNvPr id="21" name="직선 연결선 20">
+            <a:extLst>
+              <a:ext uri="{FF2B5EF4-FFF2-40B4-BE49-F238E27FC236}">
+                <a16:creationId xmlns:a16="http://schemas.microsoft.com/office/drawing/2014/main" id="{6C9640B7-F7AD-9834-829E-3ABC3FCAF9EC}"/>
+              </a:ext>
+            </a:extLst>
+          </p:cNvPr>
+          <p:cNvCxnSpPr>
+            <a:cxnSpLocks/>
+            <a:stCxn id="19" idx="0"/>
+          </p:cNvCxnSpPr>
+          <p:nvPr/>
+        </p:nvCxnSpPr>
+        <p:spPr>
+          <a:xfrm>
+            <a:off x="9734091" y="2087019"/>
+            <a:ext cx="0" cy="1832201"/>
+          </a:xfrm>
+          <a:prstGeom prst="line">
+            <a:avLst/>
+          </a:prstGeom>
+        </p:spPr>
+        <p:style>
+          <a:lnRef idx="2">
+            <a:schemeClr val="accent1"/>
+          </a:lnRef>
+          <a:fillRef idx="0">
+            <a:schemeClr val="accent1"/>
+          </a:fillRef>
+          <a:effectRef idx="1">
+            <a:schemeClr val="accent1"/>
+          </a:effectRef>
+          <a:fontRef idx="minor">
+            <a:schemeClr val="tx1"/>
+          </a:fontRef>
+        </p:style>
+      </p:cxnSp>
+      <p:cxnSp>
+        <p:nvCxnSpPr>
+          <p:cNvPr id="25" name="직선 연결선 24">
+            <a:extLst>
+              <a:ext uri="{FF2B5EF4-FFF2-40B4-BE49-F238E27FC236}">
+                <a16:creationId xmlns:a16="http://schemas.microsoft.com/office/drawing/2014/main" id="{05756DD7-DEA9-FEC9-F0D8-F8D74FDA26D4}"/>
+              </a:ext>
+            </a:extLst>
+          </p:cNvPr>
+          <p:cNvCxnSpPr>
+            <a:cxnSpLocks/>
+            <a:stCxn id="19" idx="3"/>
+            <a:endCxn id="19" idx="1"/>
+          </p:cNvCxnSpPr>
+          <p:nvPr/>
+        </p:nvCxnSpPr>
+        <p:spPr>
+          <a:xfrm flipH="1">
+            <a:off x="8833537" y="2988959"/>
+            <a:ext cx="1801108" cy="0"/>
+          </a:xfrm>
+          <a:prstGeom prst="line">
+            <a:avLst/>
+          </a:prstGeom>
+        </p:spPr>
+        <p:style>
+          <a:lnRef idx="2">
+            <a:schemeClr val="accent1"/>
+          </a:lnRef>
+          <a:fillRef idx="0">
+            <a:schemeClr val="accent1"/>
+          </a:fillRef>
+          <a:effectRef idx="1">
+            <a:schemeClr val="accent1"/>
+          </a:effectRef>
+          <a:fontRef idx="minor">
+            <a:schemeClr val="tx1"/>
+          </a:fontRef>
+        </p:style>
+      </p:cxnSp>
+      <p:cxnSp>
+        <p:nvCxnSpPr>
+          <p:cNvPr id="29" name="직선 연결선 28">
+            <a:extLst>
+              <a:ext uri="{FF2B5EF4-FFF2-40B4-BE49-F238E27FC236}">
+                <a16:creationId xmlns:a16="http://schemas.microsoft.com/office/drawing/2014/main" id="{967161FB-80C0-ED58-58A4-A909B17B392F}"/>
+              </a:ext>
+            </a:extLst>
+          </p:cNvPr>
+          <p:cNvCxnSpPr/>
+          <p:nvPr/>
+        </p:nvCxnSpPr>
+        <p:spPr>
+          <a:xfrm flipH="1">
+            <a:off x="8572500" y="2988958"/>
+            <a:ext cx="1161591" cy="486327"/>
+          </a:xfrm>
+          <a:prstGeom prst="line">
+            <a:avLst/>
+          </a:prstGeom>
+        </p:spPr>
+        <p:style>
+          <a:lnRef idx="2">
+            <a:schemeClr val="accent1"/>
+          </a:lnRef>
+          <a:fillRef idx="0">
+            <a:schemeClr val="accent1"/>
+          </a:fillRef>
+          <a:effectRef idx="1">
+            <a:schemeClr val="accent1"/>
+          </a:effectRef>
+          <a:fontRef idx="minor">
+            <a:schemeClr val="tx1"/>
+          </a:fontRef>
+        </p:style>
+      </p:cxnSp>
+      <p:sp>
+        <p:nvSpPr>
+          <p:cNvPr id="31" name="원형: 비어 있음 30">
+            <a:extLst>
+              <a:ext uri="{FF2B5EF4-FFF2-40B4-BE49-F238E27FC236}">
+                <a16:creationId xmlns:a16="http://schemas.microsoft.com/office/drawing/2014/main" id="{390DE2E3-D8A1-069D-A5CC-ABA5C3464D21}"/>
+              </a:ext>
+            </a:extLst>
+          </p:cNvPr>
+          <p:cNvSpPr/>
+          <p:nvPr/>
+        </p:nvSpPr>
+        <p:spPr>
+          <a:xfrm>
+            <a:off x="2928394" y="1585731"/>
+            <a:ext cx="1800000" cy="1800000"/>
+          </a:xfrm>
+          <a:prstGeom prst="donut">
+            <a:avLst/>
+          </a:prstGeom>
         </p:spPr>
         <p:style>
           <a:lnRef idx="2">

</xml_diff>

<commit_message>
Feat #29 ppt saved
</commit_message>
<xml_diff>
--- a/RawImages/imagePPT.pptx
+++ b/RawImages/imagePPT.pptx
@@ -4208,6 +4208,164 @@
           </a:p>
         </p:txBody>
       </p:sp>
+      <p:grpSp>
+        <p:nvGrpSpPr>
+          <p:cNvPr id="32" name="그룹 31">
+            <a:extLst>
+              <a:ext uri="{FF2B5EF4-FFF2-40B4-BE49-F238E27FC236}">
+                <a16:creationId xmlns:a16="http://schemas.microsoft.com/office/drawing/2014/main" id="{E817FE71-6D2E-923A-DEC5-D3859B52B3DC}"/>
+              </a:ext>
+            </a:extLst>
+          </p:cNvPr>
+          <p:cNvGrpSpPr/>
+          <p:nvPr/>
+        </p:nvGrpSpPr>
+        <p:grpSpPr>
+          <a:xfrm>
+            <a:off x="8972879" y="4191164"/>
+            <a:ext cx="1800000" cy="1800827"/>
+            <a:chOff x="1969219" y="2683780"/>
+            <a:chExt cx="1801905" cy="1800827"/>
+          </a:xfrm>
+        </p:grpSpPr>
+        <p:sp>
+          <p:nvSpPr>
+            <p:cNvPr id="33" name="막힌 원호 32">
+              <a:extLst>
+                <a:ext uri="{FF2B5EF4-FFF2-40B4-BE49-F238E27FC236}">
+                  <a16:creationId xmlns:a16="http://schemas.microsoft.com/office/drawing/2014/main" id="{73A895DF-6B43-FCC8-E05D-CD779FE44DBA}"/>
+                </a:ext>
+              </a:extLst>
+            </p:cNvPr>
+            <p:cNvSpPr/>
+            <p:nvPr/>
+          </p:nvSpPr>
+          <p:spPr>
+            <a:xfrm rot="1247646">
+              <a:off x="1969219" y="2683780"/>
+              <a:ext cx="1800000" cy="1800000"/>
+            </a:xfrm>
+            <a:prstGeom prst="blockArc">
+              <a:avLst>
+                <a:gd name="adj1" fmla="val 8145941"/>
+                <a:gd name="adj2" fmla="val 158579"/>
+                <a:gd name="adj3" fmla="val 14035"/>
+              </a:avLst>
+            </a:prstGeom>
+            <a:gradFill flip="none" rotWithShape="1">
+              <a:gsLst>
+                <a:gs pos="0">
+                  <a:srgbClr val="FF0000"/>
+                </a:gs>
+                <a:gs pos="42000">
+                  <a:srgbClr val="FFC000"/>
+                </a:gs>
+                <a:gs pos="76000">
+                  <a:srgbClr val="92D050"/>
+                </a:gs>
+                <a:gs pos="100000">
+                  <a:srgbClr val="00B050"/>
+                </a:gs>
+              </a:gsLst>
+              <a:lin ang="10200000" scaled="0"/>
+              <a:tileRect/>
+            </a:gradFill>
+            <a:ln>
+              <a:noFill/>
+            </a:ln>
+          </p:spPr>
+          <p:style>
+            <a:lnRef idx="2">
+              <a:schemeClr val="accent1">
+                <a:shade val="15000"/>
+              </a:schemeClr>
+            </a:lnRef>
+            <a:fillRef idx="1">
+              <a:schemeClr val="accent1"/>
+            </a:fillRef>
+            <a:effectRef idx="0">
+              <a:schemeClr val="accent1"/>
+            </a:effectRef>
+            <a:fontRef idx="minor">
+              <a:schemeClr val="lt1"/>
+            </a:fontRef>
+          </p:style>
+          <p:txBody>
+            <a:bodyPr rtlCol="0" anchor="ctr"/>
+            <a:lstStyle/>
+            <a:p>
+              <a:pPr algn="ctr"/>
+              <a:endParaRPr lang="ko-KR" altLang="en-US">
+                <a:solidFill>
+                  <a:schemeClr val="tx1"/>
+                </a:solidFill>
+              </a:endParaRPr>
+            </a:p>
+          </p:txBody>
+        </p:sp>
+        <p:sp>
+          <p:nvSpPr>
+            <p:cNvPr id="34" name="막힌 원호 33">
+              <a:extLst>
+                <a:ext uri="{FF2B5EF4-FFF2-40B4-BE49-F238E27FC236}">
+                  <a16:creationId xmlns:a16="http://schemas.microsoft.com/office/drawing/2014/main" id="{0EA8B7D6-5CF8-A79D-60C4-BBEEAC0C94CC}"/>
+                </a:ext>
+              </a:extLst>
+            </p:cNvPr>
+            <p:cNvSpPr/>
+            <p:nvPr/>
+          </p:nvSpPr>
+          <p:spPr>
+            <a:xfrm rot="9240000">
+              <a:off x="1971124" y="2684607"/>
+              <a:ext cx="1800000" cy="1800000"/>
+            </a:xfrm>
+            <a:prstGeom prst="blockArc">
+              <a:avLst>
+                <a:gd name="adj1" fmla="val 13772017"/>
+                <a:gd name="adj2" fmla="val 158579"/>
+                <a:gd name="adj3" fmla="val 14035"/>
+              </a:avLst>
+            </a:prstGeom>
+            <a:solidFill>
+              <a:schemeClr val="tx1">
+                <a:alpha val="1000"/>
+              </a:schemeClr>
+            </a:solidFill>
+            <a:ln>
+              <a:noFill/>
+            </a:ln>
+          </p:spPr>
+          <p:style>
+            <a:lnRef idx="2">
+              <a:schemeClr val="accent1">
+                <a:shade val="15000"/>
+              </a:schemeClr>
+            </a:lnRef>
+            <a:fillRef idx="1">
+              <a:schemeClr val="accent1"/>
+            </a:fillRef>
+            <a:effectRef idx="0">
+              <a:schemeClr val="accent1"/>
+            </a:effectRef>
+            <a:fontRef idx="minor">
+              <a:schemeClr val="lt1"/>
+            </a:fontRef>
+          </p:style>
+          <p:txBody>
+            <a:bodyPr rtlCol="0" anchor="ctr"/>
+            <a:lstStyle/>
+            <a:p>
+              <a:pPr algn="ctr"/>
+              <a:endParaRPr lang="ko-KR" altLang="en-US">
+                <a:solidFill>
+                  <a:schemeClr val="tx1"/>
+                </a:solidFill>
+              </a:endParaRPr>
+            </a:p>
+          </p:txBody>
+        </p:sp>
+      </p:grpSp>
     </p:spTree>
     <p:extLst>
       <p:ext uri="{BB962C8B-B14F-4D97-AF65-F5344CB8AC3E}">

</xml_diff>

<commit_message>
Feat #29 Bug fixed in different way from initial Feat29
</commit_message>
<xml_diff>
--- a/RawImages/imagePPT.pptx
+++ b/RawImages/imagePPT.pptx
@@ -3340,7 +3340,7 @@
         </p:nvSpPr>
         <p:spPr>
           <a:xfrm rot="1247646">
-            <a:off x="6676432" y="2638854"/>
+            <a:off x="6381096" y="1135738"/>
             <a:ext cx="1800000" cy="1800000"/>
           </a:xfrm>
           <a:prstGeom prst="blockArc">
@@ -3388,82 +3388,6 @@
           </a:p>
         </p:txBody>
       </p:sp>
-      <p:cxnSp>
-        <p:nvCxnSpPr>
-          <p:cNvPr id="10" name="직선 연결선 9">
-            <a:extLst>
-              <a:ext uri="{FF2B5EF4-FFF2-40B4-BE49-F238E27FC236}">
-                <a16:creationId xmlns:a16="http://schemas.microsoft.com/office/drawing/2014/main" id="{DE6A0002-51C9-01A4-7AD2-B0CBDA21CA33}"/>
-              </a:ext>
-            </a:extLst>
-          </p:cNvPr>
-          <p:cNvCxnSpPr>
-            <a:cxnSpLocks/>
-          </p:cNvCxnSpPr>
-          <p:nvPr/>
-        </p:nvCxnSpPr>
-        <p:spPr>
-          <a:xfrm>
-            <a:off x="6729411" y="3594132"/>
-            <a:ext cx="1797846" cy="0"/>
-          </a:xfrm>
-          <a:prstGeom prst="line">
-            <a:avLst/>
-          </a:prstGeom>
-        </p:spPr>
-        <p:style>
-          <a:lnRef idx="2">
-            <a:schemeClr val="accent1"/>
-          </a:lnRef>
-          <a:fillRef idx="0">
-            <a:schemeClr val="accent1"/>
-          </a:fillRef>
-          <a:effectRef idx="1">
-            <a:schemeClr val="accent1"/>
-          </a:effectRef>
-          <a:fontRef idx="minor">
-            <a:schemeClr val="tx1"/>
-          </a:fontRef>
-        </p:style>
-      </p:cxnSp>
-      <p:cxnSp>
-        <p:nvCxnSpPr>
-          <p:cNvPr id="12" name="직선 연결선 11">
-            <a:extLst>
-              <a:ext uri="{FF2B5EF4-FFF2-40B4-BE49-F238E27FC236}">
-                <a16:creationId xmlns:a16="http://schemas.microsoft.com/office/drawing/2014/main" id="{E4D22432-3E13-FB82-6CF5-20B309FAA586}"/>
-              </a:ext>
-            </a:extLst>
-          </p:cNvPr>
-          <p:cNvCxnSpPr>
-            <a:cxnSpLocks/>
-          </p:cNvCxnSpPr>
-          <p:nvPr/>
-        </p:nvCxnSpPr>
-        <p:spPr>
-          <a:xfrm flipV="1">
-            <a:off x="7622380" y="2314575"/>
-            <a:ext cx="5954" cy="1269205"/>
-          </a:xfrm>
-          <a:prstGeom prst="line">
-            <a:avLst/>
-          </a:prstGeom>
-        </p:spPr>
-        <p:style>
-          <a:lnRef idx="2">
-            <a:schemeClr val="accent1"/>
-          </a:lnRef>
-          <a:fillRef idx="0">
-            <a:schemeClr val="accent1"/>
-          </a:fillRef>
-          <a:effectRef idx="1">
-            <a:schemeClr val="accent1"/>
-          </a:effectRef>
-          <a:fontRef idx="minor">
-            <a:schemeClr val="tx1"/>
-          </a:fontRef>
-        </p:style>
-      </p:cxnSp>
       <p:sp>
         <p:nvSpPr>
           <p:cNvPr id="2" name="막힌 원호 1">
@@ -3478,7 +3402,7 @@
         </p:nvSpPr>
         <p:spPr>
           <a:xfrm rot="20090500">
-            <a:off x="5945001" y="1586183"/>
+            <a:off x="6114020" y="1086958"/>
             <a:ext cx="1800000" cy="1800000"/>
           </a:xfrm>
           <a:prstGeom prst="blockArc">
@@ -3537,12 +3461,87 @@
           </a:p>
         </p:txBody>
       </p:sp>
+      <p:sp>
+        <p:nvSpPr>
+          <p:cNvPr id="8" name="막힌 원호 7">
+            <a:extLst>
+              <a:ext uri="{FF2B5EF4-FFF2-40B4-BE49-F238E27FC236}">
+                <a16:creationId xmlns:a16="http://schemas.microsoft.com/office/drawing/2014/main" id="{306BC659-B8FE-6DE7-9768-927B3D9C56F6}"/>
+              </a:ext>
+            </a:extLst>
+          </p:cNvPr>
+          <p:cNvSpPr/>
+          <p:nvPr/>
+        </p:nvSpPr>
+        <p:spPr>
+          <a:xfrm rot="1247646">
+            <a:off x="3706359" y="262716"/>
+            <a:ext cx="1798097" cy="1800000"/>
+          </a:xfrm>
+          <a:prstGeom prst="blockArc">
+            <a:avLst>
+              <a:gd name="adj1" fmla="val 8145941"/>
+              <a:gd name="adj2" fmla="val 158579"/>
+              <a:gd name="adj3" fmla="val 14035"/>
+            </a:avLst>
+          </a:prstGeom>
+          <a:gradFill flip="none" rotWithShape="1">
+            <a:gsLst>
+              <a:gs pos="0">
+                <a:srgbClr val="FF0000"/>
+              </a:gs>
+              <a:gs pos="42000">
+                <a:srgbClr val="FFC000"/>
+              </a:gs>
+              <a:gs pos="76000">
+                <a:srgbClr val="92D050"/>
+              </a:gs>
+              <a:gs pos="100000">
+                <a:srgbClr val="00B050"/>
+              </a:gs>
+            </a:gsLst>
+            <a:lin ang="10200000" scaled="0"/>
+            <a:tileRect/>
+          </a:gradFill>
+          <a:ln>
+            <a:noFill/>
+          </a:ln>
+        </p:spPr>
+        <p:style>
+          <a:lnRef idx="2">
+            <a:schemeClr val="accent1">
+              <a:shade val="15000"/>
+            </a:schemeClr>
+          </a:lnRef>
+          <a:fillRef idx="1">
+            <a:schemeClr val="accent1"/>
+          </a:fillRef>
+          <a:effectRef idx="0">
+            <a:schemeClr val="accent1"/>
+          </a:effectRef>
+          <a:fontRef idx="minor">
+            <a:schemeClr val="lt1"/>
+          </a:fontRef>
+        </p:style>
+        <p:txBody>
+          <a:bodyPr rtlCol="0" anchor="ctr"/>
+          <a:lstStyle/>
+          <a:p>
+            <a:pPr algn="ctr"/>
+            <a:endParaRPr lang="ko-KR" altLang="en-US">
+              <a:solidFill>
+                <a:schemeClr val="tx1"/>
+              </a:solidFill>
+            </a:endParaRPr>
+          </a:p>
+        </p:txBody>
+      </p:sp>
       <p:grpSp>
         <p:nvGrpSpPr>
-          <p:cNvPr id="4" name="그룹 3">
-            <a:extLst>
-              <a:ext uri="{FF2B5EF4-FFF2-40B4-BE49-F238E27FC236}">
-                <a16:creationId xmlns:a16="http://schemas.microsoft.com/office/drawing/2014/main" id="{D51887C1-DDD2-D154-62C5-BED8D5455A5B}"/>
+          <p:cNvPr id="6" name="그룹 5">
+            <a:extLst>
+              <a:ext uri="{FF2B5EF4-FFF2-40B4-BE49-F238E27FC236}">
+                <a16:creationId xmlns:a16="http://schemas.microsoft.com/office/drawing/2014/main" id="{7495A107-1395-307B-017B-F56383A18B1E}"/>
               </a:ext>
             </a:extLst>
           </p:cNvPr>
@@ -3551,165 +3550,7 @@
         </p:nvGrpSpPr>
         <p:grpSpPr>
           <a:xfrm>
-            <a:off x="1968267" y="2693718"/>
-            <a:ext cx="1800000" cy="1800827"/>
-            <a:chOff x="1969219" y="2683780"/>
-            <a:chExt cx="1801905" cy="1800827"/>
-          </a:xfrm>
-        </p:grpSpPr>
-        <p:sp>
-          <p:nvSpPr>
-            <p:cNvPr id="8" name="막힌 원호 7">
-              <a:extLst>
-                <a:ext uri="{FF2B5EF4-FFF2-40B4-BE49-F238E27FC236}">
-                  <a16:creationId xmlns:a16="http://schemas.microsoft.com/office/drawing/2014/main" id="{306BC659-B8FE-6DE7-9768-927B3D9C56F6}"/>
-                </a:ext>
-              </a:extLst>
-            </p:cNvPr>
-            <p:cNvSpPr/>
-            <p:nvPr/>
-          </p:nvSpPr>
-          <p:spPr>
-            <a:xfrm rot="1247646">
-              <a:off x="1969219" y="2683780"/>
-              <a:ext cx="1800000" cy="1800000"/>
-            </a:xfrm>
-            <a:prstGeom prst="blockArc">
-              <a:avLst>
-                <a:gd name="adj1" fmla="val 8145941"/>
-                <a:gd name="adj2" fmla="val 158579"/>
-                <a:gd name="adj3" fmla="val 14035"/>
-              </a:avLst>
-            </a:prstGeom>
-            <a:gradFill flip="none" rotWithShape="1">
-              <a:gsLst>
-                <a:gs pos="0">
-                  <a:srgbClr val="FF0000"/>
-                </a:gs>
-                <a:gs pos="42000">
-                  <a:srgbClr val="FFC000"/>
-                </a:gs>
-                <a:gs pos="76000">
-                  <a:srgbClr val="92D050"/>
-                </a:gs>
-                <a:gs pos="100000">
-                  <a:srgbClr val="00B050"/>
-                </a:gs>
-              </a:gsLst>
-              <a:lin ang="10200000" scaled="0"/>
-              <a:tileRect/>
-            </a:gradFill>
-            <a:ln>
-              <a:noFill/>
-            </a:ln>
-          </p:spPr>
-          <p:style>
-            <a:lnRef idx="2">
-              <a:schemeClr val="accent1">
-                <a:shade val="15000"/>
-              </a:schemeClr>
-            </a:lnRef>
-            <a:fillRef idx="1">
-              <a:schemeClr val="accent1"/>
-            </a:fillRef>
-            <a:effectRef idx="0">
-              <a:schemeClr val="accent1"/>
-            </a:effectRef>
-            <a:fontRef idx="minor">
-              <a:schemeClr val="lt1"/>
-            </a:fontRef>
-          </p:style>
-          <p:txBody>
-            <a:bodyPr rtlCol="0" anchor="ctr"/>
-            <a:lstStyle/>
-            <a:p>
-              <a:pPr algn="ctr"/>
-              <a:endParaRPr lang="ko-KR" altLang="en-US">
-                <a:solidFill>
-                  <a:schemeClr val="tx1"/>
-                </a:solidFill>
-              </a:endParaRPr>
-            </a:p>
-          </p:txBody>
-        </p:sp>
-        <p:sp>
-          <p:nvSpPr>
-            <p:cNvPr id="3" name="막힌 원호 2">
-              <a:extLst>
-                <a:ext uri="{FF2B5EF4-FFF2-40B4-BE49-F238E27FC236}">
-                  <a16:creationId xmlns:a16="http://schemas.microsoft.com/office/drawing/2014/main" id="{3D140C06-9901-D102-9F78-C15CB39150C8}"/>
-                </a:ext>
-              </a:extLst>
-            </p:cNvPr>
-            <p:cNvSpPr/>
-            <p:nvPr/>
-          </p:nvSpPr>
-          <p:spPr>
-            <a:xfrm rot="9240000">
-              <a:off x="1971124" y="2684607"/>
-              <a:ext cx="1800000" cy="1800000"/>
-            </a:xfrm>
-            <a:prstGeom prst="blockArc">
-              <a:avLst>
-                <a:gd name="adj1" fmla="val 13772017"/>
-                <a:gd name="adj2" fmla="val 158579"/>
-                <a:gd name="adj3" fmla="val 14035"/>
-              </a:avLst>
-            </a:prstGeom>
-            <a:solidFill>
-              <a:schemeClr val="tx1">
-                <a:alpha val="0"/>
-              </a:schemeClr>
-            </a:solidFill>
-            <a:ln>
-              <a:noFill/>
-            </a:ln>
-          </p:spPr>
-          <p:style>
-            <a:lnRef idx="2">
-              <a:schemeClr val="accent1">
-                <a:shade val="15000"/>
-              </a:schemeClr>
-            </a:lnRef>
-            <a:fillRef idx="1">
-              <a:schemeClr val="accent1"/>
-            </a:fillRef>
-            <a:effectRef idx="0">
-              <a:schemeClr val="accent1"/>
-            </a:effectRef>
-            <a:fontRef idx="minor">
-              <a:schemeClr val="lt1"/>
-            </a:fontRef>
-          </p:style>
-          <p:txBody>
-            <a:bodyPr rtlCol="0" anchor="ctr"/>
-            <a:lstStyle/>
-            <a:p>
-              <a:pPr algn="ctr"/>
-              <a:endParaRPr lang="ko-KR" altLang="en-US">
-                <a:solidFill>
-                  <a:schemeClr val="tx1"/>
-                </a:solidFill>
-              </a:endParaRPr>
-            </a:p>
-          </p:txBody>
-        </p:sp>
-      </p:grpSp>
-      <p:grpSp>
-        <p:nvGrpSpPr>
-          <p:cNvPr id="6" name="그룹 5">
-            <a:extLst>
-              <a:ext uri="{FF2B5EF4-FFF2-40B4-BE49-F238E27FC236}">
-                <a16:creationId xmlns:a16="http://schemas.microsoft.com/office/drawing/2014/main" id="{7495A107-1395-307B-017B-F56383A18B1E}"/>
-              </a:ext>
-            </a:extLst>
-          </p:cNvPr>
-          <p:cNvGrpSpPr/>
-          <p:nvPr/>
-        </p:nvGrpSpPr>
-        <p:grpSpPr>
-          <a:xfrm>
-            <a:off x="4350694" y="3291164"/>
+            <a:off x="8984621" y="458349"/>
             <a:ext cx="1800000" cy="1800827"/>
             <a:chOff x="1969219" y="2683780"/>
             <a:chExt cx="1801905" cy="1800827"/>
@@ -3865,7 +3706,7 @@
         </p:nvGrpSpPr>
         <p:grpSpPr>
           <a:xfrm>
-            <a:off x="2940295" y="3736171"/>
+            <a:off x="7687112" y="4161540"/>
             <a:ext cx="1800001" cy="1800000"/>
             <a:chOff x="1812762" y="2531379"/>
             <a:chExt cx="1800001" cy="1800000"/>
@@ -3890,9 +3731,9 @@
             </a:xfrm>
             <a:prstGeom prst="blockArc">
               <a:avLst>
-                <a:gd name="adj1" fmla="val 8145941"/>
-                <a:gd name="adj2" fmla="val 18758978"/>
-                <a:gd name="adj3" fmla="val 14057"/>
+                <a:gd name="adj1" fmla="val 7918221"/>
+                <a:gd name="adj2" fmla="val 18727125"/>
+                <a:gd name="adj3" fmla="val 14245"/>
               </a:avLst>
             </a:prstGeom>
             <a:solidFill>
@@ -3964,8 +3805,8 @@
             <a:prstGeom prst="blockArc">
               <a:avLst>
                 <a:gd name="adj1" fmla="val 10774825"/>
-                <a:gd name="adj2" fmla="val 158579"/>
-                <a:gd name="adj3" fmla="val 14035"/>
+                <a:gd name="adj2" fmla="val 21492135"/>
+                <a:gd name="adj3" fmla="val 13752"/>
               </a:avLst>
             </a:prstGeom>
             <a:solidFill>
@@ -3998,7 +3839,7 @@
             <a:lstStyle/>
             <a:p>
               <a:pPr algn="ctr"/>
-              <a:endParaRPr lang="ko-KR" altLang="en-US">
+              <a:endParaRPr lang="ko-KR" altLang="en-US" dirty="0">
                 <a:solidFill>
                   <a:schemeClr val="tx1"/>
                 </a:solidFill>
@@ -4035,7 +3876,7 @@
         </p:blipFill>
         <p:spPr>
           <a:xfrm>
-            <a:off x="8833537" y="2087019"/>
+            <a:off x="7885195" y="853740"/>
             <a:ext cx="1801108" cy="1803879"/>
           </a:xfrm>
           <a:prstGeom prst="rect">
@@ -4054,14 +3895,13 @@
           </p:cNvPr>
           <p:cNvCxnSpPr>
             <a:cxnSpLocks/>
-            <a:stCxn id="19" idx="0"/>
           </p:cNvCxnSpPr>
           <p:nvPr/>
         </p:nvCxnSpPr>
         <p:spPr>
-          <a:xfrm>
-            <a:off x="9734091" y="2087019"/>
-            <a:ext cx="0" cy="1832201"/>
+          <a:xfrm flipH="1">
+            <a:off x="7888383" y="4253108"/>
+            <a:ext cx="2324100" cy="1188720"/>
           </a:xfrm>
           <a:prstGeom prst="line">
             <a:avLst/>
@@ -4100,7 +3940,7 @@
         </p:nvCxnSpPr>
         <p:spPr>
           <a:xfrm flipH="1">
-            <a:off x="8833537" y="2988959"/>
+            <a:off x="7885195" y="1755680"/>
             <a:ext cx="1801108" cy="0"/>
           </a:xfrm>
           <a:prstGeom prst="line">
@@ -4122,92 +3962,6 @@
           </a:fontRef>
         </p:style>
       </p:cxnSp>
-      <p:cxnSp>
-        <p:nvCxnSpPr>
-          <p:cNvPr id="29" name="직선 연결선 28">
-            <a:extLst>
-              <a:ext uri="{FF2B5EF4-FFF2-40B4-BE49-F238E27FC236}">
-                <a16:creationId xmlns:a16="http://schemas.microsoft.com/office/drawing/2014/main" id="{967161FB-80C0-ED58-58A4-A909B17B392F}"/>
-              </a:ext>
-            </a:extLst>
-          </p:cNvPr>
-          <p:cNvCxnSpPr/>
-          <p:nvPr/>
-        </p:nvCxnSpPr>
-        <p:spPr>
-          <a:xfrm flipH="1">
-            <a:off x="8572500" y="2988958"/>
-            <a:ext cx="1161591" cy="486327"/>
-          </a:xfrm>
-          <a:prstGeom prst="line">
-            <a:avLst/>
-          </a:prstGeom>
-        </p:spPr>
-        <p:style>
-          <a:lnRef idx="2">
-            <a:schemeClr val="accent1"/>
-          </a:lnRef>
-          <a:fillRef idx="0">
-            <a:schemeClr val="accent1"/>
-          </a:fillRef>
-          <a:effectRef idx="1">
-            <a:schemeClr val="accent1"/>
-          </a:effectRef>
-          <a:fontRef idx="minor">
-            <a:schemeClr val="tx1"/>
-          </a:fontRef>
-        </p:style>
-      </p:cxnSp>
-      <p:sp>
-        <p:nvSpPr>
-          <p:cNvPr id="31" name="원형: 비어 있음 30">
-            <a:extLst>
-              <a:ext uri="{FF2B5EF4-FFF2-40B4-BE49-F238E27FC236}">
-                <a16:creationId xmlns:a16="http://schemas.microsoft.com/office/drawing/2014/main" id="{390DE2E3-D8A1-069D-A5CC-ABA5C3464D21}"/>
-              </a:ext>
-            </a:extLst>
-          </p:cNvPr>
-          <p:cNvSpPr/>
-          <p:nvPr/>
-        </p:nvSpPr>
-        <p:spPr>
-          <a:xfrm>
-            <a:off x="2928394" y="1585731"/>
-            <a:ext cx="1800000" cy="1800000"/>
-          </a:xfrm>
-          <a:prstGeom prst="donut">
-            <a:avLst/>
-          </a:prstGeom>
-        </p:spPr>
-        <p:style>
-          <a:lnRef idx="2">
-            <a:schemeClr val="accent1">
-              <a:shade val="15000"/>
-            </a:schemeClr>
-          </a:lnRef>
-          <a:fillRef idx="1">
-            <a:schemeClr val="accent1"/>
-          </a:fillRef>
-          <a:effectRef idx="0">
-            <a:schemeClr val="accent1"/>
-          </a:effectRef>
-          <a:fontRef idx="minor">
-            <a:schemeClr val="lt1"/>
-          </a:fontRef>
-        </p:style>
-        <p:txBody>
-          <a:bodyPr rtlCol="0" anchor="ctr"/>
-          <a:lstStyle/>
-          <a:p>
-            <a:pPr algn="ctr"/>
-            <a:endParaRPr lang="ko-KR" altLang="en-US">
-              <a:solidFill>
-                <a:schemeClr val="tx1"/>
-              </a:solidFill>
-            </a:endParaRPr>
-          </a:p>
-        </p:txBody>
-      </p:sp>
       <p:grpSp>
         <p:nvGrpSpPr>
           <p:cNvPr id="32" name="그룹 31">
@@ -4222,7 +3976,7 @@
         </p:nvGrpSpPr>
         <p:grpSpPr>
           <a:xfrm>
-            <a:off x="8972879" y="4191164"/>
+            <a:off x="9658947" y="1464922"/>
             <a:ext cx="1800000" cy="1800827"/>
             <a:chOff x="1969219" y="2683780"/>
             <a:chExt cx="1801905" cy="1800827"/>
@@ -4366,6 +4120,211 @@
           </p:txBody>
         </p:sp>
       </p:grpSp>
+      <p:sp>
+        <p:nvSpPr>
+          <p:cNvPr id="30" name="원형: 비어 있음 29">
+            <a:extLst>
+              <a:ext uri="{FF2B5EF4-FFF2-40B4-BE49-F238E27FC236}">
+                <a16:creationId xmlns:a16="http://schemas.microsoft.com/office/drawing/2014/main" id="{BFCC8F53-8116-3999-E7F7-281FC5DFB4EC}"/>
+              </a:ext>
+            </a:extLst>
+          </p:cNvPr>
+          <p:cNvSpPr/>
+          <p:nvPr/>
+        </p:nvSpPr>
+        <p:spPr>
+          <a:xfrm>
+            <a:off x="5594933" y="4610542"/>
+            <a:ext cx="1800000" cy="1800000"/>
+          </a:xfrm>
+          <a:prstGeom prst="donut">
+            <a:avLst>
+              <a:gd name="adj" fmla="val 13886"/>
+            </a:avLst>
+          </a:prstGeom>
+          <a:gradFill>
+            <a:gsLst>
+              <a:gs pos="0">
+                <a:srgbClr val="FF0000"/>
+              </a:gs>
+              <a:gs pos="42000">
+                <a:srgbClr val="FFC000"/>
+              </a:gs>
+              <a:gs pos="76000">
+                <a:srgbClr val="92D050"/>
+              </a:gs>
+              <a:gs pos="100000">
+                <a:srgbClr val="00B050"/>
+              </a:gs>
+            </a:gsLst>
+            <a:lin ang="10200000" scaled="0"/>
+          </a:gradFill>
+          <a:ln>
+            <a:noFill/>
+          </a:ln>
+        </p:spPr>
+        <p:style>
+          <a:lnRef idx="2">
+            <a:schemeClr val="accent1">
+              <a:shade val="15000"/>
+            </a:schemeClr>
+          </a:lnRef>
+          <a:fillRef idx="1">
+            <a:schemeClr val="accent1"/>
+          </a:fillRef>
+          <a:effectRef idx="0">
+            <a:schemeClr val="accent1"/>
+          </a:effectRef>
+          <a:fontRef idx="minor">
+            <a:schemeClr val="lt1"/>
+          </a:fontRef>
+        </p:style>
+        <p:txBody>
+          <a:bodyPr rtlCol="0" anchor="ctr"/>
+          <a:lstStyle/>
+          <a:p>
+            <a:pPr algn="ctr"/>
+            <a:endParaRPr lang="ko-KR" altLang="en-US">
+              <a:solidFill>
+                <a:schemeClr val="tx1"/>
+              </a:solidFill>
+            </a:endParaRPr>
+          </a:p>
+        </p:txBody>
+      </p:sp>
+      <p:sp>
+        <p:nvSpPr>
+          <p:cNvPr id="35" name="원형: 비어 있음 34">
+            <a:extLst>
+              <a:ext uri="{FF2B5EF4-FFF2-40B4-BE49-F238E27FC236}">
+                <a16:creationId xmlns:a16="http://schemas.microsoft.com/office/drawing/2014/main" id="{13FD8CB2-2F4B-E794-22AE-6AD367FAE52D}"/>
+              </a:ext>
+            </a:extLst>
+          </p:cNvPr>
+          <p:cNvSpPr/>
+          <p:nvPr/>
+        </p:nvSpPr>
+        <p:spPr>
+          <a:xfrm>
+            <a:off x="3586434" y="4664986"/>
+            <a:ext cx="1800000" cy="1800000"/>
+          </a:xfrm>
+          <a:prstGeom prst="donut">
+            <a:avLst>
+              <a:gd name="adj" fmla="val 13886"/>
+            </a:avLst>
+          </a:prstGeom>
+          <a:solidFill>
+            <a:srgbClr val="404040">
+              <a:alpha val="70000"/>
+            </a:srgbClr>
+          </a:solidFill>
+          <a:ln>
+            <a:noFill/>
+          </a:ln>
+        </p:spPr>
+        <p:style>
+          <a:lnRef idx="2">
+            <a:schemeClr val="accent1">
+              <a:shade val="15000"/>
+            </a:schemeClr>
+          </a:lnRef>
+          <a:fillRef idx="1">
+            <a:schemeClr val="accent1"/>
+          </a:fillRef>
+          <a:effectRef idx="0">
+            <a:schemeClr val="accent1"/>
+          </a:effectRef>
+          <a:fontRef idx="minor">
+            <a:schemeClr val="lt1"/>
+          </a:fontRef>
+        </p:style>
+        <p:txBody>
+          <a:bodyPr rtlCol="0" anchor="ctr"/>
+          <a:lstStyle/>
+          <a:p>
+            <a:pPr algn="ctr"/>
+            <a:endParaRPr lang="ko-KR" altLang="en-US">
+              <a:solidFill>
+                <a:schemeClr val="tx1"/>
+              </a:solidFill>
+            </a:endParaRPr>
+          </a:p>
+        </p:txBody>
+      </p:sp>
+      <p:sp>
+        <p:nvSpPr>
+          <p:cNvPr id="36" name="막힌 원호 35">
+            <a:extLst>
+              <a:ext uri="{FF2B5EF4-FFF2-40B4-BE49-F238E27FC236}">
+                <a16:creationId xmlns:a16="http://schemas.microsoft.com/office/drawing/2014/main" id="{39BF719D-A78D-C97B-0B07-A82CE1BDE2B5}"/>
+              </a:ext>
+            </a:extLst>
+          </p:cNvPr>
+          <p:cNvSpPr/>
+          <p:nvPr/>
+        </p:nvSpPr>
+        <p:spPr>
+          <a:xfrm>
+            <a:off x="4379683" y="794634"/>
+            <a:ext cx="1800000" cy="1800000"/>
+          </a:xfrm>
+          <a:prstGeom prst="blockArc">
+            <a:avLst>
+              <a:gd name="adj1" fmla="val 10800000"/>
+              <a:gd name="adj2" fmla="val 0"/>
+              <a:gd name="adj3" fmla="val 13782"/>
+            </a:avLst>
+          </a:prstGeom>
+          <a:solidFill>
+            <a:srgbClr val="FF0000">
+              <a:alpha val="10000"/>
+            </a:srgbClr>
+          </a:solidFill>
+          <a:ln>
+            <a:solidFill>
+              <a:srgbClr val="FF0000">
+                <a:alpha val="50000"/>
+              </a:srgbClr>
+            </a:solidFill>
+          </a:ln>
+          <a:effectLst>
+            <a:glow rad="38100">
+              <a:srgbClr val="FF0000">
+                <a:alpha val="20000"/>
+              </a:srgbClr>
+            </a:glow>
+          </a:effectLst>
+        </p:spPr>
+        <p:style>
+          <a:lnRef idx="2">
+            <a:schemeClr val="accent1">
+              <a:shade val="15000"/>
+            </a:schemeClr>
+          </a:lnRef>
+          <a:fillRef idx="1">
+            <a:schemeClr val="accent1"/>
+          </a:fillRef>
+          <a:effectRef idx="0">
+            <a:schemeClr val="accent1"/>
+          </a:effectRef>
+          <a:fontRef idx="minor">
+            <a:schemeClr val="lt1"/>
+          </a:fontRef>
+        </p:style>
+        <p:txBody>
+          <a:bodyPr rtlCol="0" anchor="ctr"/>
+          <a:lstStyle/>
+          <a:p>
+            <a:pPr algn="ctr"/>
+            <a:endParaRPr lang="ko-KR" altLang="en-US">
+              <a:solidFill>
+                <a:schemeClr val="tx1"/>
+              </a:solidFill>
+            </a:endParaRPr>
+          </a:p>
+        </p:txBody>
+      </p:sp>
     </p:spTree>
     <p:extLst>
       <p:ext uri="{BB962C8B-B14F-4D97-AF65-F5344CB8AC3E}">

</xml_diff>

<commit_message>
Feat #29 Fixed Title Scene
</commit_message>
<xml_diff>
--- a/RawImages/imagePPT.pptx
+++ b/RawImages/imagePPT.pptx
@@ -6,6 +6,7 @@
   </p:sldMasterIdLst>
   <p:sldIdLst>
     <p:sldId id="256" r:id="rId2"/>
+    <p:sldId id="257" r:id="rId3"/>
   </p:sldIdLst>
   <p:sldSz cx="12192000" cy="6858000"/>
   <p:notesSz cx="6858000" cy="9144000"/>
@@ -259,7 +260,7 @@
           <a:p>
             <a:fld id="{F3E3B444-461C-43DF-9895-EF8F91AA3F26}" type="datetimeFigureOut">
               <a:rPr lang="ko-KR" altLang="en-US" smtClean="0"/>
-              <a:t>2025-05-18</a:t>
+              <a:t>2025-05-19</a:t>
             </a:fld>
             <a:endParaRPr lang="ko-KR" altLang="en-US"/>
           </a:p>
@@ -457,7 +458,7 @@
           <a:p>
             <a:fld id="{F3E3B444-461C-43DF-9895-EF8F91AA3F26}" type="datetimeFigureOut">
               <a:rPr lang="ko-KR" altLang="en-US" smtClean="0"/>
-              <a:t>2025-05-18</a:t>
+              <a:t>2025-05-19</a:t>
             </a:fld>
             <a:endParaRPr lang="ko-KR" altLang="en-US"/>
           </a:p>
@@ -665,7 +666,7 @@
           <a:p>
             <a:fld id="{F3E3B444-461C-43DF-9895-EF8F91AA3F26}" type="datetimeFigureOut">
               <a:rPr lang="ko-KR" altLang="en-US" smtClean="0"/>
-              <a:t>2025-05-18</a:t>
+              <a:t>2025-05-19</a:t>
             </a:fld>
             <a:endParaRPr lang="ko-KR" altLang="en-US"/>
           </a:p>
@@ -863,7 +864,7 @@
           <a:p>
             <a:fld id="{F3E3B444-461C-43DF-9895-EF8F91AA3F26}" type="datetimeFigureOut">
               <a:rPr lang="ko-KR" altLang="en-US" smtClean="0"/>
-              <a:t>2025-05-18</a:t>
+              <a:t>2025-05-19</a:t>
             </a:fld>
             <a:endParaRPr lang="ko-KR" altLang="en-US"/>
           </a:p>
@@ -1138,7 +1139,7 @@
           <a:p>
             <a:fld id="{F3E3B444-461C-43DF-9895-EF8F91AA3F26}" type="datetimeFigureOut">
               <a:rPr lang="ko-KR" altLang="en-US" smtClean="0"/>
-              <a:t>2025-05-18</a:t>
+              <a:t>2025-05-19</a:t>
             </a:fld>
             <a:endParaRPr lang="ko-KR" altLang="en-US"/>
           </a:p>
@@ -1403,7 +1404,7 @@
           <a:p>
             <a:fld id="{F3E3B444-461C-43DF-9895-EF8F91AA3F26}" type="datetimeFigureOut">
               <a:rPr lang="ko-KR" altLang="en-US" smtClean="0"/>
-              <a:t>2025-05-18</a:t>
+              <a:t>2025-05-19</a:t>
             </a:fld>
             <a:endParaRPr lang="ko-KR" altLang="en-US"/>
           </a:p>
@@ -1815,7 +1816,7 @@
           <a:p>
             <a:fld id="{F3E3B444-461C-43DF-9895-EF8F91AA3F26}" type="datetimeFigureOut">
               <a:rPr lang="ko-KR" altLang="en-US" smtClean="0"/>
-              <a:t>2025-05-18</a:t>
+              <a:t>2025-05-19</a:t>
             </a:fld>
             <a:endParaRPr lang="ko-KR" altLang="en-US"/>
           </a:p>
@@ -1956,7 +1957,7 @@
           <a:p>
             <a:fld id="{F3E3B444-461C-43DF-9895-EF8F91AA3F26}" type="datetimeFigureOut">
               <a:rPr lang="ko-KR" altLang="en-US" smtClean="0"/>
-              <a:t>2025-05-18</a:t>
+              <a:t>2025-05-19</a:t>
             </a:fld>
             <a:endParaRPr lang="ko-KR" altLang="en-US"/>
           </a:p>
@@ -2069,7 +2070,7 @@
           <a:p>
             <a:fld id="{F3E3B444-461C-43DF-9895-EF8F91AA3F26}" type="datetimeFigureOut">
               <a:rPr lang="ko-KR" altLang="en-US" smtClean="0"/>
-              <a:t>2025-05-18</a:t>
+              <a:t>2025-05-19</a:t>
             </a:fld>
             <a:endParaRPr lang="ko-KR" altLang="en-US"/>
           </a:p>
@@ -2380,7 +2381,7 @@
           <a:p>
             <a:fld id="{F3E3B444-461C-43DF-9895-EF8F91AA3F26}" type="datetimeFigureOut">
               <a:rPr lang="ko-KR" altLang="en-US" smtClean="0"/>
-              <a:t>2025-05-18</a:t>
+              <a:t>2025-05-19</a:t>
             </a:fld>
             <a:endParaRPr lang="ko-KR" altLang="en-US"/>
           </a:p>
@@ -2668,7 +2669,7 @@
           <a:p>
             <a:fld id="{F3E3B444-461C-43DF-9895-EF8F91AA3F26}" type="datetimeFigureOut">
               <a:rPr lang="ko-KR" altLang="en-US" smtClean="0"/>
-              <a:t>2025-05-18</a:t>
+              <a:t>2025-05-19</a:t>
             </a:fld>
             <a:endParaRPr lang="ko-KR" altLang="en-US"/>
           </a:p>
@@ -2745,9 +2746,15 @@
 <p:sldMaster xmlns:a="http://schemas.openxmlformats.org/drawingml/2006/main" xmlns:r="http://schemas.openxmlformats.org/officeDocument/2006/relationships" xmlns:p="http://schemas.openxmlformats.org/presentationml/2006/main">
   <p:cSld>
     <p:bg>
-      <p:bgRef idx="1001">
-        <a:schemeClr val="bg1"/>
-      </p:bgRef>
+      <p:bgPr>
+        <a:solidFill>
+          <a:schemeClr val="tx1">
+            <a:lumMod val="50000"/>
+            <a:lumOff val="50000"/>
+          </a:schemeClr>
+        </a:solidFill>
+        <a:effectLst/>
+      </p:bgPr>
     </p:bg>
     <p:spTree>
       <p:nvGrpSpPr>
@@ -2909,7 +2916,7 @@
           <a:p>
             <a:fld id="{F3E3B444-461C-43DF-9895-EF8F91AA3F26}" type="datetimeFigureOut">
               <a:rPr lang="ko-KR" altLang="en-US" smtClean="0"/>
-              <a:t>2025-05-18</a:t>
+              <a:t>2025-05-19</a:t>
             </a:fld>
             <a:endParaRPr lang="ko-KR" altLang="en-US"/>
           </a:p>
@@ -4329,6 +4336,176 @@
     <p:extLst>
       <p:ext uri="{BB962C8B-B14F-4D97-AF65-F5344CB8AC3E}">
         <p14:creationId xmlns:p14="http://schemas.microsoft.com/office/powerpoint/2010/main" val="1509584059"/>
+      </p:ext>
+    </p:extLst>
+  </p:cSld>
+  <p:clrMapOvr>
+    <a:masterClrMapping/>
+  </p:clrMapOvr>
+</p:sld>
+</file>
+
+<file path=ppt/slides/slide2.xml><?xml version="1.0" encoding="utf-8"?>
+<p:sld xmlns:a="http://schemas.openxmlformats.org/drawingml/2006/main" xmlns:r="http://schemas.openxmlformats.org/officeDocument/2006/relationships" xmlns:p="http://schemas.openxmlformats.org/presentationml/2006/main">
+  <p:cSld>
+    <p:spTree>
+      <p:nvGrpSpPr>
+        <p:cNvPr id="1" name=""/>
+        <p:cNvGrpSpPr/>
+        <p:nvPr/>
+      </p:nvGrpSpPr>
+      <p:grpSpPr>
+        <a:xfrm>
+          <a:off x="0" y="0"/>
+          <a:ext cx="0" cy="0"/>
+          <a:chOff x="0" y="0"/>
+          <a:chExt cx="0" cy="0"/>
+        </a:xfrm>
+      </p:grpSpPr>
+      <p:pic>
+        <p:nvPicPr>
+          <p:cNvPr id="7" name="그림 6" descr="폰트, 그래픽, 텍스트, 상징이(가) 표시된 사진&#10;&#10;AI가 생성한 콘텐츠는 부정확할 수 있습니다.">
+            <a:extLst>
+              <a:ext uri="{FF2B5EF4-FFF2-40B4-BE49-F238E27FC236}">
+                <a16:creationId xmlns:a16="http://schemas.microsoft.com/office/drawing/2014/main" id="{08021C44-8131-5084-5825-5AC9CD1B4E36}"/>
+              </a:ext>
+            </a:extLst>
+          </p:cNvPr>
+          <p:cNvPicPr>
+            <a:picLocks/>
+          </p:cNvPicPr>
+          <p:nvPr/>
+        </p:nvPicPr>
+        <p:blipFill>
+          <a:blip r:embed="rId2">
+            <a:extLst>
+              <a:ext uri="{28A0092B-C50C-407E-A947-70E740481C1C}">
+                <a14:useLocalDpi xmlns:a14="http://schemas.microsoft.com/office/drawing/2010/main" val="0"/>
+              </a:ext>
+            </a:extLst>
+          </a:blip>
+          <a:srcRect l="10129" r="7411" b="18275"/>
+          <a:stretch/>
+        </p:blipFill>
+        <p:spPr>
+          <a:xfrm>
+            <a:off x="1539433" y="731858"/>
+            <a:ext cx="1800000" cy="1800000"/>
+          </a:xfrm>
+          <a:prstGeom prst="rect">
+            <a:avLst/>
+          </a:prstGeom>
+        </p:spPr>
+      </p:pic>
+      <p:pic>
+        <p:nvPicPr>
+          <p:cNvPr id="9" name="그림 8" descr="원, 스크린샷, 디자인이(가) 표시된 사진&#10;&#10;AI가 생성한 콘텐츠는 부정확할 수 있습니다.">
+            <a:extLst>
+              <a:ext uri="{FF2B5EF4-FFF2-40B4-BE49-F238E27FC236}">
+                <a16:creationId xmlns:a16="http://schemas.microsoft.com/office/drawing/2014/main" id="{8B187B7F-622C-1730-8342-9A05B391438B}"/>
+              </a:ext>
+            </a:extLst>
+          </p:cNvPr>
+          <p:cNvPicPr>
+            <a:picLocks/>
+          </p:cNvPicPr>
+          <p:nvPr/>
+        </p:nvPicPr>
+        <p:blipFill>
+          <a:blip r:embed="rId3">
+            <a:extLst>
+              <a:ext uri="{28A0092B-C50C-407E-A947-70E740481C1C}">
+                <a14:useLocalDpi xmlns:a14="http://schemas.microsoft.com/office/drawing/2010/main" val="0"/>
+              </a:ext>
+            </a:extLst>
+          </a:blip>
+          <a:srcRect l="16033" t="9547" r="16438" b="22963"/>
+          <a:stretch/>
+        </p:blipFill>
+        <p:spPr>
+          <a:xfrm>
+            <a:off x="1689903" y="2653255"/>
+            <a:ext cx="1800000" cy="1800000"/>
+          </a:xfrm>
+          <a:prstGeom prst="rect">
+            <a:avLst/>
+          </a:prstGeom>
+        </p:spPr>
+      </p:pic>
+      <p:pic>
+        <p:nvPicPr>
+          <p:cNvPr id="11" name="그림 10" descr="상징, 그래픽, 로고, 폰트이(가) 표시된 사진&#10;&#10;AI가 생성한 콘텐츠는 부정확할 수 있습니다.">
+            <a:extLst>
+              <a:ext uri="{FF2B5EF4-FFF2-40B4-BE49-F238E27FC236}">
+                <a16:creationId xmlns:a16="http://schemas.microsoft.com/office/drawing/2014/main" id="{EF4B0EDA-7606-4477-C7AD-9EEC8D8E63F6}"/>
+              </a:ext>
+            </a:extLst>
+          </p:cNvPr>
+          <p:cNvPicPr>
+            <a:picLocks/>
+          </p:cNvPicPr>
+          <p:nvPr/>
+        </p:nvPicPr>
+        <p:blipFill>
+          <a:blip r:embed="rId4">
+            <a:extLst>
+              <a:ext uri="{28A0092B-C50C-407E-A947-70E740481C1C}">
+                <a14:useLocalDpi xmlns:a14="http://schemas.microsoft.com/office/drawing/2010/main" val="0"/>
+              </a:ext>
+            </a:extLst>
+          </a:blip>
+          <a:srcRect l="10913" t="1522" r="10913" b="19838"/>
+          <a:stretch/>
+        </p:blipFill>
+        <p:spPr>
+          <a:xfrm>
+            <a:off x="1689903" y="4757194"/>
+            <a:ext cx="1800000" cy="1800000"/>
+          </a:xfrm>
+          <a:prstGeom prst="rect">
+            <a:avLst/>
+          </a:prstGeom>
+        </p:spPr>
+      </p:pic>
+      <p:pic>
+        <p:nvPicPr>
+          <p:cNvPr id="13" name="그림 12" descr="폰트, 그래픽, 로고, 상징이(가) 표시된 사진&#10;&#10;AI가 생성한 콘텐츠는 부정확할 수 있습니다.">
+            <a:extLst>
+              <a:ext uri="{FF2B5EF4-FFF2-40B4-BE49-F238E27FC236}">
+                <a16:creationId xmlns:a16="http://schemas.microsoft.com/office/drawing/2014/main" id="{0A609A65-4ED0-1916-016B-BB9A4B38266F}"/>
+              </a:ext>
+            </a:extLst>
+          </p:cNvPr>
+          <p:cNvPicPr>
+            <a:picLocks/>
+          </p:cNvPicPr>
+          <p:nvPr/>
+        </p:nvPicPr>
+        <p:blipFill>
+          <a:blip r:embed="rId5">
+            <a:extLst>
+              <a:ext uri="{28A0092B-C50C-407E-A947-70E740481C1C}">
+                <a14:useLocalDpi xmlns:a14="http://schemas.microsoft.com/office/drawing/2010/main" val="0"/>
+              </a:ext>
+            </a:extLst>
+          </a:blip>
+          <a:srcRect l="6832" r="7063" b="14109"/>
+          <a:stretch/>
+        </p:blipFill>
+        <p:spPr>
+          <a:xfrm>
+            <a:off x="4653023" y="1136971"/>
+            <a:ext cx="1800000" cy="1800000"/>
+          </a:xfrm>
+          <a:prstGeom prst="rect">
+            <a:avLst/>
+          </a:prstGeom>
+        </p:spPr>
+      </p:pic>
+    </p:spTree>
+    <p:extLst>
+      <p:ext uri="{BB962C8B-B14F-4D97-AF65-F5344CB8AC3E}">
+        <p14:creationId xmlns:p14="http://schemas.microsoft.com/office/powerpoint/2010/main" val="1871351606"/>
       </p:ext>
     </p:extLst>
   </p:cSld>

</xml_diff>

<commit_message>
Feat #30 Buffed Effect on Speed Gauge Added
</commit_message>
<xml_diff>
--- a/RawImages/imagePPT.pptx
+++ b/RawImages/imagePPT.pptx
@@ -3893,44 +3893,6 @@
       </p:pic>
       <p:cxnSp>
         <p:nvCxnSpPr>
-          <p:cNvPr id="21" name="직선 연결선 20">
-            <a:extLst>
-              <a:ext uri="{FF2B5EF4-FFF2-40B4-BE49-F238E27FC236}">
-                <a16:creationId xmlns:a16="http://schemas.microsoft.com/office/drawing/2014/main" id="{6C9640B7-F7AD-9834-829E-3ABC3FCAF9EC}"/>
-              </a:ext>
-            </a:extLst>
-          </p:cNvPr>
-          <p:cNvCxnSpPr>
-            <a:cxnSpLocks/>
-          </p:cNvCxnSpPr>
-          <p:nvPr/>
-        </p:nvCxnSpPr>
-        <p:spPr>
-          <a:xfrm flipH="1">
-            <a:off x="7888383" y="4253108"/>
-            <a:ext cx="2324100" cy="1188720"/>
-          </a:xfrm>
-          <a:prstGeom prst="line">
-            <a:avLst/>
-          </a:prstGeom>
-        </p:spPr>
-        <p:style>
-          <a:lnRef idx="2">
-            <a:schemeClr val="accent1"/>
-          </a:lnRef>
-          <a:fillRef idx="0">
-            <a:schemeClr val="accent1"/>
-          </a:fillRef>
-          <a:effectRef idx="1">
-            <a:schemeClr val="accent1"/>
-          </a:effectRef>
-          <a:fontRef idx="minor">
-            <a:schemeClr val="tx1"/>
-          </a:fontRef>
-        </p:style>
-      </p:cxnSp>
-      <p:cxnSp>
-        <p:nvCxnSpPr>
           <p:cNvPr id="25" name="직선 연결선 24">
             <a:extLst>
               <a:ext uri="{FF2B5EF4-FFF2-40B4-BE49-F238E27FC236}">
@@ -4141,7 +4103,7 @@
         </p:nvSpPr>
         <p:spPr>
           <a:xfrm>
-            <a:off x="5594933" y="4610542"/>
+            <a:off x="5655353" y="3358397"/>
             <a:ext cx="1800000" cy="1800000"/>
           </a:xfrm>
           <a:prstGeom prst="donut">
@@ -4332,6 +4294,193 @@
           </a:p>
         </p:txBody>
       </p:sp>
+      <p:cxnSp>
+        <p:nvCxnSpPr>
+          <p:cNvPr id="11" name="직선 연결선 10">
+            <a:extLst>
+              <a:ext uri="{FF2B5EF4-FFF2-40B4-BE49-F238E27FC236}">
+                <a16:creationId xmlns:a16="http://schemas.microsoft.com/office/drawing/2014/main" id="{36EB2DCD-3AE7-1EA8-8BC6-C1DCBCB4CA81}"/>
+              </a:ext>
+            </a:extLst>
+          </p:cNvPr>
+          <p:cNvCxnSpPr>
+            <a:cxnSpLocks/>
+          </p:cNvCxnSpPr>
+          <p:nvPr/>
+        </p:nvCxnSpPr>
+        <p:spPr>
+          <a:xfrm flipH="1">
+            <a:off x="5663566" y="3789587"/>
+            <a:ext cx="1511139" cy="1150924"/>
+          </a:xfrm>
+          <a:prstGeom prst="line">
+            <a:avLst/>
+          </a:prstGeom>
+        </p:spPr>
+        <p:style>
+          <a:lnRef idx="2">
+            <a:schemeClr val="accent1"/>
+          </a:lnRef>
+          <a:fillRef idx="0">
+            <a:schemeClr val="accent1"/>
+          </a:fillRef>
+          <a:effectRef idx="1">
+            <a:schemeClr val="accent1"/>
+          </a:effectRef>
+          <a:fontRef idx="minor">
+            <a:schemeClr val="tx1"/>
+          </a:fontRef>
+        </p:style>
+      </p:cxnSp>
+      <p:cxnSp>
+        <p:nvCxnSpPr>
+          <p:cNvPr id="13" name="직선 연결선 12">
+            <a:extLst>
+              <a:ext uri="{FF2B5EF4-FFF2-40B4-BE49-F238E27FC236}">
+                <a16:creationId xmlns:a16="http://schemas.microsoft.com/office/drawing/2014/main" id="{BB2C2760-8C92-374C-7A38-2855398C92FB}"/>
+              </a:ext>
+            </a:extLst>
+          </p:cNvPr>
+          <p:cNvCxnSpPr>
+            <a:cxnSpLocks/>
+          </p:cNvCxnSpPr>
+          <p:nvPr/>
+        </p:nvCxnSpPr>
+        <p:spPr>
+          <a:xfrm flipH="1" flipV="1">
+            <a:off x="5758598" y="4152900"/>
+            <a:ext cx="3247138" cy="437765"/>
+          </a:xfrm>
+          <a:prstGeom prst="line">
+            <a:avLst/>
+          </a:prstGeom>
+        </p:spPr>
+        <p:style>
+          <a:lnRef idx="2">
+            <a:schemeClr val="accent1"/>
+          </a:lnRef>
+          <a:fillRef idx="0">
+            <a:schemeClr val="accent1"/>
+          </a:fillRef>
+          <a:effectRef idx="1">
+            <a:schemeClr val="accent1"/>
+          </a:effectRef>
+          <a:fontRef idx="minor">
+            <a:schemeClr val="tx1"/>
+          </a:fontRef>
+        </p:style>
+      </p:cxnSp>
+      <p:sp>
+        <p:nvSpPr>
+          <p:cNvPr id="31" name="막힌 원호 30">
+            <a:extLst>
+              <a:ext uri="{FF2B5EF4-FFF2-40B4-BE49-F238E27FC236}">
+                <a16:creationId xmlns:a16="http://schemas.microsoft.com/office/drawing/2014/main" id="{EF8F8A8B-0635-BAED-0548-037CF55D1C3C}"/>
+              </a:ext>
+            </a:extLst>
+          </p:cNvPr>
+          <p:cNvSpPr/>
+          <p:nvPr/>
+        </p:nvSpPr>
+        <p:spPr>
+          <a:xfrm rot="1247646">
+            <a:off x="5655353" y="3358397"/>
+            <a:ext cx="1800000" cy="1800000"/>
+          </a:xfrm>
+          <a:prstGeom prst="blockArc">
+            <a:avLst>
+              <a:gd name="adj1" fmla="val 7918221"/>
+              <a:gd name="adj2" fmla="val 3692070"/>
+              <a:gd name="adj3" fmla="val 13701"/>
+            </a:avLst>
+          </a:prstGeom>
+          <a:solidFill>
+            <a:srgbClr val="0070C0">
+              <a:alpha val="10000"/>
+            </a:srgbClr>
+          </a:solidFill>
+          <a:ln>
+            <a:solidFill>
+              <a:srgbClr val="0070C0">
+                <a:alpha val="50000"/>
+              </a:srgbClr>
+            </a:solidFill>
+          </a:ln>
+          <a:effectLst>
+            <a:glow rad="38100">
+              <a:srgbClr val="0070C0">
+                <a:alpha val="20000"/>
+              </a:srgbClr>
+            </a:glow>
+          </a:effectLst>
+        </p:spPr>
+        <p:style>
+          <a:lnRef idx="2">
+            <a:schemeClr val="accent1">
+              <a:shade val="15000"/>
+            </a:schemeClr>
+          </a:lnRef>
+          <a:fillRef idx="1">
+            <a:schemeClr val="accent1"/>
+          </a:fillRef>
+          <a:effectRef idx="0">
+            <a:schemeClr val="accent1"/>
+          </a:effectRef>
+          <a:fontRef idx="minor">
+            <a:schemeClr val="lt1"/>
+          </a:fontRef>
+        </p:style>
+        <p:txBody>
+          <a:bodyPr rtlCol="0" anchor="ctr"/>
+          <a:lstStyle/>
+          <a:p>
+            <a:pPr algn="ctr"/>
+            <a:endParaRPr lang="ko-KR" altLang="en-US" dirty="0">
+              <a:solidFill>
+                <a:schemeClr val="tx1"/>
+              </a:solidFill>
+            </a:endParaRPr>
+          </a:p>
+        </p:txBody>
+      </p:sp>
+      <p:cxnSp>
+        <p:nvCxnSpPr>
+          <p:cNvPr id="37" name="직선 연결선 36">
+            <a:extLst>
+              <a:ext uri="{FF2B5EF4-FFF2-40B4-BE49-F238E27FC236}">
+                <a16:creationId xmlns:a16="http://schemas.microsoft.com/office/drawing/2014/main" id="{BF2C2887-B9E4-E913-59EB-68A9C50D690C}"/>
+              </a:ext>
+            </a:extLst>
+          </p:cNvPr>
+          <p:cNvCxnSpPr>
+            <a:cxnSpLocks/>
+          </p:cNvCxnSpPr>
+          <p:nvPr/>
+        </p:nvCxnSpPr>
+        <p:spPr>
+          <a:xfrm rot="4680000" flipH="1">
+            <a:off x="5256417" y="4432780"/>
+            <a:ext cx="2672541" cy="0"/>
+          </a:xfrm>
+          <a:prstGeom prst="line">
+            <a:avLst/>
+          </a:prstGeom>
+        </p:spPr>
+        <p:style>
+          <a:lnRef idx="2">
+            <a:schemeClr val="accent1"/>
+          </a:lnRef>
+          <a:fillRef idx="0">
+            <a:schemeClr val="accent1"/>
+          </a:fillRef>
+          <a:effectRef idx="1">
+            <a:schemeClr val="accent1"/>
+          </a:effectRef>
+          <a:fontRef idx="minor">
+            <a:schemeClr val="tx1"/>
+          </a:fontRef>
+        </p:style>
+      </p:cxnSp>
     </p:spTree>
     <p:extLst>
       <p:ext uri="{BB962C8B-B14F-4D97-AF65-F5344CB8AC3E}">

</xml_diff>

<commit_message>
Feat #32 U3 basic done
</commit_message>
<xml_diff>
--- a/RawImages/imagePPT.pptx
+++ b/RawImages/imagePPT.pptx
@@ -7,6 +7,7 @@
   <p:sldIdLst>
     <p:sldId id="256" r:id="rId2"/>
     <p:sldId id="257" r:id="rId3"/>
+    <p:sldId id="258" r:id="rId4"/>
   </p:sldIdLst>
   <p:sldSz cx="12192000" cy="6858000"/>
   <p:notesSz cx="6858000" cy="9144000"/>
@@ -4655,6 +4656,1844 @@
     <p:extLst>
       <p:ext uri="{BB962C8B-B14F-4D97-AF65-F5344CB8AC3E}">
         <p14:creationId xmlns:p14="http://schemas.microsoft.com/office/powerpoint/2010/main" val="1871351606"/>
+      </p:ext>
+    </p:extLst>
+  </p:cSld>
+  <p:clrMapOvr>
+    <a:masterClrMapping/>
+  </p:clrMapOvr>
+</p:sld>
+</file>
+
+<file path=ppt/slides/slide3.xml><?xml version="1.0" encoding="utf-8"?>
+<p:sld xmlns:a="http://schemas.openxmlformats.org/drawingml/2006/main" xmlns:r="http://schemas.openxmlformats.org/officeDocument/2006/relationships" xmlns:p="http://schemas.openxmlformats.org/presentationml/2006/main">
+  <p:cSld>
+    <p:spTree>
+      <p:nvGrpSpPr>
+        <p:cNvPr id="1" name=""/>
+        <p:cNvGrpSpPr/>
+        <p:nvPr/>
+      </p:nvGrpSpPr>
+      <p:grpSpPr>
+        <a:xfrm>
+          <a:off x="0" y="0"/>
+          <a:ext cx="0" cy="0"/>
+          <a:chOff x="0" y="0"/>
+          <a:chExt cx="0" cy="0"/>
+        </a:xfrm>
+      </p:grpSpPr>
+      <p:grpSp>
+        <p:nvGrpSpPr>
+          <p:cNvPr id="57" name="그룹 56">
+            <a:extLst>
+              <a:ext uri="{FF2B5EF4-FFF2-40B4-BE49-F238E27FC236}">
+                <a16:creationId xmlns:a16="http://schemas.microsoft.com/office/drawing/2014/main" id="{1899FB8A-C500-79E9-95B1-7FF922957027}"/>
+              </a:ext>
+            </a:extLst>
+          </p:cNvPr>
+          <p:cNvGrpSpPr/>
+          <p:nvPr/>
+        </p:nvGrpSpPr>
+        <p:grpSpPr>
+          <a:xfrm>
+            <a:off x="1985818" y="3157647"/>
+            <a:ext cx="6480000" cy="540000"/>
+            <a:chOff x="1985818" y="3157647"/>
+            <a:chExt cx="6480000" cy="540000"/>
+          </a:xfrm>
+        </p:grpSpPr>
+        <p:sp>
+          <p:nvSpPr>
+            <p:cNvPr id="4" name="직사각형 3">
+              <a:extLst>
+                <a:ext uri="{FF2B5EF4-FFF2-40B4-BE49-F238E27FC236}">
+                  <a16:creationId xmlns:a16="http://schemas.microsoft.com/office/drawing/2014/main" id="{537024BA-2D9F-81DC-87CD-73720497EED7}"/>
+                </a:ext>
+              </a:extLst>
+            </p:cNvPr>
+            <p:cNvSpPr/>
+            <p:nvPr/>
+          </p:nvSpPr>
+          <p:spPr>
+            <a:xfrm>
+              <a:off x="1985818" y="3157647"/>
+              <a:ext cx="6480000" cy="540000"/>
+            </a:xfrm>
+            <a:prstGeom prst="rect">
+              <a:avLst/>
+            </a:prstGeom>
+            <a:noFill/>
+            <a:ln>
+              <a:solidFill>
+                <a:schemeClr val="bg1"/>
+              </a:solidFill>
+            </a:ln>
+          </p:spPr>
+          <p:style>
+            <a:lnRef idx="2">
+              <a:schemeClr val="accent1">
+                <a:shade val="15000"/>
+              </a:schemeClr>
+            </a:lnRef>
+            <a:fillRef idx="1">
+              <a:schemeClr val="accent1"/>
+            </a:fillRef>
+            <a:effectRef idx="0">
+              <a:schemeClr val="accent1"/>
+            </a:effectRef>
+            <a:fontRef idx="minor">
+              <a:schemeClr val="lt1"/>
+            </a:fontRef>
+          </p:style>
+          <p:txBody>
+            <a:bodyPr rtlCol="0" anchor="ctr"/>
+            <a:lstStyle/>
+            <a:p>
+              <a:pPr algn="ctr"/>
+              <a:endParaRPr lang="ko-KR" altLang="en-US"/>
+            </a:p>
+          </p:txBody>
+        </p:sp>
+        <p:grpSp>
+          <p:nvGrpSpPr>
+            <p:cNvPr id="43" name="그룹 42">
+              <a:extLst>
+                <a:ext uri="{FF2B5EF4-FFF2-40B4-BE49-F238E27FC236}">
+                  <a16:creationId xmlns:a16="http://schemas.microsoft.com/office/drawing/2014/main" id="{073BD134-735C-6ECF-B308-11B6CEEAAF1E}"/>
+                </a:ext>
+              </a:extLst>
+            </p:cNvPr>
+            <p:cNvGrpSpPr/>
+            <p:nvPr/>
+          </p:nvGrpSpPr>
+          <p:grpSpPr>
+            <a:xfrm>
+              <a:off x="2484280" y="3165309"/>
+              <a:ext cx="5483082" cy="136056"/>
+              <a:chOff x="2484280" y="3165309"/>
+              <a:chExt cx="5483082" cy="136056"/>
+            </a:xfrm>
+          </p:grpSpPr>
+          <p:cxnSp>
+            <p:nvCxnSpPr>
+              <p:cNvPr id="12" name="직선 연결선 11">
+                <a:extLst>
+                  <a:ext uri="{FF2B5EF4-FFF2-40B4-BE49-F238E27FC236}">
+                    <a16:creationId xmlns:a16="http://schemas.microsoft.com/office/drawing/2014/main" id="{BA4A2F7E-9DA8-D6BD-0EEE-A8E7114CA5D3}"/>
+                  </a:ext>
+                </a:extLst>
+              </p:cNvPr>
+              <p:cNvCxnSpPr>
+                <a:cxnSpLocks/>
+              </p:cNvCxnSpPr>
+              <p:nvPr/>
+            </p:nvCxnSpPr>
+            <p:spPr>
+              <a:xfrm>
+                <a:off x="2484280" y="3165309"/>
+                <a:ext cx="0" cy="136056"/>
+              </a:xfrm>
+              <a:prstGeom prst="line">
+                <a:avLst/>
+              </a:prstGeom>
+              <a:ln>
+                <a:solidFill>
+                  <a:schemeClr val="bg1"/>
+                </a:solidFill>
+              </a:ln>
+            </p:spPr>
+            <p:style>
+              <a:lnRef idx="2">
+                <a:schemeClr val="accent1"/>
+              </a:lnRef>
+              <a:fillRef idx="0">
+                <a:schemeClr val="accent1"/>
+              </a:fillRef>
+              <a:effectRef idx="1">
+                <a:schemeClr val="accent1"/>
+              </a:effectRef>
+              <a:fontRef idx="minor">
+                <a:schemeClr val="tx1"/>
+              </a:fontRef>
+            </p:style>
+          </p:cxnSp>
+          <p:cxnSp>
+            <p:nvCxnSpPr>
+              <p:cNvPr id="13" name="직선 연결선 12">
+                <a:extLst>
+                  <a:ext uri="{FF2B5EF4-FFF2-40B4-BE49-F238E27FC236}">
+                    <a16:creationId xmlns:a16="http://schemas.microsoft.com/office/drawing/2014/main" id="{929078FC-FACE-0E87-808F-AB499DB12295}"/>
+                  </a:ext>
+                </a:extLst>
+              </p:cNvPr>
+              <p:cNvCxnSpPr>
+                <a:cxnSpLocks/>
+              </p:cNvCxnSpPr>
+              <p:nvPr/>
+            </p:nvCxnSpPr>
+            <p:spPr>
+              <a:xfrm>
+                <a:off x="2982742" y="3165309"/>
+                <a:ext cx="0" cy="136056"/>
+              </a:xfrm>
+              <a:prstGeom prst="line">
+                <a:avLst/>
+              </a:prstGeom>
+              <a:ln>
+                <a:solidFill>
+                  <a:schemeClr val="bg1"/>
+                </a:solidFill>
+              </a:ln>
+            </p:spPr>
+            <p:style>
+              <a:lnRef idx="2">
+                <a:schemeClr val="accent1"/>
+              </a:lnRef>
+              <a:fillRef idx="0">
+                <a:schemeClr val="accent1"/>
+              </a:fillRef>
+              <a:effectRef idx="1">
+                <a:schemeClr val="accent1"/>
+              </a:effectRef>
+              <a:fontRef idx="minor">
+                <a:schemeClr val="tx1"/>
+              </a:fontRef>
+            </p:style>
+          </p:cxnSp>
+          <p:cxnSp>
+            <p:nvCxnSpPr>
+              <p:cNvPr id="14" name="직선 연결선 13">
+                <a:extLst>
+                  <a:ext uri="{FF2B5EF4-FFF2-40B4-BE49-F238E27FC236}">
+                    <a16:creationId xmlns:a16="http://schemas.microsoft.com/office/drawing/2014/main" id="{B6C19B47-7CFC-063D-A359-BFD0524BCA29}"/>
+                  </a:ext>
+                </a:extLst>
+              </p:cNvPr>
+              <p:cNvCxnSpPr>
+                <a:cxnSpLocks/>
+              </p:cNvCxnSpPr>
+              <p:nvPr/>
+            </p:nvCxnSpPr>
+            <p:spPr>
+              <a:xfrm>
+                <a:off x="3481204" y="3165309"/>
+                <a:ext cx="0" cy="136056"/>
+              </a:xfrm>
+              <a:prstGeom prst="line">
+                <a:avLst/>
+              </a:prstGeom>
+              <a:ln>
+                <a:solidFill>
+                  <a:schemeClr val="bg1"/>
+                </a:solidFill>
+              </a:ln>
+            </p:spPr>
+            <p:style>
+              <a:lnRef idx="2">
+                <a:schemeClr val="accent1"/>
+              </a:lnRef>
+              <a:fillRef idx="0">
+                <a:schemeClr val="accent1"/>
+              </a:fillRef>
+              <a:effectRef idx="1">
+                <a:schemeClr val="accent1"/>
+              </a:effectRef>
+              <a:fontRef idx="minor">
+                <a:schemeClr val="tx1"/>
+              </a:fontRef>
+            </p:style>
+          </p:cxnSp>
+          <p:cxnSp>
+            <p:nvCxnSpPr>
+              <p:cNvPr id="15" name="직선 연결선 14">
+                <a:extLst>
+                  <a:ext uri="{FF2B5EF4-FFF2-40B4-BE49-F238E27FC236}">
+                    <a16:creationId xmlns:a16="http://schemas.microsoft.com/office/drawing/2014/main" id="{CCE4821C-3134-ABB8-AA6D-B2BE01795260}"/>
+                  </a:ext>
+                </a:extLst>
+              </p:cNvPr>
+              <p:cNvCxnSpPr>
+                <a:cxnSpLocks/>
+              </p:cNvCxnSpPr>
+              <p:nvPr/>
+            </p:nvCxnSpPr>
+            <p:spPr>
+              <a:xfrm>
+                <a:off x="3979666" y="3165309"/>
+                <a:ext cx="0" cy="136056"/>
+              </a:xfrm>
+              <a:prstGeom prst="line">
+                <a:avLst/>
+              </a:prstGeom>
+              <a:ln>
+                <a:solidFill>
+                  <a:schemeClr val="bg1"/>
+                </a:solidFill>
+              </a:ln>
+            </p:spPr>
+            <p:style>
+              <a:lnRef idx="2">
+                <a:schemeClr val="accent1"/>
+              </a:lnRef>
+              <a:fillRef idx="0">
+                <a:schemeClr val="accent1"/>
+              </a:fillRef>
+              <a:effectRef idx="1">
+                <a:schemeClr val="accent1"/>
+              </a:effectRef>
+              <a:fontRef idx="minor">
+                <a:schemeClr val="tx1"/>
+              </a:fontRef>
+            </p:style>
+          </p:cxnSp>
+          <p:cxnSp>
+            <p:nvCxnSpPr>
+              <p:cNvPr id="16" name="직선 연결선 15">
+                <a:extLst>
+                  <a:ext uri="{FF2B5EF4-FFF2-40B4-BE49-F238E27FC236}">
+                    <a16:creationId xmlns:a16="http://schemas.microsoft.com/office/drawing/2014/main" id="{39EC6788-CEBE-3725-EE52-AFB9A2644363}"/>
+                  </a:ext>
+                </a:extLst>
+              </p:cNvPr>
+              <p:cNvCxnSpPr>
+                <a:cxnSpLocks/>
+              </p:cNvCxnSpPr>
+              <p:nvPr/>
+            </p:nvCxnSpPr>
+            <p:spPr>
+              <a:xfrm>
+                <a:off x="4478128" y="3165309"/>
+                <a:ext cx="0" cy="136056"/>
+              </a:xfrm>
+              <a:prstGeom prst="line">
+                <a:avLst/>
+              </a:prstGeom>
+              <a:ln>
+                <a:solidFill>
+                  <a:schemeClr val="bg1"/>
+                </a:solidFill>
+              </a:ln>
+            </p:spPr>
+            <p:style>
+              <a:lnRef idx="2">
+                <a:schemeClr val="accent1"/>
+              </a:lnRef>
+              <a:fillRef idx="0">
+                <a:schemeClr val="accent1"/>
+              </a:fillRef>
+              <a:effectRef idx="1">
+                <a:schemeClr val="accent1"/>
+              </a:effectRef>
+              <a:fontRef idx="minor">
+                <a:schemeClr val="tx1"/>
+              </a:fontRef>
+            </p:style>
+          </p:cxnSp>
+          <p:cxnSp>
+            <p:nvCxnSpPr>
+              <p:cNvPr id="17" name="직선 연결선 16">
+                <a:extLst>
+                  <a:ext uri="{FF2B5EF4-FFF2-40B4-BE49-F238E27FC236}">
+                    <a16:creationId xmlns:a16="http://schemas.microsoft.com/office/drawing/2014/main" id="{8A92F671-ED28-5D01-1755-B2E06CC102E5}"/>
+                  </a:ext>
+                </a:extLst>
+              </p:cNvPr>
+              <p:cNvCxnSpPr>
+                <a:cxnSpLocks/>
+              </p:cNvCxnSpPr>
+              <p:nvPr/>
+            </p:nvCxnSpPr>
+            <p:spPr>
+              <a:xfrm>
+                <a:off x="4976590" y="3165309"/>
+                <a:ext cx="0" cy="136056"/>
+              </a:xfrm>
+              <a:prstGeom prst="line">
+                <a:avLst/>
+              </a:prstGeom>
+              <a:ln>
+                <a:solidFill>
+                  <a:schemeClr val="bg1"/>
+                </a:solidFill>
+              </a:ln>
+            </p:spPr>
+            <p:style>
+              <a:lnRef idx="2">
+                <a:schemeClr val="accent1"/>
+              </a:lnRef>
+              <a:fillRef idx="0">
+                <a:schemeClr val="accent1"/>
+              </a:fillRef>
+              <a:effectRef idx="1">
+                <a:schemeClr val="accent1"/>
+              </a:effectRef>
+              <a:fontRef idx="minor">
+                <a:schemeClr val="tx1"/>
+              </a:fontRef>
+            </p:style>
+          </p:cxnSp>
+          <p:cxnSp>
+            <p:nvCxnSpPr>
+              <p:cNvPr id="18" name="직선 연결선 17">
+                <a:extLst>
+                  <a:ext uri="{FF2B5EF4-FFF2-40B4-BE49-F238E27FC236}">
+                    <a16:creationId xmlns:a16="http://schemas.microsoft.com/office/drawing/2014/main" id="{54609A4C-E74B-6314-4F88-7B428CF4BEE1}"/>
+                  </a:ext>
+                </a:extLst>
+              </p:cNvPr>
+              <p:cNvCxnSpPr>
+                <a:cxnSpLocks/>
+              </p:cNvCxnSpPr>
+              <p:nvPr/>
+            </p:nvCxnSpPr>
+            <p:spPr>
+              <a:xfrm>
+                <a:off x="5475052" y="3165309"/>
+                <a:ext cx="0" cy="136056"/>
+              </a:xfrm>
+              <a:prstGeom prst="line">
+                <a:avLst/>
+              </a:prstGeom>
+              <a:ln>
+                <a:solidFill>
+                  <a:schemeClr val="bg1"/>
+                </a:solidFill>
+              </a:ln>
+            </p:spPr>
+            <p:style>
+              <a:lnRef idx="2">
+                <a:schemeClr val="accent1"/>
+              </a:lnRef>
+              <a:fillRef idx="0">
+                <a:schemeClr val="accent1"/>
+              </a:fillRef>
+              <a:effectRef idx="1">
+                <a:schemeClr val="accent1"/>
+              </a:effectRef>
+              <a:fontRef idx="minor">
+                <a:schemeClr val="tx1"/>
+              </a:fontRef>
+            </p:style>
+          </p:cxnSp>
+          <p:cxnSp>
+            <p:nvCxnSpPr>
+              <p:cNvPr id="19" name="직선 연결선 18">
+                <a:extLst>
+                  <a:ext uri="{FF2B5EF4-FFF2-40B4-BE49-F238E27FC236}">
+                    <a16:creationId xmlns:a16="http://schemas.microsoft.com/office/drawing/2014/main" id="{9BEDD821-8643-DA6A-E86E-2B8C5683E0CE}"/>
+                  </a:ext>
+                </a:extLst>
+              </p:cNvPr>
+              <p:cNvCxnSpPr>
+                <a:cxnSpLocks/>
+              </p:cNvCxnSpPr>
+              <p:nvPr/>
+            </p:nvCxnSpPr>
+            <p:spPr>
+              <a:xfrm>
+                <a:off x="5973514" y="3165309"/>
+                <a:ext cx="0" cy="136056"/>
+              </a:xfrm>
+              <a:prstGeom prst="line">
+                <a:avLst/>
+              </a:prstGeom>
+              <a:ln>
+                <a:solidFill>
+                  <a:schemeClr val="bg1"/>
+                </a:solidFill>
+              </a:ln>
+            </p:spPr>
+            <p:style>
+              <a:lnRef idx="2">
+                <a:schemeClr val="accent1"/>
+              </a:lnRef>
+              <a:fillRef idx="0">
+                <a:schemeClr val="accent1"/>
+              </a:fillRef>
+              <a:effectRef idx="1">
+                <a:schemeClr val="accent1"/>
+              </a:effectRef>
+              <a:fontRef idx="minor">
+                <a:schemeClr val="tx1"/>
+              </a:fontRef>
+            </p:style>
+          </p:cxnSp>
+          <p:cxnSp>
+            <p:nvCxnSpPr>
+              <p:cNvPr id="20" name="직선 연결선 19">
+                <a:extLst>
+                  <a:ext uri="{FF2B5EF4-FFF2-40B4-BE49-F238E27FC236}">
+                    <a16:creationId xmlns:a16="http://schemas.microsoft.com/office/drawing/2014/main" id="{91D99A43-11BE-AC2E-F6ED-C0836B034AE7}"/>
+                  </a:ext>
+                </a:extLst>
+              </p:cNvPr>
+              <p:cNvCxnSpPr>
+                <a:cxnSpLocks/>
+              </p:cNvCxnSpPr>
+              <p:nvPr/>
+            </p:nvCxnSpPr>
+            <p:spPr>
+              <a:xfrm>
+                <a:off x="6471976" y="3165309"/>
+                <a:ext cx="0" cy="136056"/>
+              </a:xfrm>
+              <a:prstGeom prst="line">
+                <a:avLst/>
+              </a:prstGeom>
+              <a:ln>
+                <a:solidFill>
+                  <a:schemeClr val="bg1"/>
+                </a:solidFill>
+              </a:ln>
+            </p:spPr>
+            <p:style>
+              <a:lnRef idx="2">
+                <a:schemeClr val="accent1"/>
+              </a:lnRef>
+              <a:fillRef idx="0">
+                <a:schemeClr val="accent1"/>
+              </a:fillRef>
+              <a:effectRef idx="1">
+                <a:schemeClr val="accent1"/>
+              </a:effectRef>
+              <a:fontRef idx="minor">
+                <a:schemeClr val="tx1"/>
+              </a:fontRef>
+            </p:style>
+          </p:cxnSp>
+          <p:cxnSp>
+            <p:nvCxnSpPr>
+              <p:cNvPr id="21" name="직선 연결선 20">
+                <a:extLst>
+                  <a:ext uri="{FF2B5EF4-FFF2-40B4-BE49-F238E27FC236}">
+                    <a16:creationId xmlns:a16="http://schemas.microsoft.com/office/drawing/2014/main" id="{54D66B52-CC44-781D-8E85-C0118FDC7583}"/>
+                  </a:ext>
+                </a:extLst>
+              </p:cNvPr>
+              <p:cNvCxnSpPr>
+                <a:cxnSpLocks/>
+              </p:cNvCxnSpPr>
+              <p:nvPr/>
+            </p:nvCxnSpPr>
+            <p:spPr>
+              <a:xfrm>
+                <a:off x="6970438" y="3165309"/>
+                <a:ext cx="0" cy="136056"/>
+              </a:xfrm>
+              <a:prstGeom prst="line">
+                <a:avLst/>
+              </a:prstGeom>
+              <a:ln>
+                <a:solidFill>
+                  <a:schemeClr val="bg1"/>
+                </a:solidFill>
+              </a:ln>
+            </p:spPr>
+            <p:style>
+              <a:lnRef idx="2">
+                <a:schemeClr val="accent1"/>
+              </a:lnRef>
+              <a:fillRef idx="0">
+                <a:schemeClr val="accent1"/>
+              </a:fillRef>
+              <a:effectRef idx="1">
+                <a:schemeClr val="accent1"/>
+              </a:effectRef>
+              <a:fontRef idx="minor">
+                <a:schemeClr val="tx1"/>
+              </a:fontRef>
+            </p:style>
+          </p:cxnSp>
+          <p:cxnSp>
+            <p:nvCxnSpPr>
+              <p:cNvPr id="22" name="직선 연결선 21">
+                <a:extLst>
+                  <a:ext uri="{FF2B5EF4-FFF2-40B4-BE49-F238E27FC236}">
+                    <a16:creationId xmlns:a16="http://schemas.microsoft.com/office/drawing/2014/main" id="{540156ED-C8F3-61A2-739E-1E148F56692A}"/>
+                  </a:ext>
+                </a:extLst>
+              </p:cNvPr>
+              <p:cNvCxnSpPr>
+                <a:cxnSpLocks/>
+              </p:cNvCxnSpPr>
+              <p:nvPr/>
+            </p:nvCxnSpPr>
+            <p:spPr>
+              <a:xfrm>
+                <a:off x="7468900" y="3165309"/>
+                <a:ext cx="0" cy="136056"/>
+              </a:xfrm>
+              <a:prstGeom prst="line">
+                <a:avLst/>
+              </a:prstGeom>
+              <a:ln>
+                <a:solidFill>
+                  <a:schemeClr val="bg1"/>
+                </a:solidFill>
+              </a:ln>
+            </p:spPr>
+            <p:style>
+              <a:lnRef idx="2">
+                <a:schemeClr val="accent1"/>
+              </a:lnRef>
+              <a:fillRef idx="0">
+                <a:schemeClr val="accent1"/>
+              </a:fillRef>
+              <a:effectRef idx="1">
+                <a:schemeClr val="accent1"/>
+              </a:effectRef>
+              <a:fontRef idx="minor">
+                <a:schemeClr val="tx1"/>
+              </a:fontRef>
+            </p:style>
+          </p:cxnSp>
+          <p:cxnSp>
+            <p:nvCxnSpPr>
+              <p:cNvPr id="23" name="직선 연결선 22">
+                <a:extLst>
+                  <a:ext uri="{FF2B5EF4-FFF2-40B4-BE49-F238E27FC236}">
+                    <a16:creationId xmlns:a16="http://schemas.microsoft.com/office/drawing/2014/main" id="{B858390F-F9D1-FBC3-150F-AED8453901D1}"/>
+                  </a:ext>
+                </a:extLst>
+              </p:cNvPr>
+              <p:cNvCxnSpPr>
+                <a:cxnSpLocks/>
+              </p:cNvCxnSpPr>
+              <p:nvPr/>
+            </p:nvCxnSpPr>
+            <p:spPr>
+              <a:xfrm>
+                <a:off x="7967362" y="3165309"/>
+                <a:ext cx="0" cy="136056"/>
+              </a:xfrm>
+              <a:prstGeom prst="line">
+                <a:avLst/>
+              </a:prstGeom>
+              <a:ln>
+                <a:solidFill>
+                  <a:schemeClr val="bg1"/>
+                </a:solidFill>
+              </a:ln>
+            </p:spPr>
+            <p:style>
+              <a:lnRef idx="2">
+                <a:schemeClr val="accent1"/>
+              </a:lnRef>
+              <a:fillRef idx="0">
+                <a:schemeClr val="accent1"/>
+              </a:fillRef>
+              <a:effectRef idx="1">
+                <a:schemeClr val="accent1"/>
+              </a:effectRef>
+              <a:fontRef idx="minor">
+                <a:schemeClr val="tx1"/>
+              </a:fontRef>
+            </p:style>
+          </p:cxnSp>
+        </p:grpSp>
+        <p:grpSp>
+          <p:nvGrpSpPr>
+            <p:cNvPr id="42" name="그룹 41">
+              <a:extLst>
+                <a:ext uri="{FF2B5EF4-FFF2-40B4-BE49-F238E27FC236}">
+                  <a16:creationId xmlns:a16="http://schemas.microsoft.com/office/drawing/2014/main" id="{3C4D0591-A5F2-9A22-D8AB-2BA4EC46D6F0}"/>
+                </a:ext>
+              </a:extLst>
+            </p:cNvPr>
+            <p:cNvGrpSpPr/>
+            <p:nvPr/>
+          </p:nvGrpSpPr>
+          <p:grpSpPr>
+            <a:xfrm>
+              <a:off x="2321299" y="3296842"/>
+              <a:ext cx="5842729" cy="261610"/>
+              <a:chOff x="2313679" y="3242981"/>
+              <a:chExt cx="5842729" cy="261610"/>
+            </a:xfrm>
+          </p:grpSpPr>
+          <p:sp>
+            <p:nvSpPr>
+              <p:cNvPr id="30" name="TextBox 29">
+                <a:extLst>
+                  <a:ext uri="{FF2B5EF4-FFF2-40B4-BE49-F238E27FC236}">
+                    <a16:creationId xmlns:a16="http://schemas.microsoft.com/office/drawing/2014/main" id="{2E61A872-DF22-6CFD-5AD2-8BD05E54DFEB}"/>
+                  </a:ext>
+                </a:extLst>
+              </p:cNvPr>
+              <p:cNvSpPr txBox="1"/>
+              <p:nvPr/>
+            </p:nvSpPr>
+            <p:spPr>
+              <a:xfrm>
+                <a:off x="7776176" y="3242981"/>
+                <a:ext cx="380232" cy="261610"/>
+              </a:xfrm>
+              <a:prstGeom prst="rect">
+                <a:avLst/>
+              </a:prstGeom>
+              <a:noFill/>
+            </p:spPr>
+            <p:txBody>
+              <a:bodyPr wrap="none" rtlCol="0">
+                <a:spAutoFit/>
+              </a:bodyPr>
+              <a:lstStyle/>
+              <a:p>
+                <a:pPr algn="ctr"/>
+                <a:r>
+                  <a:rPr lang="en-US" altLang="ko-KR" sz="1100" dirty="0">
+                    <a:solidFill>
+                      <a:schemeClr val="bg1"/>
+                    </a:solidFill>
+                    <a:latin typeface="나눔고딕" panose="020D0604000000000000" pitchFamily="50" charset="-127"/>
+                    <a:ea typeface="나눔고딕" panose="020D0604000000000000" pitchFamily="50" charset="-127"/>
+                  </a:rPr>
+                  <a:t>A+</a:t>
+                </a:r>
+                <a:endParaRPr lang="ko-KR" altLang="en-US" sz="1100" dirty="0">
+                  <a:solidFill>
+                    <a:schemeClr val="bg1"/>
+                  </a:solidFill>
+                  <a:latin typeface="나눔고딕" panose="020D0604000000000000" pitchFamily="50" charset="-127"/>
+                  <a:ea typeface="나눔고딕" panose="020D0604000000000000" pitchFamily="50" charset="-127"/>
+                </a:endParaRPr>
+              </a:p>
+            </p:txBody>
+          </p:sp>
+          <p:sp>
+            <p:nvSpPr>
+              <p:cNvPr id="31" name="TextBox 30">
+                <a:extLst>
+                  <a:ext uri="{FF2B5EF4-FFF2-40B4-BE49-F238E27FC236}">
+                    <a16:creationId xmlns:a16="http://schemas.microsoft.com/office/drawing/2014/main" id="{C129BBA9-3FFB-3D61-E9B3-75F6BB168E16}"/>
+                  </a:ext>
+                </a:extLst>
+              </p:cNvPr>
+              <p:cNvSpPr txBox="1"/>
+              <p:nvPr/>
+            </p:nvSpPr>
+            <p:spPr>
+              <a:xfrm>
+                <a:off x="7277691" y="3242981"/>
+                <a:ext cx="380232" cy="261610"/>
+              </a:xfrm>
+              <a:prstGeom prst="rect">
+                <a:avLst/>
+              </a:prstGeom>
+              <a:noFill/>
+            </p:spPr>
+            <p:txBody>
+              <a:bodyPr wrap="none" rtlCol="0">
+                <a:spAutoFit/>
+              </a:bodyPr>
+              <a:lstStyle/>
+              <a:p>
+                <a:pPr algn="ctr"/>
+                <a:r>
+                  <a:rPr lang="en-US" altLang="ko-KR" sz="1100" dirty="0">
+                    <a:solidFill>
+                      <a:schemeClr val="bg1"/>
+                    </a:solidFill>
+                    <a:latin typeface="나눔고딕" panose="020D0604000000000000" pitchFamily="50" charset="-127"/>
+                    <a:ea typeface="나눔고딕" panose="020D0604000000000000" pitchFamily="50" charset="-127"/>
+                  </a:rPr>
+                  <a:t>A0</a:t>
+                </a:r>
+                <a:endParaRPr lang="ko-KR" altLang="en-US" sz="1100" dirty="0">
+                  <a:solidFill>
+                    <a:schemeClr val="bg1"/>
+                  </a:solidFill>
+                  <a:latin typeface="나눔고딕" panose="020D0604000000000000" pitchFamily="50" charset="-127"/>
+                  <a:ea typeface="나눔고딕" panose="020D0604000000000000" pitchFamily="50" charset="-127"/>
+                </a:endParaRPr>
+              </a:p>
+            </p:txBody>
+          </p:sp>
+          <p:sp>
+            <p:nvSpPr>
+              <p:cNvPr id="32" name="TextBox 31">
+                <a:extLst>
+                  <a:ext uri="{FF2B5EF4-FFF2-40B4-BE49-F238E27FC236}">
+                    <a16:creationId xmlns:a16="http://schemas.microsoft.com/office/drawing/2014/main" id="{C449EA73-7D6A-4233-E16E-37D5B85C3C3C}"/>
+                  </a:ext>
+                </a:extLst>
+              </p:cNvPr>
+              <p:cNvSpPr txBox="1"/>
+              <p:nvPr/>
+            </p:nvSpPr>
+            <p:spPr>
+              <a:xfrm>
+                <a:off x="6800045" y="3242981"/>
+                <a:ext cx="338554" cy="261610"/>
+              </a:xfrm>
+              <a:prstGeom prst="rect">
+                <a:avLst/>
+              </a:prstGeom>
+              <a:noFill/>
+            </p:spPr>
+            <p:txBody>
+              <a:bodyPr wrap="none" rtlCol="0">
+                <a:spAutoFit/>
+              </a:bodyPr>
+              <a:lstStyle/>
+              <a:p>
+                <a:pPr algn="ctr"/>
+                <a:r>
+                  <a:rPr lang="en-US" altLang="ko-KR" sz="1100" dirty="0">
+                    <a:solidFill>
+                      <a:schemeClr val="bg1"/>
+                    </a:solidFill>
+                    <a:latin typeface="나눔고딕" panose="020D0604000000000000" pitchFamily="50" charset="-127"/>
+                    <a:ea typeface="나눔고딕" panose="020D0604000000000000" pitchFamily="50" charset="-127"/>
+                  </a:rPr>
+                  <a:t>A-</a:t>
+                </a:r>
+                <a:endParaRPr lang="ko-KR" altLang="en-US" sz="1100" dirty="0">
+                  <a:solidFill>
+                    <a:schemeClr val="bg1"/>
+                  </a:solidFill>
+                  <a:latin typeface="나눔고딕" panose="020D0604000000000000" pitchFamily="50" charset="-127"/>
+                  <a:ea typeface="나눔고딕" panose="020D0604000000000000" pitchFamily="50" charset="-127"/>
+                </a:endParaRPr>
+              </a:p>
+            </p:txBody>
+          </p:sp>
+          <p:sp>
+            <p:nvSpPr>
+              <p:cNvPr id="33" name="TextBox 32">
+                <a:extLst>
+                  <a:ext uri="{FF2B5EF4-FFF2-40B4-BE49-F238E27FC236}">
+                    <a16:creationId xmlns:a16="http://schemas.microsoft.com/office/drawing/2014/main" id="{D0EAEEFB-2011-C2EF-C661-F344FF939E00}"/>
+                  </a:ext>
+                </a:extLst>
+              </p:cNvPr>
+              <p:cNvSpPr txBox="1"/>
+              <p:nvPr/>
+            </p:nvSpPr>
+            <p:spPr>
+              <a:xfrm>
+                <a:off x="3813142" y="3242981"/>
+                <a:ext cx="330540" cy="261610"/>
+              </a:xfrm>
+              <a:prstGeom prst="rect">
+                <a:avLst/>
+              </a:prstGeom>
+              <a:noFill/>
+            </p:spPr>
+            <p:txBody>
+              <a:bodyPr wrap="none" rtlCol="0">
+                <a:spAutoFit/>
+              </a:bodyPr>
+              <a:lstStyle/>
+              <a:p>
+                <a:pPr algn="ctr"/>
+                <a:r>
+                  <a:rPr lang="en-US" altLang="ko-KR" sz="1100" dirty="0">
+                    <a:solidFill>
+                      <a:schemeClr val="bg1"/>
+                    </a:solidFill>
+                    <a:latin typeface="나눔고딕" panose="020D0604000000000000" pitchFamily="50" charset="-127"/>
+                    <a:ea typeface="나눔고딕" panose="020D0604000000000000" pitchFamily="50" charset="-127"/>
+                  </a:rPr>
+                  <a:t>C-</a:t>
+                </a:r>
+                <a:endParaRPr lang="ko-KR" altLang="en-US" sz="1100" dirty="0">
+                  <a:solidFill>
+                    <a:schemeClr val="bg1"/>
+                  </a:solidFill>
+                  <a:latin typeface="나눔고딕" panose="020D0604000000000000" pitchFamily="50" charset="-127"/>
+                  <a:ea typeface="나눔고딕" panose="020D0604000000000000" pitchFamily="50" charset="-127"/>
+                </a:endParaRPr>
+              </a:p>
+            </p:txBody>
+          </p:sp>
+          <p:sp>
+            <p:nvSpPr>
+              <p:cNvPr id="34" name="TextBox 33">
+                <a:extLst>
+                  <a:ext uri="{FF2B5EF4-FFF2-40B4-BE49-F238E27FC236}">
+                    <a16:creationId xmlns:a16="http://schemas.microsoft.com/office/drawing/2014/main" id="{1C84BEF1-15ED-2F30-DD2D-ACDCF6BAE794}"/>
+                  </a:ext>
+                </a:extLst>
+              </p:cNvPr>
+              <p:cNvSpPr txBox="1"/>
+              <p:nvPr/>
+            </p:nvSpPr>
+            <p:spPr>
+              <a:xfrm>
+                <a:off x="6289537" y="3242981"/>
+                <a:ext cx="362600" cy="261610"/>
+              </a:xfrm>
+              <a:prstGeom prst="rect">
+                <a:avLst/>
+              </a:prstGeom>
+              <a:noFill/>
+            </p:spPr>
+            <p:txBody>
+              <a:bodyPr wrap="none" rtlCol="0">
+                <a:spAutoFit/>
+              </a:bodyPr>
+              <a:lstStyle/>
+              <a:p>
+                <a:pPr algn="ctr"/>
+                <a:r>
+                  <a:rPr lang="en-US" altLang="ko-KR" sz="1100" dirty="0">
+                    <a:solidFill>
+                      <a:schemeClr val="bg1"/>
+                    </a:solidFill>
+                    <a:latin typeface="나눔고딕" panose="020D0604000000000000" pitchFamily="50" charset="-127"/>
+                    <a:ea typeface="나눔고딕" panose="020D0604000000000000" pitchFamily="50" charset="-127"/>
+                  </a:rPr>
+                  <a:t>B+</a:t>
+                </a:r>
+                <a:endParaRPr lang="ko-KR" altLang="en-US" sz="1100" dirty="0">
+                  <a:solidFill>
+                    <a:schemeClr val="bg1"/>
+                  </a:solidFill>
+                  <a:latin typeface="나눔고딕" panose="020D0604000000000000" pitchFamily="50" charset="-127"/>
+                  <a:ea typeface="나눔고딕" panose="020D0604000000000000" pitchFamily="50" charset="-127"/>
+                </a:endParaRPr>
+              </a:p>
+            </p:txBody>
+          </p:sp>
+          <p:sp>
+            <p:nvSpPr>
+              <p:cNvPr id="35" name="TextBox 34">
+                <a:extLst>
+                  <a:ext uri="{FF2B5EF4-FFF2-40B4-BE49-F238E27FC236}">
+                    <a16:creationId xmlns:a16="http://schemas.microsoft.com/office/drawing/2014/main" id="{C867428B-1C8B-A446-A82B-1C146954F700}"/>
+                  </a:ext>
+                </a:extLst>
+              </p:cNvPr>
+              <p:cNvSpPr txBox="1"/>
+              <p:nvPr/>
+            </p:nvSpPr>
+            <p:spPr>
+              <a:xfrm>
+                <a:off x="4294796" y="3242981"/>
+                <a:ext cx="364202" cy="261610"/>
+              </a:xfrm>
+              <a:prstGeom prst="rect">
+                <a:avLst/>
+              </a:prstGeom>
+              <a:noFill/>
+            </p:spPr>
+            <p:txBody>
+              <a:bodyPr wrap="none" rtlCol="0">
+                <a:spAutoFit/>
+              </a:bodyPr>
+              <a:lstStyle/>
+              <a:p>
+                <a:pPr algn="ctr"/>
+                <a:r>
+                  <a:rPr lang="en-US" altLang="ko-KR" sz="1100" dirty="0">
+                    <a:solidFill>
+                      <a:schemeClr val="bg1"/>
+                    </a:solidFill>
+                    <a:latin typeface="나눔고딕" panose="020D0604000000000000" pitchFamily="50" charset="-127"/>
+                    <a:ea typeface="나눔고딕" panose="020D0604000000000000" pitchFamily="50" charset="-127"/>
+                  </a:rPr>
+                  <a:t>C0</a:t>
+                </a:r>
+                <a:endParaRPr lang="ko-KR" altLang="en-US" sz="1100" dirty="0">
+                  <a:solidFill>
+                    <a:schemeClr val="bg1"/>
+                  </a:solidFill>
+                  <a:latin typeface="나눔고딕" panose="020D0604000000000000" pitchFamily="50" charset="-127"/>
+                  <a:ea typeface="나눔고딕" panose="020D0604000000000000" pitchFamily="50" charset="-127"/>
+                </a:endParaRPr>
+              </a:p>
+            </p:txBody>
+          </p:sp>
+          <p:sp>
+            <p:nvSpPr>
+              <p:cNvPr id="36" name="TextBox 35">
+                <a:extLst>
+                  <a:ext uri="{FF2B5EF4-FFF2-40B4-BE49-F238E27FC236}">
+                    <a16:creationId xmlns:a16="http://schemas.microsoft.com/office/drawing/2014/main" id="{6EE8C69A-54E0-043A-DA68-6C4853360CA0}"/>
+                  </a:ext>
+                </a:extLst>
+              </p:cNvPr>
+              <p:cNvSpPr txBox="1"/>
+              <p:nvPr/>
+            </p:nvSpPr>
+            <p:spPr>
+              <a:xfrm>
+                <a:off x="5795060" y="3242981"/>
+                <a:ext cx="354584" cy="261610"/>
+              </a:xfrm>
+              <a:prstGeom prst="rect">
+                <a:avLst/>
+              </a:prstGeom>
+              <a:noFill/>
+            </p:spPr>
+            <p:txBody>
+              <a:bodyPr wrap="none" rtlCol="0">
+                <a:spAutoFit/>
+              </a:bodyPr>
+              <a:lstStyle/>
+              <a:p>
+                <a:pPr algn="ctr"/>
+                <a:r>
+                  <a:rPr lang="en-US" altLang="ko-KR" sz="1100" dirty="0">
+                    <a:solidFill>
+                      <a:schemeClr val="bg1"/>
+                    </a:solidFill>
+                    <a:latin typeface="나눔고딕" panose="020D0604000000000000" pitchFamily="50" charset="-127"/>
+                    <a:ea typeface="나눔고딕" panose="020D0604000000000000" pitchFamily="50" charset="-127"/>
+                  </a:rPr>
+                  <a:t>B0</a:t>
+                </a:r>
+                <a:endParaRPr lang="ko-KR" altLang="en-US" sz="1100" dirty="0">
+                  <a:solidFill>
+                    <a:schemeClr val="bg1"/>
+                  </a:solidFill>
+                  <a:latin typeface="나눔고딕" panose="020D0604000000000000" pitchFamily="50" charset="-127"/>
+                  <a:ea typeface="나눔고딕" panose="020D0604000000000000" pitchFamily="50" charset="-127"/>
+                </a:endParaRPr>
+              </a:p>
+            </p:txBody>
+          </p:sp>
+          <p:sp>
+            <p:nvSpPr>
+              <p:cNvPr id="37" name="TextBox 36">
+                <a:extLst>
+                  <a:ext uri="{FF2B5EF4-FFF2-40B4-BE49-F238E27FC236}">
+                    <a16:creationId xmlns:a16="http://schemas.microsoft.com/office/drawing/2014/main" id="{666D7E85-42A6-F6B5-5B50-4A14E7BF7EEA}"/>
+                  </a:ext>
+                </a:extLst>
+              </p:cNvPr>
+              <p:cNvSpPr txBox="1"/>
+              <p:nvPr/>
+            </p:nvSpPr>
+            <p:spPr>
+              <a:xfrm>
+                <a:off x="4789273" y="3242981"/>
+                <a:ext cx="372218" cy="261610"/>
+              </a:xfrm>
+              <a:prstGeom prst="rect">
+                <a:avLst/>
+              </a:prstGeom>
+              <a:noFill/>
+            </p:spPr>
+            <p:txBody>
+              <a:bodyPr wrap="none" rtlCol="0">
+                <a:spAutoFit/>
+              </a:bodyPr>
+              <a:lstStyle/>
+              <a:p>
+                <a:pPr algn="ctr"/>
+                <a:r>
+                  <a:rPr lang="en-US" altLang="ko-KR" sz="1100" dirty="0">
+                    <a:solidFill>
+                      <a:schemeClr val="bg1"/>
+                    </a:solidFill>
+                    <a:latin typeface="나눔고딕" panose="020D0604000000000000" pitchFamily="50" charset="-127"/>
+                    <a:ea typeface="나눔고딕" panose="020D0604000000000000" pitchFamily="50" charset="-127"/>
+                  </a:rPr>
+                  <a:t>C+</a:t>
+                </a:r>
+                <a:endParaRPr lang="ko-KR" altLang="en-US" sz="1100" dirty="0">
+                  <a:solidFill>
+                    <a:schemeClr val="bg1"/>
+                  </a:solidFill>
+                  <a:latin typeface="나눔고딕" panose="020D0604000000000000" pitchFamily="50" charset="-127"/>
+                  <a:ea typeface="나눔고딕" panose="020D0604000000000000" pitchFamily="50" charset="-127"/>
+                </a:endParaRPr>
+              </a:p>
+            </p:txBody>
+          </p:sp>
+          <p:sp>
+            <p:nvSpPr>
+              <p:cNvPr id="38" name="TextBox 37">
+                <a:extLst>
+                  <a:ext uri="{FF2B5EF4-FFF2-40B4-BE49-F238E27FC236}">
+                    <a16:creationId xmlns:a16="http://schemas.microsoft.com/office/drawing/2014/main" id="{EB8FBE91-1A31-95BA-579B-7366D5D1C056}"/>
+                  </a:ext>
+                </a:extLst>
+              </p:cNvPr>
+              <p:cNvSpPr txBox="1"/>
+              <p:nvPr/>
+            </p:nvSpPr>
+            <p:spPr>
+              <a:xfrm>
+                <a:off x="5313406" y="3242981"/>
+                <a:ext cx="320922" cy="261610"/>
+              </a:xfrm>
+              <a:prstGeom prst="rect">
+                <a:avLst/>
+              </a:prstGeom>
+              <a:noFill/>
+            </p:spPr>
+            <p:txBody>
+              <a:bodyPr wrap="none" rtlCol="0">
+                <a:spAutoFit/>
+              </a:bodyPr>
+              <a:lstStyle/>
+              <a:p>
+                <a:pPr algn="ctr"/>
+                <a:r>
+                  <a:rPr lang="en-US" altLang="ko-KR" sz="1100" dirty="0">
+                    <a:solidFill>
+                      <a:schemeClr val="bg1"/>
+                    </a:solidFill>
+                    <a:latin typeface="나눔고딕" panose="020D0604000000000000" pitchFamily="50" charset="-127"/>
+                    <a:ea typeface="나눔고딕" panose="020D0604000000000000" pitchFamily="50" charset="-127"/>
+                  </a:rPr>
+                  <a:t>B-</a:t>
+                </a:r>
+                <a:endParaRPr lang="ko-KR" altLang="en-US" sz="1100" dirty="0">
+                  <a:solidFill>
+                    <a:schemeClr val="bg1"/>
+                  </a:solidFill>
+                  <a:latin typeface="나눔고딕" panose="020D0604000000000000" pitchFamily="50" charset="-127"/>
+                  <a:ea typeface="나눔고딕" panose="020D0604000000000000" pitchFamily="50" charset="-127"/>
+                </a:endParaRPr>
+              </a:p>
+            </p:txBody>
+          </p:sp>
+          <p:sp>
+            <p:nvSpPr>
+              <p:cNvPr id="39" name="TextBox 38">
+                <a:extLst>
+                  <a:ext uri="{FF2B5EF4-FFF2-40B4-BE49-F238E27FC236}">
+                    <a16:creationId xmlns:a16="http://schemas.microsoft.com/office/drawing/2014/main" id="{D793EB64-2AA9-0C8D-0877-EB07A580D66B}"/>
+                  </a:ext>
+                </a:extLst>
+              </p:cNvPr>
+              <p:cNvSpPr txBox="1"/>
+              <p:nvPr/>
+            </p:nvSpPr>
+            <p:spPr>
+              <a:xfrm>
+                <a:off x="3289811" y="3242981"/>
+                <a:ext cx="380232" cy="261610"/>
+              </a:xfrm>
+              <a:prstGeom prst="rect">
+                <a:avLst/>
+              </a:prstGeom>
+              <a:noFill/>
+            </p:spPr>
+            <p:txBody>
+              <a:bodyPr wrap="none" rtlCol="0">
+                <a:spAutoFit/>
+              </a:bodyPr>
+              <a:lstStyle/>
+              <a:p>
+                <a:pPr algn="ctr"/>
+                <a:r>
+                  <a:rPr lang="en-US" altLang="ko-KR" sz="1100" dirty="0">
+                    <a:solidFill>
+                      <a:schemeClr val="bg1"/>
+                    </a:solidFill>
+                    <a:latin typeface="나눔고딕" panose="020D0604000000000000" pitchFamily="50" charset="-127"/>
+                    <a:ea typeface="나눔고딕" panose="020D0604000000000000" pitchFamily="50" charset="-127"/>
+                  </a:rPr>
+                  <a:t>D+</a:t>
+                </a:r>
+                <a:endParaRPr lang="ko-KR" altLang="en-US" sz="1100" dirty="0">
+                  <a:solidFill>
+                    <a:schemeClr val="bg1"/>
+                  </a:solidFill>
+                  <a:latin typeface="나눔고딕" panose="020D0604000000000000" pitchFamily="50" charset="-127"/>
+                  <a:ea typeface="나눔고딕" panose="020D0604000000000000" pitchFamily="50" charset="-127"/>
+                </a:endParaRPr>
+              </a:p>
+            </p:txBody>
+          </p:sp>
+          <p:sp>
+            <p:nvSpPr>
+              <p:cNvPr id="40" name="TextBox 39">
+                <a:extLst>
+                  <a:ext uri="{FF2B5EF4-FFF2-40B4-BE49-F238E27FC236}">
+                    <a16:creationId xmlns:a16="http://schemas.microsoft.com/office/drawing/2014/main" id="{3A7427F6-357A-4D17-B187-30E6C508B2B8}"/>
+                  </a:ext>
+                </a:extLst>
+              </p:cNvPr>
+              <p:cNvSpPr txBox="1"/>
+              <p:nvPr/>
+            </p:nvSpPr>
+            <p:spPr>
+              <a:xfrm>
+                <a:off x="2313679" y="3242981"/>
+                <a:ext cx="338555" cy="261610"/>
+              </a:xfrm>
+              <a:prstGeom prst="rect">
+                <a:avLst/>
+              </a:prstGeom>
+              <a:noFill/>
+            </p:spPr>
+            <p:txBody>
+              <a:bodyPr wrap="none" rtlCol="0">
+                <a:spAutoFit/>
+              </a:bodyPr>
+              <a:lstStyle/>
+              <a:p>
+                <a:pPr algn="ctr"/>
+                <a:r>
+                  <a:rPr lang="en-US" altLang="ko-KR" sz="1100" dirty="0">
+                    <a:solidFill>
+                      <a:schemeClr val="bg1"/>
+                    </a:solidFill>
+                    <a:latin typeface="나눔고딕" panose="020D0604000000000000" pitchFamily="50" charset="-127"/>
+                    <a:ea typeface="나눔고딕" panose="020D0604000000000000" pitchFamily="50" charset="-127"/>
+                  </a:rPr>
+                  <a:t>D-</a:t>
+                </a:r>
+                <a:endParaRPr lang="ko-KR" altLang="en-US" sz="1100" dirty="0">
+                  <a:solidFill>
+                    <a:schemeClr val="bg1"/>
+                  </a:solidFill>
+                  <a:latin typeface="나눔고딕" panose="020D0604000000000000" pitchFamily="50" charset="-127"/>
+                  <a:ea typeface="나눔고딕" panose="020D0604000000000000" pitchFamily="50" charset="-127"/>
+                </a:endParaRPr>
+              </a:p>
+            </p:txBody>
+          </p:sp>
+          <p:sp>
+            <p:nvSpPr>
+              <p:cNvPr id="41" name="TextBox 40">
+                <a:extLst>
+                  <a:ext uri="{FF2B5EF4-FFF2-40B4-BE49-F238E27FC236}">
+                    <a16:creationId xmlns:a16="http://schemas.microsoft.com/office/drawing/2014/main" id="{8EB99760-5306-9830-8496-842CD40E7E0E}"/>
+                  </a:ext>
+                </a:extLst>
+              </p:cNvPr>
+              <p:cNvSpPr txBox="1"/>
+              <p:nvPr/>
+            </p:nvSpPr>
+            <p:spPr>
+              <a:xfrm>
+                <a:off x="2795333" y="3242981"/>
+                <a:ext cx="372218" cy="261610"/>
+              </a:xfrm>
+              <a:prstGeom prst="rect">
+                <a:avLst/>
+              </a:prstGeom>
+              <a:noFill/>
+            </p:spPr>
+            <p:txBody>
+              <a:bodyPr wrap="none" rtlCol="0">
+                <a:spAutoFit/>
+              </a:bodyPr>
+              <a:lstStyle/>
+              <a:p>
+                <a:pPr algn="ctr"/>
+                <a:r>
+                  <a:rPr lang="en-US" altLang="ko-KR" sz="1100" dirty="0">
+                    <a:solidFill>
+                      <a:schemeClr val="bg1"/>
+                    </a:solidFill>
+                    <a:latin typeface="나눔고딕" panose="020D0604000000000000" pitchFamily="50" charset="-127"/>
+                    <a:ea typeface="나눔고딕" panose="020D0604000000000000" pitchFamily="50" charset="-127"/>
+                  </a:rPr>
+                  <a:t>D0</a:t>
+                </a:r>
+                <a:endParaRPr lang="ko-KR" altLang="en-US" sz="1100" dirty="0">
+                  <a:solidFill>
+                    <a:schemeClr val="bg1"/>
+                  </a:solidFill>
+                  <a:latin typeface="나눔고딕" panose="020D0604000000000000" pitchFamily="50" charset="-127"/>
+                  <a:ea typeface="나눔고딕" panose="020D0604000000000000" pitchFamily="50" charset="-127"/>
+                </a:endParaRPr>
+              </a:p>
+            </p:txBody>
+          </p:sp>
+        </p:grpSp>
+        <p:grpSp>
+          <p:nvGrpSpPr>
+            <p:cNvPr id="44" name="그룹 43">
+              <a:extLst>
+                <a:ext uri="{FF2B5EF4-FFF2-40B4-BE49-F238E27FC236}">
+                  <a16:creationId xmlns:a16="http://schemas.microsoft.com/office/drawing/2014/main" id="{EF53B920-BA70-8F29-026D-205B72435B99}"/>
+                </a:ext>
+              </a:extLst>
+            </p:cNvPr>
+            <p:cNvGrpSpPr/>
+            <p:nvPr/>
+          </p:nvGrpSpPr>
+          <p:grpSpPr>
+            <a:xfrm>
+              <a:off x="2482956" y="3561591"/>
+              <a:ext cx="5483082" cy="136056"/>
+              <a:chOff x="2484280" y="3165309"/>
+              <a:chExt cx="5483082" cy="136056"/>
+            </a:xfrm>
+          </p:grpSpPr>
+          <p:cxnSp>
+            <p:nvCxnSpPr>
+              <p:cNvPr id="45" name="직선 연결선 44">
+                <a:extLst>
+                  <a:ext uri="{FF2B5EF4-FFF2-40B4-BE49-F238E27FC236}">
+                    <a16:creationId xmlns:a16="http://schemas.microsoft.com/office/drawing/2014/main" id="{78AA30D3-4E3B-F86C-672D-AC2F4148A8B6}"/>
+                  </a:ext>
+                </a:extLst>
+              </p:cNvPr>
+              <p:cNvCxnSpPr>
+                <a:cxnSpLocks/>
+              </p:cNvCxnSpPr>
+              <p:nvPr/>
+            </p:nvCxnSpPr>
+            <p:spPr>
+              <a:xfrm>
+                <a:off x="2484280" y="3165309"/>
+                <a:ext cx="0" cy="136056"/>
+              </a:xfrm>
+              <a:prstGeom prst="line">
+                <a:avLst/>
+              </a:prstGeom>
+              <a:ln>
+                <a:solidFill>
+                  <a:schemeClr val="bg1"/>
+                </a:solidFill>
+              </a:ln>
+            </p:spPr>
+            <p:style>
+              <a:lnRef idx="2">
+                <a:schemeClr val="accent1"/>
+              </a:lnRef>
+              <a:fillRef idx="0">
+                <a:schemeClr val="accent1"/>
+              </a:fillRef>
+              <a:effectRef idx="1">
+                <a:schemeClr val="accent1"/>
+              </a:effectRef>
+              <a:fontRef idx="minor">
+                <a:schemeClr val="tx1"/>
+              </a:fontRef>
+            </p:style>
+          </p:cxnSp>
+          <p:cxnSp>
+            <p:nvCxnSpPr>
+              <p:cNvPr id="46" name="직선 연결선 45">
+                <a:extLst>
+                  <a:ext uri="{FF2B5EF4-FFF2-40B4-BE49-F238E27FC236}">
+                    <a16:creationId xmlns:a16="http://schemas.microsoft.com/office/drawing/2014/main" id="{2E1E2829-7D6E-6F4B-F0E8-3ABCC7D3AB22}"/>
+                  </a:ext>
+                </a:extLst>
+              </p:cNvPr>
+              <p:cNvCxnSpPr>
+                <a:cxnSpLocks/>
+              </p:cNvCxnSpPr>
+              <p:nvPr/>
+            </p:nvCxnSpPr>
+            <p:spPr>
+              <a:xfrm>
+                <a:off x="2982742" y="3165309"/>
+                <a:ext cx="0" cy="136056"/>
+              </a:xfrm>
+              <a:prstGeom prst="line">
+                <a:avLst/>
+              </a:prstGeom>
+              <a:ln>
+                <a:solidFill>
+                  <a:schemeClr val="bg1"/>
+                </a:solidFill>
+              </a:ln>
+            </p:spPr>
+            <p:style>
+              <a:lnRef idx="2">
+                <a:schemeClr val="accent1"/>
+              </a:lnRef>
+              <a:fillRef idx="0">
+                <a:schemeClr val="accent1"/>
+              </a:fillRef>
+              <a:effectRef idx="1">
+                <a:schemeClr val="accent1"/>
+              </a:effectRef>
+              <a:fontRef idx="minor">
+                <a:schemeClr val="tx1"/>
+              </a:fontRef>
+            </p:style>
+          </p:cxnSp>
+          <p:cxnSp>
+            <p:nvCxnSpPr>
+              <p:cNvPr id="47" name="직선 연결선 46">
+                <a:extLst>
+                  <a:ext uri="{FF2B5EF4-FFF2-40B4-BE49-F238E27FC236}">
+                    <a16:creationId xmlns:a16="http://schemas.microsoft.com/office/drawing/2014/main" id="{9D5CFFC0-0E1F-960A-D337-91CBFD0CE795}"/>
+                  </a:ext>
+                </a:extLst>
+              </p:cNvPr>
+              <p:cNvCxnSpPr>
+                <a:cxnSpLocks/>
+              </p:cNvCxnSpPr>
+              <p:nvPr/>
+            </p:nvCxnSpPr>
+            <p:spPr>
+              <a:xfrm>
+                <a:off x="3481204" y="3165309"/>
+                <a:ext cx="0" cy="136056"/>
+              </a:xfrm>
+              <a:prstGeom prst="line">
+                <a:avLst/>
+              </a:prstGeom>
+              <a:ln>
+                <a:solidFill>
+                  <a:schemeClr val="bg1"/>
+                </a:solidFill>
+              </a:ln>
+            </p:spPr>
+            <p:style>
+              <a:lnRef idx="2">
+                <a:schemeClr val="accent1"/>
+              </a:lnRef>
+              <a:fillRef idx="0">
+                <a:schemeClr val="accent1"/>
+              </a:fillRef>
+              <a:effectRef idx="1">
+                <a:schemeClr val="accent1"/>
+              </a:effectRef>
+              <a:fontRef idx="minor">
+                <a:schemeClr val="tx1"/>
+              </a:fontRef>
+            </p:style>
+          </p:cxnSp>
+          <p:cxnSp>
+            <p:nvCxnSpPr>
+              <p:cNvPr id="48" name="직선 연결선 47">
+                <a:extLst>
+                  <a:ext uri="{FF2B5EF4-FFF2-40B4-BE49-F238E27FC236}">
+                    <a16:creationId xmlns:a16="http://schemas.microsoft.com/office/drawing/2014/main" id="{39CE4163-7375-F01F-3AB9-F710C7484EEE}"/>
+                  </a:ext>
+                </a:extLst>
+              </p:cNvPr>
+              <p:cNvCxnSpPr>
+                <a:cxnSpLocks/>
+              </p:cNvCxnSpPr>
+              <p:nvPr/>
+            </p:nvCxnSpPr>
+            <p:spPr>
+              <a:xfrm>
+                <a:off x="3979666" y="3165309"/>
+                <a:ext cx="0" cy="136056"/>
+              </a:xfrm>
+              <a:prstGeom prst="line">
+                <a:avLst/>
+              </a:prstGeom>
+              <a:ln>
+                <a:solidFill>
+                  <a:schemeClr val="bg1"/>
+                </a:solidFill>
+              </a:ln>
+            </p:spPr>
+            <p:style>
+              <a:lnRef idx="2">
+                <a:schemeClr val="accent1"/>
+              </a:lnRef>
+              <a:fillRef idx="0">
+                <a:schemeClr val="accent1"/>
+              </a:fillRef>
+              <a:effectRef idx="1">
+                <a:schemeClr val="accent1"/>
+              </a:effectRef>
+              <a:fontRef idx="minor">
+                <a:schemeClr val="tx1"/>
+              </a:fontRef>
+            </p:style>
+          </p:cxnSp>
+          <p:cxnSp>
+            <p:nvCxnSpPr>
+              <p:cNvPr id="49" name="직선 연결선 48">
+                <a:extLst>
+                  <a:ext uri="{FF2B5EF4-FFF2-40B4-BE49-F238E27FC236}">
+                    <a16:creationId xmlns:a16="http://schemas.microsoft.com/office/drawing/2014/main" id="{0DD00202-1F56-0B6F-0B8A-48F046A85209}"/>
+                  </a:ext>
+                </a:extLst>
+              </p:cNvPr>
+              <p:cNvCxnSpPr>
+                <a:cxnSpLocks/>
+              </p:cNvCxnSpPr>
+              <p:nvPr/>
+            </p:nvCxnSpPr>
+            <p:spPr>
+              <a:xfrm>
+                <a:off x="4478128" y="3165309"/>
+                <a:ext cx="0" cy="136056"/>
+              </a:xfrm>
+              <a:prstGeom prst="line">
+                <a:avLst/>
+              </a:prstGeom>
+              <a:ln>
+                <a:solidFill>
+                  <a:schemeClr val="bg1"/>
+                </a:solidFill>
+              </a:ln>
+            </p:spPr>
+            <p:style>
+              <a:lnRef idx="2">
+                <a:schemeClr val="accent1"/>
+              </a:lnRef>
+              <a:fillRef idx="0">
+                <a:schemeClr val="accent1"/>
+              </a:fillRef>
+              <a:effectRef idx="1">
+                <a:schemeClr val="accent1"/>
+              </a:effectRef>
+              <a:fontRef idx="minor">
+                <a:schemeClr val="tx1"/>
+              </a:fontRef>
+            </p:style>
+          </p:cxnSp>
+          <p:cxnSp>
+            <p:nvCxnSpPr>
+              <p:cNvPr id="50" name="직선 연결선 49">
+                <a:extLst>
+                  <a:ext uri="{FF2B5EF4-FFF2-40B4-BE49-F238E27FC236}">
+                    <a16:creationId xmlns:a16="http://schemas.microsoft.com/office/drawing/2014/main" id="{E6EAD31F-0741-17B3-2A9D-F271D18E5A31}"/>
+                  </a:ext>
+                </a:extLst>
+              </p:cNvPr>
+              <p:cNvCxnSpPr>
+                <a:cxnSpLocks/>
+              </p:cNvCxnSpPr>
+              <p:nvPr/>
+            </p:nvCxnSpPr>
+            <p:spPr>
+              <a:xfrm>
+                <a:off x="4976590" y="3165309"/>
+                <a:ext cx="0" cy="136056"/>
+              </a:xfrm>
+              <a:prstGeom prst="line">
+                <a:avLst/>
+              </a:prstGeom>
+              <a:ln>
+                <a:solidFill>
+                  <a:schemeClr val="bg1"/>
+                </a:solidFill>
+              </a:ln>
+            </p:spPr>
+            <p:style>
+              <a:lnRef idx="2">
+                <a:schemeClr val="accent1"/>
+              </a:lnRef>
+              <a:fillRef idx="0">
+                <a:schemeClr val="accent1"/>
+              </a:fillRef>
+              <a:effectRef idx="1">
+                <a:schemeClr val="accent1"/>
+              </a:effectRef>
+              <a:fontRef idx="minor">
+                <a:schemeClr val="tx1"/>
+              </a:fontRef>
+            </p:style>
+          </p:cxnSp>
+          <p:cxnSp>
+            <p:nvCxnSpPr>
+              <p:cNvPr id="51" name="직선 연결선 50">
+                <a:extLst>
+                  <a:ext uri="{FF2B5EF4-FFF2-40B4-BE49-F238E27FC236}">
+                    <a16:creationId xmlns:a16="http://schemas.microsoft.com/office/drawing/2014/main" id="{03791620-A5DE-A7AD-2EAF-432F81348BF4}"/>
+                  </a:ext>
+                </a:extLst>
+              </p:cNvPr>
+              <p:cNvCxnSpPr>
+                <a:cxnSpLocks/>
+              </p:cNvCxnSpPr>
+              <p:nvPr/>
+            </p:nvCxnSpPr>
+            <p:spPr>
+              <a:xfrm>
+                <a:off x="5475052" y="3165309"/>
+                <a:ext cx="0" cy="136056"/>
+              </a:xfrm>
+              <a:prstGeom prst="line">
+                <a:avLst/>
+              </a:prstGeom>
+              <a:ln>
+                <a:solidFill>
+                  <a:schemeClr val="bg1"/>
+                </a:solidFill>
+              </a:ln>
+            </p:spPr>
+            <p:style>
+              <a:lnRef idx="2">
+                <a:schemeClr val="accent1"/>
+              </a:lnRef>
+              <a:fillRef idx="0">
+                <a:schemeClr val="accent1"/>
+              </a:fillRef>
+              <a:effectRef idx="1">
+                <a:schemeClr val="accent1"/>
+              </a:effectRef>
+              <a:fontRef idx="minor">
+                <a:schemeClr val="tx1"/>
+              </a:fontRef>
+            </p:style>
+          </p:cxnSp>
+          <p:cxnSp>
+            <p:nvCxnSpPr>
+              <p:cNvPr id="52" name="직선 연결선 51">
+                <a:extLst>
+                  <a:ext uri="{FF2B5EF4-FFF2-40B4-BE49-F238E27FC236}">
+                    <a16:creationId xmlns:a16="http://schemas.microsoft.com/office/drawing/2014/main" id="{31D2F66F-7A12-DA01-F7A2-3B8BC216249A}"/>
+                  </a:ext>
+                </a:extLst>
+              </p:cNvPr>
+              <p:cNvCxnSpPr>
+                <a:cxnSpLocks/>
+              </p:cNvCxnSpPr>
+              <p:nvPr/>
+            </p:nvCxnSpPr>
+            <p:spPr>
+              <a:xfrm>
+                <a:off x="5973514" y="3165309"/>
+                <a:ext cx="0" cy="136056"/>
+              </a:xfrm>
+              <a:prstGeom prst="line">
+                <a:avLst/>
+              </a:prstGeom>
+              <a:ln>
+                <a:solidFill>
+                  <a:schemeClr val="bg1"/>
+                </a:solidFill>
+              </a:ln>
+            </p:spPr>
+            <p:style>
+              <a:lnRef idx="2">
+                <a:schemeClr val="accent1"/>
+              </a:lnRef>
+              <a:fillRef idx="0">
+                <a:schemeClr val="accent1"/>
+              </a:fillRef>
+              <a:effectRef idx="1">
+                <a:schemeClr val="accent1"/>
+              </a:effectRef>
+              <a:fontRef idx="minor">
+                <a:schemeClr val="tx1"/>
+              </a:fontRef>
+            </p:style>
+          </p:cxnSp>
+          <p:cxnSp>
+            <p:nvCxnSpPr>
+              <p:cNvPr id="53" name="직선 연결선 52">
+                <a:extLst>
+                  <a:ext uri="{FF2B5EF4-FFF2-40B4-BE49-F238E27FC236}">
+                    <a16:creationId xmlns:a16="http://schemas.microsoft.com/office/drawing/2014/main" id="{F7A2D7E8-5CFA-4501-7806-EDE7BE82D409}"/>
+                  </a:ext>
+                </a:extLst>
+              </p:cNvPr>
+              <p:cNvCxnSpPr>
+                <a:cxnSpLocks/>
+              </p:cNvCxnSpPr>
+              <p:nvPr/>
+            </p:nvCxnSpPr>
+            <p:spPr>
+              <a:xfrm>
+                <a:off x="6471976" y="3165309"/>
+                <a:ext cx="0" cy="136056"/>
+              </a:xfrm>
+              <a:prstGeom prst="line">
+                <a:avLst/>
+              </a:prstGeom>
+              <a:ln>
+                <a:solidFill>
+                  <a:schemeClr val="bg1"/>
+                </a:solidFill>
+              </a:ln>
+            </p:spPr>
+            <p:style>
+              <a:lnRef idx="2">
+                <a:schemeClr val="accent1"/>
+              </a:lnRef>
+              <a:fillRef idx="0">
+                <a:schemeClr val="accent1"/>
+              </a:fillRef>
+              <a:effectRef idx="1">
+                <a:schemeClr val="accent1"/>
+              </a:effectRef>
+              <a:fontRef idx="minor">
+                <a:schemeClr val="tx1"/>
+              </a:fontRef>
+            </p:style>
+          </p:cxnSp>
+          <p:cxnSp>
+            <p:nvCxnSpPr>
+              <p:cNvPr id="54" name="직선 연결선 53">
+                <a:extLst>
+                  <a:ext uri="{FF2B5EF4-FFF2-40B4-BE49-F238E27FC236}">
+                    <a16:creationId xmlns:a16="http://schemas.microsoft.com/office/drawing/2014/main" id="{4C6143E3-FAEF-19F7-A49C-58369289F788}"/>
+                  </a:ext>
+                </a:extLst>
+              </p:cNvPr>
+              <p:cNvCxnSpPr>
+                <a:cxnSpLocks/>
+              </p:cNvCxnSpPr>
+              <p:nvPr/>
+            </p:nvCxnSpPr>
+            <p:spPr>
+              <a:xfrm>
+                <a:off x="6970438" y="3165309"/>
+                <a:ext cx="0" cy="136056"/>
+              </a:xfrm>
+              <a:prstGeom prst="line">
+                <a:avLst/>
+              </a:prstGeom>
+              <a:ln>
+                <a:solidFill>
+                  <a:schemeClr val="bg1"/>
+                </a:solidFill>
+              </a:ln>
+            </p:spPr>
+            <p:style>
+              <a:lnRef idx="2">
+                <a:schemeClr val="accent1"/>
+              </a:lnRef>
+              <a:fillRef idx="0">
+                <a:schemeClr val="accent1"/>
+              </a:fillRef>
+              <a:effectRef idx="1">
+                <a:schemeClr val="accent1"/>
+              </a:effectRef>
+              <a:fontRef idx="minor">
+                <a:schemeClr val="tx1"/>
+              </a:fontRef>
+            </p:style>
+          </p:cxnSp>
+          <p:cxnSp>
+            <p:nvCxnSpPr>
+              <p:cNvPr id="55" name="직선 연결선 54">
+                <a:extLst>
+                  <a:ext uri="{FF2B5EF4-FFF2-40B4-BE49-F238E27FC236}">
+                    <a16:creationId xmlns:a16="http://schemas.microsoft.com/office/drawing/2014/main" id="{2D6CC0B9-8713-2B0B-28AD-085D3C4EF6EA}"/>
+                  </a:ext>
+                </a:extLst>
+              </p:cNvPr>
+              <p:cNvCxnSpPr>
+                <a:cxnSpLocks/>
+              </p:cNvCxnSpPr>
+              <p:nvPr/>
+            </p:nvCxnSpPr>
+            <p:spPr>
+              <a:xfrm>
+                <a:off x="7468900" y="3165309"/>
+                <a:ext cx="0" cy="136056"/>
+              </a:xfrm>
+              <a:prstGeom prst="line">
+                <a:avLst/>
+              </a:prstGeom>
+              <a:ln>
+                <a:solidFill>
+                  <a:schemeClr val="bg1"/>
+                </a:solidFill>
+              </a:ln>
+            </p:spPr>
+            <p:style>
+              <a:lnRef idx="2">
+                <a:schemeClr val="accent1"/>
+              </a:lnRef>
+              <a:fillRef idx="0">
+                <a:schemeClr val="accent1"/>
+              </a:fillRef>
+              <a:effectRef idx="1">
+                <a:schemeClr val="accent1"/>
+              </a:effectRef>
+              <a:fontRef idx="minor">
+                <a:schemeClr val="tx1"/>
+              </a:fontRef>
+            </p:style>
+          </p:cxnSp>
+          <p:cxnSp>
+            <p:nvCxnSpPr>
+              <p:cNvPr id="56" name="직선 연결선 55">
+                <a:extLst>
+                  <a:ext uri="{FF2B5EF4-FFF2-40B4-BE49-F238E27FC236}">
+                    <a16:creationId xmlns:a16="http://schemas.microsoft.com/office/drawing/2014/main" id="{368ADB0C-C6F1-F6FD-347E-5E3602114A68}"/>
+                  </a:ext>
+                </a:extLst>
+              </p:cNvPr>
+              <p:cNvCxnSpPr>
+                <a:cxnSpLocks/>
+              </p:cNvCxnSpPr>
+              <p:nvPr/>
+            </p:nvCxnSpPr>
+            <p:spPr>
+              <a:xfrm>
+                <a:off x="7967362" y="3165309"/>
+                <a:ext cx="0" cy="136056"/>
+              </a:xfrm>
+              <a:prstGeom prst="line">
+                <a:avLst/>
+              </a:prstGeom>
+              <a:ln>
+                <a:solidFill>
+                  <a:schemeClr val="bg1"/>
+                </a:solidFill>
+              </a:ln>
+            </p:spPr>
+            <p:style>
+              <a:lnRef idx="2">
+                <a:schemeClr val="accent1"/>
+              </a:lnRef>
+              <a:fillRef idx="0">
+                <a:schemeClr val="accent1"/>
+              </a:fillRef>
+              <a:effectRef idx="1">
+                <a:schemeClr val="accent1"/>
+              </a:effectRef>
+              <a:fontRef idx="minor">
+                <a:schemeClr val="tx1"/>
+              </a:fontRef>
+            </p:style>
+          </p:cxnSp>
+        </p:grpSp>
+      </p:grpSp>
+      <p:sp>
+        <p:nvSpPr>
+          <p:cNvPr id="58" name="직사각형 57">
+            <a:extLst>
+              <a:ext uri="{FF2B5EF4-FFF2-40B4-BE49-F238E27FC236}">
+                <a16:creationId xmlns:a16="http://schemas.microsoft.com/office/drawing/2014/main" id="{920312B3-A4BE-29D9-0806-D70077FAB4AD}"/>
+              </a:ext>
+            </a:extLst>
+          </p:cNvPr>
+          <p:cNvSpPr/>
+          <p:nvPr/>
+        </p:nvSpPr>
+        <p:spPr>
+          <a:xfrm>
+            <a:off x="2080260" y="1905000"/>
+            <a:ext cx="6480000" cy="540000"/>
+          </a:xfrm>
+          <a:prstGeom prst="rect">
+            <a:avLst/>
+          </a:prstGeom>
+          <a:solidFill>
+            <a:srgbClr val="C00000"/>
+          </a:solidFill>
+          <a:ln>
+            <a:noFill/>
+          </a:ln>
+        </p:spPr>
+        <p:style>
+          <a:lnRef idx="2">
+            <a:schemeClr val="accent1">
+              <a:shade val="15000"/>
+            </a:schemeClr>
+          </a:lnRef>
+          <a:fillRef idx="1">
+            <a:schemeClr val="accent1"/>
+          </a:fillRef>
+          <a:effectRef idx="0">
+            <a:schemeClr val="accent1"/>
+          </a:effectRef>
+          <a:fontRef idx="minor">
+            <a:schemeClr val="lt1"/>
+          </a:fontRef>
+        </p:style>
+        <p:txBody>
+          <a:bodyPr rtlCol="0" anchor="ctr"/>
+          <a:lstStyle/>
+          <a:p>
+            <a:pPr algn="ctr"/>
+            <a:endParaRPr lang="ko-KR" altLang="en-US"/>
+          </a:p>
+        </p:txBody>
+      </p:sp>
+    </p:spTree>
+    <p:extLst>
+      <p:ext uri="{BB962C8B-B14F-4D97-AF65-F5344CB8AC3E}">
+        <p14:creationId xmlns:p14="http://schemas.microsoft.com/office/powerpoint/2010/main" val="2689940210"/>
       </p:ext>
     </p:extLst>
   </p:cSld>

</xml_diff>

<commit_message>
Feat #39 Speed Text and Gauge Working. Ending scene slightly changed
</commit_message>
<xml_diff>
--- a/RawImages/imagePPT.pptx
+++ b/RawImages/imagePPT.pptx
@@ -8,6 +8,8 @@
     <p:sldId id="256" r:id="rId2"/>
     <p:sldId id="257" r:id="rId3"/>
     <p:sldId id="258" r:id="rId4"/>
+    <p:sldId id="259" r:id="rId5"/>
+    <p:sldId id="260" r:id="rId6"/>
   </p:sldIdLst>
   <p:sldSz cx="12192000" cy="6858000"/>
   <p:notesSz cx="6858000" cy="9144000"/>
@@ -261,7 +263,7 @@
           <a:p>
             <a:fld id="{F3E3B444-461C-43DF-9895-EF8F91AA3F26}" type="datetimeFigureOut">
               <a:rPr lang="ko-KR" altLang="en-US" smtClean="0"/>
-              <a:t>2025-05-19</a:t>
+              <a:t>2025-05-24</a:t>
             </a:fld>
             <a:endParaRPr lang="ko-KR" altLang="en-US"/>
           </a:p>
@@ -459,7 +461,7 @@
           <a:p>
             <a:fld id="{F3E3B444-461C-43DF-9895-EF8F91AA3F26}" type="datetimeFigureOut">
               <a:rPr lang="ko-KR" altLang="en-US" smtClean="0"/>
-              <a:t>2025-05-19</a:t>
+              <a:t>2025-05-24</a:t>
             </a:fld>
             <a:endParaRPr lang="ko-KR" altLang="en-US"/>
           </a:p>
@@ -667,7 +669,7 @@
           <a:p>
             <a:fld id="{F3E3B444-461C-43DF-9895-EF8F91AA3F26}" type="datetimeFigureOut">
               <a:rPr lang="ko-KR" altLang="en-US" smtClean="0"/>
-              <a:t>2025-05-19</a:t>
+              <a:t>2025-05-24</a:t>
             </a:fld>
             <a:endParaRPr lang="ko-KR" altLang="en-US"/>
           </a:p>
@@ -865,7 +867,7 @@
           <a:p>
             <a:fld id="{F3E3B444-461C-43DF-9895-EF8F91AA3F26}" type="datetimeFigureOut">
               <a:rPr lang="ko-KR" altLang="en-US" smtClean="0"/>
-              <a:t>2025-05-19</a:t>
+              <a:t>2025-05-24</a:t>
             </a:fld>
             <a:endParaRPr lang="ko-KR" altLang="en-US"/>
           </a:p>
@@ -1140,7 +1142,7 @@
           <a:p>
             <a:fld id="{F3E3B444-461C-43DF-9895-EF8F91AA3F26}" type="datetimeFigureOut">
               <a:rPr lang="ko-KR" altLang="en-US" smtClean="0"/>
-              <a:t>2025-05-19</a:t>
+              <a:t>2025-05-24</a:t>
             </a:fld>
             <a:endParaRPr lang="ko-KR" altLang="en-US"/>
           </a:p>
@@ -1405,7 +1407,7 @@
           <a:p>
             <a:fld id="{F3E3B444-461C-43DF-9895-EF8F91AA3F26}" type="datetimeFigureOut">
               <a:rPr lang="ko-KR" altLang="en-US" smtClean="0"/>
-              <a:t>2025-05-19</a:t>
+              <a:t>2025-05-24</a:t>
             </a:fld>
             <a:endParaRPr lang="ko-KR" altLang="en-US"/>
           </a:p>
@@ -1817,7 +1819,7 @@
           <a:p>
             <a:fld id="{F3E3B444-461C-43DF-9895-EF8F91AA3F26}" type="datetimeFigureOut">
               <a:rPr lang="ko-KR" altLang="en-US" smtClean="0"/>
-              <a:t>2025-05-19</a:t>
+              <a:t>2025-05-24</a:t>
             </a:fld>
             <a:endParaRPr lang="ko-KR" altLang="en-US"/>
           </a:p>
@@ -1958,7 +1960,7 @@
           <a:p>
             <a:fld id="{F3E3B444-461C-43DF-9895-EF8F91AA3F26}" type="datetimeFigureOut">
               <a:rPr lang="ko-KR" altLang="en-US" smtClean="0"/>
-              <a:t>2025-05-19</a:t>
+              <a:t>2025-05-24</a:t>
             </a:fld>
             <a:endParaRPr lang="ko-KR" altLang="en-US"/>
           </a:p>
@@ -2071,7 +2073,7 @@
           <a:p>
             <a:fld id="{F3E3B444-461C-43DF-9895-EF8F91AA3F26}" type="datetimeFigureOut">
               <a:rPr lang="ko-KR" altLang="en-US" smtClean="0"/>
-              <a:t>2025-05-19</a:t>
+              <a:t>2025-05-24</a:t>
             </a:fld>
             <a:endParaRPr lang="ko-KR" altLang="en-US"/>
           </a:p>
@@ -2382,7 +2384,7 @@
           <a:p>
             <a:fld id="{F3E3B444-461C-43DF-9895-EF8F91AA3F26}" type="datetimeFigureOut">
               <a:rPr lang="ko-KR" altLang="en-US" smtClean="0"/>
-              <a:t>2025-05-19</a:t>
+              <a:t>2025-05-24</a:t>
             </a:fld>
             <a:endParaRPr lang="ko-KR" altLang="en-US"/>
           </a:p>
@@ -2670,7 +2672,7 @@
           <a:p>
             <a:fld id="{F3E3B444-461C-43DF-9895-EF8F91AA3F26}" type="datetimeFigureOut">
               <a:rPr lang="ko-KR" altLang="en-US" smtClean="0"/>
-              <a:t>2025-05-19</a:t>
+              <a:t>2025-05-24</a:t>
             </a:fld>
             <a:endParaRPr lang="ko-KR" altLang="en-US"/>
           </a:p>
@@ -2917,7 +2919,7 @@
           <a:p>
             <a:fld id="{F3E3B444-461C-43DF-9895-EF8F91AA3F26}" type="datetimeFigureOut">
               <a:rPr lang="ko-KR" altLang="en-US" smtClean="0"/>
-              <a:t>2025-05-19</a:t>
+              <a:t>2025-05-24</a:t>
             </a:fld>
             <a:endParaRPr lang="ko-KR" altLang="en-US"/>
           </a:p>
@@ -6503,6 +6505,1628 @@
 </p:sld>
 </file>
 
+<file path=ppt/slides/slide4.xml><?xml version="1.0" encoding="utf-8"?>
+<p:sld xmlns:a="http://schemas.openxmlformats.org/drawingml/2006/main" xmlns:r="http://schemas.openxmlformats.org/officeDocument/2006/relationships" xmlns:p="http://schemas.openxmlformats.org/presentationml/2006/main">
+  <p:cSld>
+    <p:spTree>
+      <p:nvGrpSpPr>
+        <p:cNvPr id="1" name=""/>
+        <p:cNvGrpSpPr/>
+        <p:nvPr/>
+      </p:nvGrpSpPr>
+      <p:grpSpPr>
+        <a:xfrm>
+          <a:off x="0" y="0"/>
+          <a:ext cx="0" cy="0"/>
+          <a:chOff x="0" y="0"/>
+          <a:chExt cx="0" cy="0"/>
+        </a:xfrm>
+      </p:grpSpPr>
+      <p:grpSp>
+        <p:nvGrpSpPr>
+          <p:cNvPr id="7" name="그룹 6">
+            <a:extLst>
+              <a:ext uri="{FF2B5EF4-FFF2-40B4-BE49-F238E27FC236}">
+                <a16:creationId xmlns:a16="http://schemas.microsoft.com/office/drawing/2014/main" id="{FC2B693A-B2FA-A2AB-69AB-893B74566C4F}"/>
+              </a:ext>
+            </a:extLst>
+          </p:cNvPr>
+          <p:cNvGrpSpPr/>
+          <p:nvPr/>
+        </p:nvGrpSpPr>
+        <p:grpSpPr>
+          <a:xfrm>
+            <a:off x="146658" y="185089"/>
+            <a:ext cx="4817166" cy="4472608"/>
+            <a:chOff x="2696818" y="967409"/>
+            <a:chExt cx="4817166" cy="4472608"/>
+          </a:xfrm>
+        </p:grpSpPr>
+        <p:pic>
+          <p:nvPicPr>
+            <p:cNvPr id="5" name="그림 4" descr="그래픽, 상징, 폰트, 로고이(가) 표시된 사진&#10;&#10;AI가 생성한 콘텐츠는 부정확할 수 있습니다.">
+              <a:extLst>
+                <a:ext uri="{FF2B5EF4-FFF2-40B4-BE49-F238E27FC236}">
+                  <a16:creationId xmlns:a16="http://schemas.microsoft.com/office/drawing/2014/main" id="{D7F4F8BE-60F5-6884-FA8F-E6A5CA7F5525}"/>
+                </a:ext>
+              </a:extLst>
+            </p:cNvPr>
+            <p:cNvPicPr>
+              <a:picLocks noChangeAspect="1"/>
+            </p:cNvPicPr>
+            <p:nvPr/>
+          </p:nvPicPr>
+          <p:blipFill>
+            <a:blip r:embed="rId2">
+              <a:extLst>
+                <a:ext uri="{BEBA8EAE-BF5A-486C-A8C5-ECC9F3942E4B}">
+                  <a14:imgProps xmlns:a14="http://schemas.microsoft.com/office/drawing/2010/main">
+                    <a14:imgLayer r:embed="rId3">
+                      <a14:imgEffect>
+                        <a14:backgroundRemoval t="10000" b="90000" l="10000" r="90000"/>
+                      </a14:imgEffect>
+                    </a14:imgLayer>
+                  </a14:imgProps>
+                </a:ext>
+                <a:ext uri="{28A0092B-C50C-407E-A947-70E740481C1C}">
+                  <a14:useLocalDpi xmlns:a14="http://schemas.microsoft.com/office/drawing/2010/main" val="0"/>
+                </a:ext>
+              </a:extLst>
+            </a:blip>
+            <a:srcRect l="14831" t="17391" r="14927" b="17391"/>
+            <a:stretch/>
+          </p:blipFill>
+          <p:spPr>
+            <a:xfrm>
+              <a:off x="2696818" y="967409"/>
+              <a:ext cx="4817166" cy="4472608"/>
+            </a:xfrm>
+            <a:prstGeom prst="rect">
+              <a:avLst/>
+            </a:prstGeom>
+          </p:spPr>
+        </p:pic>
+        <p:sp>
+          <p:nvSpPr>
+            <p:cNvPr id="6" name="TextBox 5">
+              <a:extLst>
+                <a:ext uri="{FF2B5EF4-FFF2-40B4-BE49-F238E27FC236}">
+                  <a16:creationId xmlns:a16="http://schemas.microsoft.com/office/drawing/2014/main" id="{A4950CBC-0A71-96ED-EFA8-F4B1A07FAD81}"/>
+                </a:ext>
+              </a:extLst>
+            </p:cNvPr>
+            <p:cNvSpPr txBox="1"/>
+            <p:nvPr/>
+          </p:nvSpPr>
+          <p:spPr>
+            <a:xfrm>
+              <a:off x="3547122" y="1192700"/>
+              <a:ext cx="3116559" cy="4247317"/>
+            </a:xfrm>
+            <a:prstGeom prst="rect">
+              <a:avLst/>
+            </a:prstGeom>
+            <a:noFill/>
+          </p:spPr>
+          <p:txBody>
+            <a:bodyPr wrap="none" rtlCol="0">
+              <a:spAutoFit/>
+            </a:bodyPr>
+            <a:lstStyle/>
+            <a:p>
+              <a:pPr algn="ctr"/>
+              <a:r>
+                <a:rPr lang="en-US" altLang="ko-KR" sz="27000" dirty="0">
+                  <a:solidFill>
+                    <a:srgbClr val="FD0000"/>
+                  </a:solidFill>
+                  <a:latin typeface="Yoon® 만세" panose="02020603020101020101" pitchFamily="18" charset="-127"/>
+                  <a:ea typeface="Yoon® 만세" panose="02020603020101020101" pitchFamily="18" charset="-127"/>
+                </a:rPr>
+                <a:t>A</a:t>
+              </a:r>
+              <a:r>
+                <a:rPr lang="en-US" altLang="ko-KR" sz="27000" baseline="30000" dirty="0">
+                  <a:solidFill>
+                    <a:srgbClr val="FD0000"/>
+                  </a:solidFill>
+                  <a:latin typeface="Yoon® 만세" panose="02020603020101020101" pitchFamily="18" charset="-127"/>
+                  <a:ea typeface="Yoon® 만세" panose="02020603020101020101" pitchFamily="18" charset="-127"/>
+                </a:rPr>
+                <a:t>+</a:t>
+              </a:r>
+              <a:endParaRPr lang="ko-KR" altLang="en-US" sz="27000" baseline="30000" dirty="0">
+                <a:solidFill>
+                  <a:srgbClr val="FD0000"/>
+                </a:solidFill>
+                <a:latin typeface="Yoon® 만세" panose="02020603020101020101" pitchFamily="18" charset="-127"/>
+                <a:ea typeface="Yoon® 만세" panose="02020603020101020101" pitchFamily="18" charset="-127"/>
+              </a:endParaRPr>
+            </a:p>
+          </p:txBody>
+        </p:sp>
+      </p:grpSp>
+      <p:grpSp>
+        <p:nvGrpSpPr>
+          <p:cNvPr id="8" name="그룹 7">
+            <a:extLst>
+              <a:ext uri="{FF2B5EF4-FFF2-40B4-BE49-F238E27FC236}">
+                <a16:creationId xmlns:a16="http://schemas.microsoft.com/office/drawing/2014/main" id="{A4E9A0AC-0BA3-2126-6236-1BAE14D1C5D2}"/>
+              </a:ext>
+            </a:extLst>
+          </p:cNvPr>
+          <p:cNvGrpSpPr/>
+          <p:nvPr/>
+        </p:nvGrpSpPr>
+        <p:grpSpPr>
+          <a:xfrm>
+            <a:off x="1278834" y="0"/>
+            <a:ext cx="4817166" cy="4472608"/>
+            <a:chOff x="2696818" y="967409"/>
+            <a:chExt cx="4817166" cy="4472608"/>
+          </a:xfrm>
+        </p:grpSpPr>
+        <p:pic>
+          <p:nvPicPr>
+            <p:cNvPr id="9" name="그림 8" descr="그래픽, 상징, 폰트, 로고이(가) 표시된 사진&#10;&#10;AI가 생성한 콘텐츠는 부정확할 수 있습니다.">
+              <a:extLst>
+                <a:ext uri="{FF2B5EF4-FFF2-40B4-BE49-F238E27FC236}">
+                  <a16:creationId xmlns:a16="http://schemas.microsoft.com/office/drawing/2014/main" id="{856582FC-A95A-A237-0FD9-BD43568D96FD}"/>
+                </a:ext>
+              </a:extLst>
+            </p:cNvPr>
+            <p:cNvPicPr>
+              <a:picLocks noChangeAspect="1"/>
+            </p:cNvPicPr>
+            <p:nvPr/>
+          </p:nvPicPr>
+          <p:blipFill>
+            <a:blip r:embed="rId2">
+              <a:extLst>
+                <a:ext uri="{BEBA8EAE-BF5A-486C-A8C5-ECC9F3942E4B}">
+                  <a14:imgProps xmlns:a14="http://schemas.microsoft.com/office/drawing/2010/main">
+                    <a14:imgLayer r:embed="rId3">
+                      <a14:imgEffect>
+                        <a14:backgroundRemoval t="10000" b="90000" l="10000" r="90000"/>
+                      </a14:imgEffect>
+                    </a14:imgLayer>
+                  </a14:imgProps>
+                </a:ext>
+                <a:ext uri="{28A0092B-C50C-407E-A947-70E740481C1C}">
+                  <a14:useLocalDpi xmlns:a14="http://schemas.microsoft.com/office/drawing/2010/main" val="0"/>
+                </a:ext>
+              </a:extLst>
+            </a:blip>
+            <a:srcRect l="14831" t="17391" r="14927" b="17391"/>
+            <a:stretch/>
+          </p:blipFill>
+          <p:spPr>
+            <a:xfrm>
+              <a:off x="2696818" y="967409"/>
+              <a:ext cx="4817166" cy="4472608"/>
+            </a:xfrm>
+            <a:prstGeom prst="rect">
+              <a:avLst/>
+            </a:prstGeom>
+          </p:spPr>
+        </p:pic>
+        <p:sp>
+          <p:nvSpPr>
+            <p:cNvPr id="10" name="TextBox 9">
+              <a:extLst>
+                <a:ext uri="{FF2B5EF4-FFF2-40B4-BE49-F238E27FC236}">
+                  <a16:creationId xmlns:a16="http://schemas.microsoft.com/office/drawing/2014/main" id="{1BF311FB-DF6C-79D4-C8CA-338E019CEBC8}"/>
+                </a:ext>
+              </a:extLst>
+            </p:cNvPr>
+            <p:cNvSpPr txBox="1"/>
+            <p:nvPr/>
+          </p:nvSpPr>
+          <p:spPr>
+            <a:xfrm>
+              <a:off x="3398043" y="1192700"/>
+              <a:ext cx="3414717" cy="4247317"/>
+            </a:xfrm>
+            <a:prstGeom prst="rect">
+              <a:avLst/>
+            </a:prstGeom>
+            <a:noFill/>
+          </p:spPr>
+          <p:txBody>
+            <a:bodyPr wrap="none" rtlCol="0">
+              <a:spAutoFit/>
+            </a:bodyPr>
+            <a:lstStyle/>
+            <a:p>
+              <a:pPr algn="ctr"/>
+              <a:r>
+                <a:rPr lang="en-US" altLang="ko-KR" sz="27000" dirty="0">
+                  <a:solidFill>
+                    <a:srgbClr val="FD0000"/>
+                  </a:solidFill>
+                  <a:latin typeface="Yoon® 만세" panose="02020603020101020101" pitchFamily="18" charset="-127"/>
+                  <a:ea typeface="Yoon® 만세" panose="02020603020101020101" pitchFamily="18" charset="-127"/>
+                </a:rPr>
+                <a:t>A0</a:t>
+              </a:r>
+              <a:endParaRPr lang="ko-KR" altLang="en-US" sz="27000" baseline="30000" dirty="0">
+                <a:solidFill>
+                  <a:srgbClr val="FD0000"/>
+                </a:solidFill>
+                <a:latin typeface="Yoon® 만세" panose="02020603020101020101" pitchFamily="18" charset="-127"/>
+                <a:ea typeface="Yoon® 만세" panose="02020603020101020101" pitchFamily="18" charset="-127"/>
+              </a:endParaRPr>
+            </a:p>
+          </p:txBody>
+        </p:sp>
+      </p:grpSp>
+      <p:grpSp>
+        <p:nvGrpSpPr>
+          <p:cNvPr id="11" name="그룹 10">
+            <a:extLst>
+              <a:ext uri="{FF2B5EF4-FFF2-40B4-BE49-F238E27FC236}">
+                <a16:creationId xmlns:a16="http://schemas.microsoft.com/office/drawing/2014/main" id="{E6DB9AA1-959E-3E3E-7301-45513C355680}"/>
+              </a:ext>
+            </a:extLst>
+          </p:cNvPr>
+          <p:cNvGrpSpPr/>
+          <p:nvPr/>
+        </p:nvGrpSpPr>
+        <p:grpSpPr>
+          <a:xfrm>
+            <a:off x="3121329" y="3980"/>
+            <a:ext cx="4817166" cy="4472608"/>
+            <a:chOff x="2696818" y="967409"/>
+            <a:chExt cx="4817166" cy="4472608"/>
+          </a:xfrm>
+        </p:grpSpPr>
+        <p:pic>
+          <p:nvPicPr>
+            <p:cNvPr id="12" name="그림 11" descr="그래픽, 상징, 폰트, 로고이(가) 표시된 사진&#10;&#10;AI가 생성한 콘텐츠는 부정확할 수 있습니다.">
+              <a:extLst>
+                <a:ext uri="{FF2B5EF4-FFF2-40B4-BE49-F238E27FC236}">
+                  <a16:creationId xmlns:a16="http://schemas.microsoft.com/office/drawing/2014/main" id="{0DD93A42-D977-898F-D278-583D2D50C260}"/>
+                </a:ext>
+              </a:extLst>
+            </p:cNvPr>
+            <p:cNvPicPr>
+              <a:picLocks noChangeAspect="1"/>
+            </p:cNvPicPr>
+            <p:nvPr/>
+          </p:nvPicPr>
+          <p:blipFill>
+            <a:blip r:embed="rId2">
+              <a:extLst>
+                <a:ext uri="{BEBA8EAE-BF5A-486C-A8C5-ECC9F3942E4B}">
+                  <a14:imgProps xmlns:a14="http://schemas.microsoft.com/office/drawing/2010/main">
+                    <a14:imgLayer r:embed="rId3">
+                      <a14:imgEffect>
+                        <a14:backgroundRemoval t="10000" b="90000" l="10000" r="90000"/>
+                      </a14:imgEffect>
+                    </a14:imgLayer>
+                  </a14:imgProps>
+                </a:ext>
+                <a:ext uri="{28A0092B-C50C-407E-A947-70E740481C1C}">
+                  <a14:useLocalDpi xmlns:a14="http://schemas.microsoft.com/office/drawing/2010/main" val="0"/>
+                </a:ext>
+              </a:extLst>
+            </a:blip>
+            <a:srcRect l="14831" t="17391" r="14927" b="17391"/>
+            <a:stretch/>
+          </p:blipFill>
+          <p:spPr>
+            <a:xfrm>
+              <a:off x="2696818" y="967409"/>
+              <a:ext cx="4817166" cy="4472608"/>
+            </a:xfrm>
+            <a:prstGeom prst="rect">
+              <a:avLst/>
+            </a:prstGeom>
+          </p:spPr>
+        </p:pic>
+        <p:sp>
+          <p:nvSpPr>
+            <p:cNvPr id="13" name="TextBox 12">
+              <a:extLst>
+                <a:ext uri="{FF2B5EF4-FFF2-40B4-BE49-F238E27FC236}">
+                  <a16:creationId xmlns:a16="http://schemas.microsoft.com/office/drawing/2014/main" id="{F22B9421-E138-74CB-1B95-2F09AF8945C4}"/>
+                </a:ext>
+              </a:extLst>
+            </p:cNvPr>
+            <p:cNvSpPr txBox="1"/>
+            <p:nvPr/>
+          </p:nvSpPr>
+          <p:spPr>
+            <a:xfrm>
+              <a:off x="3566358" y="1192700"/>
+              <a:ext cx="3078086" cy="4247317"/>
+            </a:xfrm>
+            <a:prstGeom prst="rect">
+              <a:avLst/>
+            </a:prstGeom>
+            <a:noFill/>
+          </p:spPr>
+          <p:txBody>
+            <a:bodyPr wrap="none" rtlCol="0">
+              <a:spAutoFit/>
+            </a:bodyPr>
+            <a:lstStyle/>
+            <a:p>
+              <a:pPr algn="ctr"/>
+              <a:r>
+                <a:rPr lang="en-US" altLang="ko-KR" sz="27000" dirty="0">
+                  <a:solidFill>
+                    <a:srgbClr val="FD0000"/>
+                  </a:solidFill>
+                  <a:latin typeface="Yoon® 만세" panose="02020603020101020101" pitchFamily="18" charset="-127"/>
+                  <a:ea typeface="Yoon® 만세" panose="02020603020101020101" pitchFamily="18" charset="-127"/>
+                </a:rPr>
+                <a:t>A</a:t>
+              </a:r>
+              <a:r>
+                <a:rPr lang="en-US" altLang="ko-KR" sz="27000" baseline="30000" dirty="0">
+                  <a:solidFill>
+                    <a:srgbClr val="FD0000"/>
+                  </a:solidFill>
+                  <a:latin typeface="Yoon® 만세" panose="02020603020101020101" pitchFamily="18" charset="-127"/>
+                  <a:ea typeface="Yoon® 만세" panose="02020603020101020101" pitchFamily="18" charset="-127"/>
+                </a:rPr>
+                <a:t>-</a:t>
+              </a:r>
+              <a:endParaRPr lang="ko-KR" altLang="en-US" sz="27000" baseline="30000" dirty="0">
+                <a:solidFill>
+                  <a:srgbClr val="FD0000"/>
+                </a:solidFill>
+                <a:latin typeface="Yoon® 만세" panose="02020603020101020101" pitchFamily="18" charset="-127"/>
+                <a:ea typeface="Yoon® 만세" panose="02020603020101020101" pitchFamily="18" charset="-127"/>
+              </a:endParaRPr>
+            </a:p>
+          </p:txBody>
+        </p:sp>
+      </p:grpSp>
+      <p:grpSp>
+        <p:nvGrpSpPr>
+          <p:cNvPr id="14" name="그룹 13">
+            <a:extLst>
+              <a:ext uri="{FF2B5EF4-FFF2-40B4-BE49-F238E27FC236}">
+                <a16:creationId xmlns:a16="http://schemas.microsoft.com/office/drawing/2014/main" id="{B314F0D8-28CC-F452-55A9-8E3E68DA1C81}"/>
+              </a:ext>
+            </a:extLst>
+          </p:cNvPr>
+          <p:cNvGrpSpPr/>
+          <p:nvPr/>
+        </p:nvGrpSpPr>
+        <p:grpSpPr>
+          <a:xfrm>
+            <a:off x="6377872" y="297734"/>
+            <a:ext cx="4817166" cy="4472608"/>
+            <a:chOff x="2696818" y="967409"/>
+            <a:chExt cx="4817166" cy="4472608"/>
+          </a:xfrm>
+        </p:grpSpPr>
+        <p:pic>
+          <p:nvPicPr>
+            <p:cNvPr id="15" name="그림 14" descr="그래픽, 상징, 폰트, 로고이(가) 표시된 사진&#10;&#10;AI가 생성한 콘텐츠는 부정확할 수 있습니다.">
+              <a:extLst>
+                <a:ext uri="{FF2B5EF4-FFF2-40B4-BE49-F238E27FC236}">
+                  <a16:creationId xmlns:a16="http://schemas.microsoft.com/office/drawing/2014/main" id="{5B16AA39-D380-0ECB-0349-E5FBD3D75C86}"/>
+                </a:ext>
+              </a:extLst>
+            </p:cNvPr>
+            <p:cNvPicPr>
+              <a:picLocks noChangeAspect="1"/>
+            </p:cNvPicPr>
+            <p:nvPr/>
+          </p:nvPicPr>
+          <p:blipFill>
+            <a:blip r:embed="rId2">
+              <a:extLst>
+                <a:ext uri="{BEBA8EAE-BF5A-486C-A8C5-ECC9F3942E4B}">
+                  <a14:imgProps xmlns:a14="http://schemas.microsoft.com/office/drawing/2010/main">
+                    <a14:imgLayer r:embed="rId3">
+                      <a14:imgEffect>
+                        <a14:backgroundRemoval t="10000" b="90000" l="10000" r="90000"/>
+                      </a14:imgEffect>
+                    </a14:imgLayer>
+                  </a14:imgProps>
+                </a:ext>
+                <a:ext uri="{28A0092B-C50C-407E-A947-70E740481C1C}">
+                  <a14:useLocalDpi xmlns:a14="http://schemas.microsoft.com/office/drawing/2010/main" val="0"/>
+                </a:ext>
+              </a:extLst>
+            </a:blip>
+            <a:srcRect l="14831" t="17391" r="14927" b="17391"/>
+            <a:stretch/>
+          </p:blipFill>
+          <p:spPr>
+            <a:xfrm>
+              <a:off x="2696818" y="967409"/>
+              <a:ext cx="4817166" cy="4472608"/>
+            </a:xfrm>
+            <a:prstGeom prst="rect">
+              <a:avLst/>
+            </a:prstGeom>
+          </p:spPr>
+        </p:pic>
+        <p:sp>
+          <p:nvSpPr>
+            <p:cNvPr id="16" name="TextBox 15">
+              <a:extLst>
+                <a:ext uri="{FF2B5EF4-FFF2-40B4-BE49-F238E27FC236}">
+                  <a16:creationId xmlns:a16="http://schemas.microsoft.com/office/drawing/2014/main" id="{A65B13C7-289A-7270-E8AE-BE626C16C58D}"/>
+                </a:ext>
+              </a:extLst>
+            </p:cNvPr>
+            <p:cNvSpPr txBox="1"/>
+            <p:nvPr/>
+          </p:nvSpPr>
+          <p:spPr>
+            <a:xfrm>
+              <a:off x="3505444" y="1192700"/>
+              <a:ext cx="3199915" cy="4247317"/>
+            </a:xfrm>
+            <a:prstGeom prst="rect">
+              <a:avLst/>
+            </a:prstGeom>
+            <a:noFill/>
+          </p:spPr>
+          <p:txBody>
+            <a:bodyPr wrap="none" rtlCol="0">
+              <a:spAutoFit/>
+            </a:bodyPr>
+            <a:lstStyle/>
+            <a:p>
+              <a:pPr algn="ctr"/>
+              <a:r>
+                <a:rPr lang="en-US" altLang="ko-KR" sz="27000" dirty="0">
+                  <a:solidFill>
+                    <a:srgbClr val="FD0000"/>
+                  </a:solidFill>
+                  <a:latin typeface="Yoon® 만세" panose="02020603020101020101" pitchFamily="18" charset="-127"/>
+                  <a:ea typeface="Yoon® 만세" panose="02020603020101020101" pitchFamily="18" charset="-127"/>
+                </a:rPr>
+                <a:t>B</a:t>
+              </a:r>
+              <a:r>
+                <a:rPr lang="en-US" altLang="ko-KR" sz="27000" baseline="30000" dirty="0">
+                  <a:solidFill>
+                    <a:srgbClr val="FD0000"/>
+                  </a:solidFill>
+                  <a:latin typeface="Yoon® 만세" panose="02020603020101020101" pitchFamily="18" charset="-127"/>
+                  <a:ea typeface="Yoon® 만세" panose="02020603020101020101" pitchFamily="18" charset="-127"/>
+                </a:rPr>
+                <a:t>-</a:t>
+              </a:r>
+              <a:endParaRPr lang="ko-KR" altLang="en-US" sz="27000" baseline="30000" dirty="0">
+                <a:solidFill>
+                  <a:srgbClr val="FD0000"/>
+                </a:solidFill>
+                <a:latin typeface="Yoon® 만세" panose="02020603020101020101" pitchFamily="18" charset="-127"/>
+                <a:ea typeface="Yoon® 만세" panose="02020603020101020101" pitchFamily="18" charset="-127"/>
+              </a:endParaRPr>
+            </a:p>
+          </p:txBody>
+        </p:sp>
+      </p:grpSp>
+      <p:grpSp>
+        <p:nvGrpSpPr>
+          <p:cNvPr id="17" name="그룹 16">
+            <a:extLst>
+              <a:ext uri="{FF2B5EF4-FFF2-40B4-BE49-F238E27FC236}">
+                <a16:creationId xmlns:a16="http://schemas.microsoft.com/office/drawing/2014/main" id="{A7A5C6AF-71AB-55B4-E70E-6296BB1B7347}"/>
+              </a:ext>
+            </a:extLst>
+          </p:cNvPr>
+          <p:cNvGrpSpPr/>
+          <p:nvPr/>
+        </p:nvGrpSpPr>
+        <p:grpSpPr>
+          <a:xfrm>
+            <a:off x="10062862" y="-1319915"/>
+            <a:ext cx="4817166" cy="4472608"/>
+            <a:chOff x="2696818" y="967409"/>
+            <a:chExt cx="4817166" cy="4472608"/>
+          </a:xfrm>
+        </p:grpSpPr>
+        <p:pic>
+          <p:nvPicPr>
+            <p:cNvPr id="18" name="그림 17" descr="그래픽, 상징, 폰트, 로고이(가) 표시된 사진&#10;&#10;AI가 생성한 콘텐츠는 부정확할 수 있습니다.">
+              <a:extLst>
+                <a:ext uri="{FF2B5EF4-FFF2-40B4-BE49-F238E27FC236}">
+                  <a16:creationId xmlns:a16="http://schemas.microsoft.com/office/drawing/2014/main" id="{3E8A95EF-F190-7CB8-3DC8-DFCCAA14A6A9}"/>
+                </a:ext>
+              </a:extLst>
+            </p:cNvPr>
+            <p:cNvPicPr>
+              <a:picLocks noChangeAspect="1"/>
+            </p:cNvPicPr>
+            <p:nvPr/>
+          </p:nvPicPr>
+          <p:blipFill>
+            <a:blip r:embed="rId2">
+              <a:extLst>
+                <a:ext uri="{BEBA8EAE-BF5A-486C-A8C5-ECC9F3942E4B}">
+                  <a14:imgProps xmlns:a14="http://schemas.microsoft.com/office/drawing/2010/main">
+                    <a14:imgLayer r:embed="rId3">
+                      <a14:imgEffect>
+                        <a14:backgroundRemoval t="10000" b="90000" l="10000" r="90000"/>
+                      </a14:imgEffect>
+                    </a14:imgLayer>
+                  </a14:imgProps>
+                </a:ext>
+                <a:ext uri="{28A0092B-C50C-407E-A947-70E740481C1C}">
+                  <a14:useLocalDpi xmlns:a14="http://schemas.microsoft.com/office/drawing/2010/main" val="0"/>
+                </a:ext>
+              </a:extLst>
+            </a:blip>
+            <a:srcRect l="14831" t="17391" r="14927" b="17391"/>
+            <a:stretch/>
+          </p:blipFill>
+          <p:spPr>
+            <a:xfrm>
+              <a:off x="2696818" y="967409"/>
+              <a:ext cx="4817166" cy="4472608"/>
+            </a:xfrm>
+            <a:prstGeom prst="rect">
+              <a:avLst/>
+            </a:prstGeom>
+          </p:spPr>
+        </p:pic>
+        <p:sp>
+          <p:nvSpPr>
+            <p:cNvPr id="19" name="TextBox 18">
+              <a:extLst>
+                <a:ext uri="{FF2B5EF4-FFF2-40B4-BE49-F238E27FC236}">
+                  <a16:creationId xmlns:a16="http://schemas.microsoft.com/office/drawing/2014/main" id="{2BF12B01-9B99-F03D-4891-3B0F3FD93F4B}"/>
+                </a:ext>
+              </a:extLst>
+            </p:cNvPr>
+            <p:cNvSpPr txBox="1"/>
+            <p:nvPr/>
+          </p:nvSpPr>
+          <p:spPr>
+            <a:xfrm>
+              <a:off x="3486208" y="1192700"/>
+              <a:ext cx="3238387" cy="4247317"/>
+            </a:xfrm>
+            <a:prstGeom prst="rect">
+              <a:avLst/>
+            </a:prstGeom>
+            <a:noFill/>
+          </p:spPr>
+          <p:txBody>
+            <a:bodyPr wrap="none" rtlCol="0">
+              <a:spAutoFit/>
+            </a:bodyPr>
+            <a:lstStyle/>
+            <a:p>
+              <a:pPr algn="ctr"/>
+              <a:r>
+                <a:rPr lang="en-US" altLang="ko-KR" sz="27000" dirty="0">
+                  <a:solidFill>
+                    <a:srgbClr val="FD0000"/>
+                  </a:solidFill>
+                  <a:latin typeface="Yoon® 만세" panose="02020603020101020101" pitchFamily="18" charset="-127"/>
+                  <a:ea typeface="Yoon® 만세" panose="02020603020101020101" pitchFamily="18" charset="-127"/>
+                </a:rPr>
+                <a:t>B</a:t>
+              </a:r>
+              <a:r>
+                <a:rPr lang="en-US" altLang="ko-KR" sz="27000" baseline="30000" dirty="0">
+                  <a:solidFill>
+                    <a:srgbClr val="FD0000"/>
+                  </a:solidFill>
+                  <a:latin typeface="Yoon® 만세" panose="02020603020101020101" pitchFamily="18" charset="-127"/>
+                  <a:ea typeface="Yoon® 만세" panose="02020603020101020101" pitchFamily="18" charset="-127"/>
+                </a:rPr>
+                <a:t>+</a:t>
+              </a:r>
+              <a:endParaRPr lang="ko-KR" altLang="en-US" sz="27000" baseline="30000" dirty="0">
+                <a:solidFill>
+                  <a:srgbClr val="FD0000"/>
+                </a:solidFill>
+                <a:latin typeface="Yoon® 만세" panose="02020603020101020101" pitchFamily="18" charset="-127"/>
+                <a:ea typeface="Yoon® 만세" panose="02020603020101020101" pitchFamily="18" charset="-127"/>
+              </a:endParaRPr>
+            </a:p>
+          </p:txBody>
+        </p:sp>
+      </p:grpSp>
+      <p:grpSp>
+        <p:nvGrpSpPr>
+          <p:cNvPr id="20" name="그룹 19">
+            <a:extLst>
+              <a:ext uri="{FF2B5EF4-FFF2-40B4-BE49-F238E27FC236}">
+                <a16:creationId xmlns:a16="http://schemas.microsoft.com/office/drawing/2014/main" id="{FB79D3CC-21D9-F9B3-2320-5C620640B22B}"/>
+              </a:ext>
+            </a:extLst>
+          </p:cNvPr>
+          <p:cNvGrpSpPr/>
+          <p:nvPr/>
+        </p:nvGrpSpPr>
+        <p:grpSpPr>
+          <a:xfrm>
+            <a:off x="10211941" y="1960003"/>
+            <a:ext cx="4817166" cy="4472608"/>
+            <a:chOff x="2696818" y="967409"/>
+            <a:chExt cx="4817166" cy="4472608"/>
+          </a:xfrm>
+        </p:grpSpPr>
+        <p:pic>
+          <p:nvPicPr>
+            <p:cNvPr id="21" name="그림 20" descr="그래픽, 상징, 폰트, 로고이(가) 표시된 사진&#10;&#10;AI가 생성한 콘텐츠는 부정확할 수 있습니다.">
+              <a:extLst>
+                <a:ext uri="{FF2B5EF4-FFF2-40B4-BE49-F238E27FC236}">
+                  <a16:creationId xmlns:a16="http://schemas.microsoft.com/office/drawing/2014/main" id="{719601AA-91F5-5733-A12E-BFF71209293A}"/>
+                </a:ext>
+              </a:extLst>
+            </p:cNvPr>
+            <p:cNvPicPr>
+              <a:picLocks noChangeAspect="1"/>
+            </p:cNvPicPr>
+            <p:nvPr/>
+          </p:nvPicPr>
+          <p:blipFill>
+            <a:blip r:embed="rId2">
+              <a:extLst>
+                <a:ext uri="{BEBA8EAE-BF5A-486C-A8C5-ECC9F3942E4B}">
+                  <a14:imgProps xmlns:a14="http://schemas.microsoft.com/office/drawing/2010/main">
+                    <a14:imgLayer r:embed="rId3">
+                      <a14:imgEffect>
+                        <a14:backgroundRemoval t="10000" b="90000" l="10000" r="90000"/>
+                      </a14:imgEffect>
+                    </a14:imgLayer>
+                  </a14:imgProps>
+                </a:ext>
+                <a:ext uri="{28A0092B-C50C-407E-A947-70E740481C1C}">
+                  <a14:useLocalDpi xmlns:a14="http://schemas.microsoft.com/office/drawing/2010/main" val="0"/>
+                </a:ext>
+              </a:extLst>
+            </a:blip>
+            <a:srcRect l="14831" t="17391" r="14927" b="17391"/>
+            <a:stretch/>
+          </p:blipFill>
+          <p:spPr>
+            <a:xfrm>
+              <a:off x="2696818" y="967409"/>
+              <a:ext cx="4817166" cy="4472608"/>
+            </a:xfrm>
+            <a:prstGeom prst="rect">
+              <a:avLst/>
+            </a:prstGeom>
+          </p:spPr>
+        </p:pic>
+        <p:sp>
+          <p:nvSpPr>
+            <p:cNvPr id="22" name="TextBox 21">
+              <a:extLst>
+                <a:ext uri="{FF2B5EF4-FFF2-40B4-BE49-F238E27FC236}">
+                  <a16:creationId xmlns:a16="http://schemas.microsoft.com/office/drawing/2014/main" id="{015F9364-42E6-E2C7-8A37-0EFF506DF415}"/>
+                </a:ext>
+              </a:extLst>
+            </p:cNvPr>
+            <p:cNvSpPr txBox="1"/>
+            <p:nvPr/>
+          </p:nvSpPr>
+          <p:spPr>
+            <a:xfrm>
+              <a:off x="3337130" y="1192700"/>
+              <a:ext cx="3536546" cy="4247317"/>
+            </a:xfrm>
+            <a:prstGeom prst="rect">
+              <a:avLst/>
+            </a:prstGeom>
+            <a:noFill/>
+          </p:spPr>
+          <p:txBody>
+            <a:bodyPr wrap="none" rtlCol="0">
+              <a:spAutoFit/>
+            </a:bodyPr>
+            <a:lstStyle/>
+            <a:p>
+              <a:pPr algn="ctr"/>
+              <a:r>
+                <a:rPr lang="en-US" altLang="ko-KR" sz="27000" dirty="0">
+                  <a:solidFill>
+                    <a:srgbClr val="FD0000"/>
+                  </a:solidFill>
+                  <a:latin typeface="Yoon® 만세" panose="02020603020101020101" pitchFamily="18" charset="-127"/>
+                  <a:ea typeface="Yoon® 만세" panose="02020603020101020101" pitchFamily="18" charset="-127"/>
+                </a:rPr>
+                <a:t>B0</a:t>
+              </a:r>
+              <a:endParaRPr lang="ko-KR" altLang="en-US" sz="27000" baseline="30000" dirty="0">
+                <a:solidFill>
+                  <a:srgbClr val="FD0000"/>
+                </a:solidFill>
+                <a:latin typeface="Yoon® 만세" panose="02020603020101020101" pitchFamily="18" charset="-127"/>
+                <a:ea typeface="Yoon® 만세" panose="02020603020101020101" pitchFamily="18" charset="-127"/>
+              </a:endParaRPr>
+            </a:p>
+          </p:txBody>
+        </p:sp>
+      </p:grpSp>
+      <p:grpSp>
+        <p:nvGrpSpPr>
+          <p:cNvPr id="23" name="그룹 22">
+            <a:extLst>
+              <a:ext uri="{FF2B5EF4-FFF2-40B4-BE49-F238E27FC236}">
+                <a16:creationId xmlns:a16="http://schemas.microsoft.com/office/drawing/2014/main" id="{234CFB7C-FC52-25FC-E900-522A84F67776}"/>
+              </a:ext>
+            </a:extLst>
+          </p:cNvPr>
+          <p:cNvGrpSpPr/>
+          <p:nvPr/>
+        </p:nvGrpSpPr>
+        <p:grpSpPr>
+          <a:xfrm>
+            <a:off x="221198" y="2457615"/>
+            <a:ext cx="4817166" cy="4472608"/>
+            <a:chOff x="2696818" y="967409"/>
+            <a:chExt cx="4817166" cy="4472608"/>
+          </a:xfrm>
+        </p:grpSpPr>
+        <p:pic>
+          <p:nvPicPr>
+            <p:cNvPr id="24" name="그림 23" descr="그래픽, 상징, 폰트, 로고이(가) 표시된 사진&#10;&#10;AI가 생성한 콘텐츠는 부정확할 수 있습니다.">
+              <a:extLst>
+                <a:ext uri="{FF2B5EF4-FFF2-40B4-BE49-F238E27FC236}">
+                  <a16:creationId xmlns:a16="http://schemas.microsoft.com/office/drawing/2014/main" id="{1527D051-746C-C43E-BC40-DB0F7DB39B6E}"/>
+                </a:ext>
+              </a:extLst>
+            </p:cNvPr>
+            <p:cNvPicPr>
+              <a:picLocks noChangeAspect="1"/>
+            </p:cNvPicPr>
+            <p:nvPr/>
+          </p:nvPicPr>
+          <p:blipFill>
+            <a:blip r:embed="rId2">
+              <a:extLst>
+                <a:ext uri="{BEBA8EAE-BF5A-486C-A8C5-ECC9F3942E4B}">
+                  <a14:imgProps xmlns:a14="http://schemas.microsoft.com/office/drawing/2010/main">
+                    <a14:imgLayer r:embed="rId3">
+                      <a14:imgEffect>
+                        <a14:backgroundRemoval t="10000" b="90000" l="10000" r="90000"/>
+                      </a14:imgEffect>
+                    </a14:imgLayer>
+                  </a14:imgProps>
+                </a:ext>
+                <a:ext uri="{28A0092B-C50C-407E-A947-70E740481C1C}">
+                  <a14:useLocalDpi xmlns:a14="http://schemas.microsoft.com/office/drawing/2010/main" val="0"/>
+                </a:ext>
+              </a:extLst>
+            </a:blip>
+            <a:srcRect l="14831" t="17391" r="14927" b="17391"/>
+            <a:stretch/>
+          </p:blipFill>
+          <p:spPr>
+            <a:xfrm>
+              <a:off x="2696818" y="967409"/>
+              <a:ext cx="4817166" cy="4472608"/>
+            </a:xfrm>
+            <a:prstGeom prst="rect">
+              <a:avLst/>
+            </a:prstGeom>
+          </p:spPr>
+        </p:pic>
+        <p:sp>
+          <p:nvSpPr>
+            <p:cNvPr id="25" name="TextBox 24">
+              <a:extLst>
+                <a:ext uri="{FF2B5EF4-FFF2-40B4-BE49-F238E27FC236}">
+                  <a16:creationId xmlns:a16="http://schemas.microsoft.com/office/drawing/2014/main" id="{6722E044-C169-DC90-AED6-BDD9940003B5}"/>
+                </a:ext>
+              </a:extLst>
+            </p:cNvPr>
+            <p:cNvSpPr txBox="1"/>
+            <p:nvPr/>
+          </p:nvSpPr>
+          <p:spPr>
+            <a:xfrm>
+              <a:off x="3505444" y="1192700"/>
+              <a:ext cx="3199915" cy="4247317"/>
+            </a:xfrm>
+            <a:prstGeom prst="rect">
+              <a:avLst/>
+            </a:prstGeom>
+            <a:noFill/>
+          </p:spPr>
+          <p:txBody>
+            <a:bodyPr wrap="none" rtlCol="0">
+              <a:spAutoFit/>
+            </a:bodyPr>
+            <a:lstStyle/>
+            <a:p>
+              <a:pPr algn="ctr"/>
+              <a:r>
+                <a:rPr lang="en-US" altLang="ko-KR" sz="27000" dirty="0">
+                  <a:solidFill>
+                    <a:srgbClr val="FD0000"/>
+                  </a:solidFill>
+                  <a:latin typeface="Yoon® 만세" panose="02020603020101020101" pitchFamily="18" charset="-127"/>
+                  <a:ea typeface="Yoon® 만세" panose="02020603020101020101" pitchFamily="18" charset="-127"/>
+                </a:rPr>
+                <a:t>C</a:t>
+              </a:r>
+              <a:r>
+                <a:rPr lang="en-US" altLang="ko-KR" sz="27000" baseline="30000" dirty="0">
+                  <a:solidFill>
+                    <a:srgbClr val="FD0000"/>
+                  </a:solidFill>
+                  <a:latin typeface="Yoon® 만세" panose="02020603020101020101" pitchFamily="18" charset="-127"/>
+                  <a:ea typeface="Yoon® 만세" panose="02020603020101020101" pitchFamily="18" charset="-127"/>
+                </a:rPr>
+                <a:t>-</a:t>
+              </a:r>
+              <a:endParaRPr lang="ko-KR" altLang="en-US" sz="27000" baseline="30000" dirty="0">
+                <a:solidFill>
+                  <a:srgbClr val="FD0000"/>
+                </a:solidFill>
+                <a:latin typeface="Yoon® 만세" panose="02020603020101020101" pitchFamily="18" charset="-127"/>
+                <a:ea typeface="Yoon® 만세" panose="02020603020101020101" pitchFamily="18" charset="-127"/>
+              </a:endParaRPr>
+            </a:p>
+          </p:txBody>
+        </p:sp>
+      </p:grpSp>
+      <p:grpSp>
+        <p:nvGrpSpPr>
+          <p:cNvPr id="26" name="그룹 25">
+            <a:extLst>
+              <a:ext uri="{FF2B5EF4-FFF2-40B4-BE49-F238E27FC236}">
+                <a16:creationId xmlns:a16="http://schemas.microsoft.com/office/drawing/2014/main" id="{3FF22471-66FE-D142-CE66-06BC0EEE8F7C}"/>
+              </a:ext>
+            </a:extLst>
+          </p:cNvPr>
+          <p:cNvGrpSpPr/>
+          <p:nvPr/>
+        </p:nvGrpSpPr>
+        <p:grpSpPr>
+          <a:xfrm>
+            <a:off x="3219113" y="2642704"/>
+            <a:ext cx="4817166" cy="4472608"/>
+            <a:chOff x="2696818" y="967409"/>
+            <a:chExt cx="4817166" cy="4472608"/>
+          </a:xfrm>
+        </p:grpSpPr>
+        <p:pic>
+          <p:nvPicPr>
+            <p:cNvPr id="27" name="그림 26" descr="그래픽, 상징, 폰트, 로고이(가) 표시된 사진&#10;&#10;AI가 생성한 콘텐츠는 부정확할 수 있습니다.">
+              <a:extLst>
+                <a:ext uri="{FF2B5EF4-FFF2-40B4-BE49-F238E27FC236}">
+                  <a16:creationId xmlns:a16="http://schemas.microsoft.com/office/drawing/2014/main" id="{297952EF-F582-4E25-C341-DFD3AA5678D7}"/>
+                </a:ext>
+              </a:extLst>
+            </p:cNvPr>
+            <p:cNvPicPr>
+              <a:picLocks noChangeAspect="1"/>
+            </p:cNvPicPr>
+            <p:nvPr/>
+          </p:nvPicPr>
+          <p:blipFill>
+            <a:blip r:embed="rId2">
+              <a:extLst>
+                <a:ext uri="{BEBA8EAE-BF5A-486C-A8C5-ECC9F3942E4B}">
+                  <a14:imgProps xmlns:a14="http://schemas.microsoft.com/office/drawing/2010/main">
+                    <a14:imgLayer r:embed="rId3">
+                      <a14:imgEffect>
+                        <a14:backgroundRemoval t="10000" b="90000" l="10000" r="90000"/>
+                      </a14:imgEffect>
+                    </a14:imgLayer>
+                  </a14:imgProps>
+                </a:ext>
+                <a:ext uri="{28A0092B-C50C-407E-A947-70E740481C1C}">
+                  <a14:useLocalDpi xmlns:a14="http://schemas.microsoft.com/office/drawing/2010/main" val="0"/>
+                </a:ext>
+              </a:extLst>
+            </a:blip>
+            <a:srcRect l="14831" t="17391" r="14927" b="17391"/>
+            <a:stretch/>
+          </p:blipFill>
+          <p:spPr>
+            <a:xfrm>
+              <a:off x="2696818" y="967409"/>
+              <a:ext cx="4817166" cy="4472608"/>
+            </a:xfrm>
+            <a:prstGeom prst="rect">
+              <a:avLst/>
+            </a:prstGeom>
+          </p:spPr>
+        </p:pic>
+        <p:sp>
+          <p:nvSpPr>
+            <p:cNvPr id="28" name="TextBox 27">
+              <a:extLst>
+                <a:ext uri="{FF2B5EF4-FFF2-40B4-BE49-F238E27FC236}">
+                  <a16:creationId xmlns:a16="http://schemas.microsoft.com/office/drawing/2014/main" id="{8C905739-5F22-A4D3-CFC2-D55DC661B307}"/>
+                </a:ext>
+              </a:extLst>
+            </p:cNvPr>
+            <p:cNvSpPr txBox="1"/>
+            <p:nvPr/>
+          </p:nvSpPr>
+          <p:spPr>
+            <a:xfrm>
+              <a:off x="3481399" y="1192700"/>
+              <a:ext cx="3248005" cy="4247317"/>
+            </a:xfrm>
+            <a:prstGeom prst="rect">
+              <a:avLst/>
+            </a:prstGeom>
+            <a:noFill/>
+          </p:spPr>
+          <p:txBody>
+            <a:bodyPr wrap="none" rtlCol="0">
+              <a:spAutoFit/>
+            </a:bodyPr>
+            <a:lstStyle/>
+            <a:p>
+              <a:pPr algn="ctr"/>
+              <a:r>
+                <a:rPr lang="en-US" altLang="ko-KR" sz="27000" dirty="0">
+                  <a:solidFill>
+                    <a:srgbClr val="FD0000"/>
+                  </a:solidFill>
+                  <a:latin typeface="Yoon® 만세" panose="02020603020101020101" pitchFamily="18" charset="-127"/>
+                  <a:ea typeface="Yoon® 만세" panose="02020603020101020101" pitchFamily="18" charset="-127"/>
+                </a:rPr>
+                <a:t>C</a:t>
+              </a:r>
+              <a:r>
+                <a:rPr lang="en-US" altLang="ko-KR" sz="27000" baseline="30000" dirty="0">
+                  <a:solidFill>
+                    <a:srgbClr val="FD0000"/>
+                  </a:solidFill>
+                  <a:latin typeface="Yoon® 만세" panose="02020603020101020101" pitchFamily="18" charset="-127"/>
+                  <a:ea typeface="Yoon® 만세" panose="02020603020101020101" pitchFamily="18" charset="-127"/>
+                </a:rPr>
+                <a:t>+</a:t>
+              </a:r>
+              <a:endParaRPr lang="ko-KR" altLang="en-US" sz="27000" baseline="30000" dirty="0">
+                <a:solidFill>
+                  <a:srgbClr val="FD0000"/>
+                </a:solidFill>
+                <a:latin typeface="Yoon® 만세" panose="02020603020101020101" pitchFamily="18" charset="-127"/>
+                <a:ea typeface="Yoon® 만세" panose="02020603020101020101" pitchFamily="18" charset="-127"/>
+              </a:endParaRPr>
+            </a:p>
+          </p:txBody>
+        </p:sp>
+      </p:grpSp>
+      <p:grpSp>
+        <p:nvGrpSpPr>
+          <p:cNvPr id="29" name="그룹 28">
+            <a:extLst>
+              <a:ext uri="{FF2B5EF4-FFF2-40B4-BE49-F238E27FC236}">
+                <a16:creationId xmlns:a16="http://schemas.microsoft.com/office/drawing/2014/main" id="{8C69484E-5475-1E8A-8FFD-A05320568BC6}"/>
+              </a:ext>
+            </a:extLst>
+          </p:cNvPr>
+          <p:cNvGrpSpPr/>
+          <p:nvPr/>
+        </p:nvGrpSpPr>
+        <p:grpSpPr>
+          <a:xfrm>
+            <a:off x="6797225" y="3429000"/>
+            <a:ext cx="4817166" cy="4472608"/>
+            <a:chOff x="2696818" y="967409"/>
+            <a:chExt cx="4817166" cy="4472608"/>
+          </a:xfrm>
+        </p:grpSpPr>
+        <p:pic>
+          <p:nvPicPr>
+            <p:cNvPr id="30" name="그림 29" descr="그래픽, 상징, 폰트, 로고이(가) 표시된 사진&#10;&#10;AI가 생성한 콘텐츠는 부정확할 수 있습니다.">
+              <a:extLst>
+                <a:ext uri="{FF2B5EF4-FFF2-40B4-BE49-F238E27FC236}">
+                  <a16:creationId xmlns:a16="http://schemas.microsoft.com/office/drawing/2014/main" id="{A549F0D2-F28C-0591-BB68-432E04A90945}"/>
+                </a:ext>
+              </a:extLst>
+            </p:cNvPr>
+            <p:cNvPicPr>
+              <a:picLocks noChangeAspect="1"/>
+            </p:cNvPicPr>
+            <p:nvPr/>
+          </p:nvPicPr>
+          <p:blipFill>
+            <a:blip r:embed="rId2">
+              <a:extLst>
+                <a:ext uri="{BEBA8EAE-BF5A-486C-A8C5-ECC9F3942E4B}">
+                  <a14:imgProps xmlns:a14="http://schemas.microsoft.com/office/drawing/2010/main">
+                    <a14:imgLayer r:embed="rId3">
+                      <a14:imgEffect>
+                        <a14:backgroundRemoval t="10000" b="90000" l="10000" r="90000"/>
+                      </a14:imgEffect>
+                    </a14:imgLayer>
+                  </a14:imgProps>
+                </a:ext>
+                <a:ext uri="{28A0092B-C50C-407E-A947-70E740481C1C}">
+                  <a14:useLocalDpi xmlns:a14="http://schemas.microsoft.com/office/drawing/2010/main" val="0"/>
+                </a:ext>
+              </a:extLst>
+            </a:blip>
+            <a:srcRect l="14831" t="17391" r="14927" b="17391"/>
+            <a:stretch/>
+          </p:blipFill>
+          <p:spPr>
+            <a:xfrm>
+              <a:off x="2696818" y="967409"/>
+              <a:ext cx="4817166" cy="4472608"/>
+            </a:xfrm>
+            <a:prstGeom prst="rect">
+              <a:avLst/>
+            </a:prstGeom>
+          </p:spPr>
+        </p:pic>
+        <p:sp>
+          <p:nvSpPr>
+            <p:cNvPr id="31" name="TextBox 30">
+              <a:extLst>
+                <a:ext uri="{FF2B5EF4-FFF2-40B4-BE49-F238E27FC236}">
+                  <a16:creationId xmlns:a16="http://schemas.microsoft.com/office/drawing/2014/main" id="{B12B5136-FF00-4D08-DA63-E878C1E5DB70}"/>
+                </a:ext>
+              </a:extLst>
+            </p:cNvPr>
+            <p:cNvSpPr txBox="1"/>
+            <p:nvPr/>
+          </p:nvSpPr>
+          <p:spPr>
+            <a:xfrm>
+              <a:off x="3332320" y="1192700"/>
+              <a:ext cx="3546164" cy="4247317"/>
+            </a:xfrm>
+            <a:prstGeom prst="rect">
+              <a:avLst/>
+            </a:prstGeom>
+            <a:noFill/>
+          </p:spPr>
+          <p:txBody>
+            <a:bodyPr wrap="none" rtlCol="0">
+              <a:spAutoFit/>
+            </a:bodyPr>
+            <a:lstStyle/>
+            <a:p>
+              <a:pPr algn="ctr"/>
+              <a:r>
+                <a:rPr lang="en-US" altLang="ko-KR" sz="27000" dirty="0">
+                  <a:solidFill>
+                    <a:srgbClr val="FD0000"/>
+                  </a:solidFill>
+                  <a:latin typeface="Yoon® 만세" panose="02020603020101020101" pitchFamily="18" charset="-127"/>
+                  <a:ea typeface="Yoon® 만세" panose="02020603020101020101" pitchFamily="18" charset="-127"/>
+                </a:rPr>
+                <a:t>C0</a:t>
+              </a:r>
+              <a:endParaRPr lang="ko-KR" altLang="en-US" sz="27000" baseline="30000" dirty="0">
+                <a:solidFill>
+                  <a:srgbClr val="FD0000"/>
+                </a:solidFill>
+                <a:latin typeface="Yoon® 만세" panose="02020603020101020101" pitchFamily="18" charset="-127"/>
+                <a:ea typeface="Yoon® 만세" panose="02020603020101020101" pitchFamily="18" charset="-127"/>
+              </a:endParaRPr>
+            </a:p>
+          </p:txBody>
+        </p:sp>
+      </p:grpSp>
+    </p:spTree>
+    <p:extLst>
+      <p:ext uri="{BB962C8B-B14F-4D97-AF65-F5344CB8AC3E}">
+        <p14:creationId xmlns:p14="http://schemas.microsoft.com/office/powerpoint/2010/main" val="2962916392"/>
+      </p:ext>
+    </p:extLst>
+  </p:cSld>
+  <p:clrMapOvr>
+    <a:masterClrMapping/>
+  </p:clrMapOvr>
+</p:sld>
+</file>
+
+<file path=ppt/slides/slide5.xml><?xml version="1.0" encoding="utf-8"?>
+<p:sld xmlns:a="http://schemas.openxmlformats.org/drawingml/2006/main" xmlns:r="http://schemas.openxmlformats.org/officeDocument/2006/relationships" xmlns:p="http://schemas.openxmlformats.org/presentationml/2006/main">
+  <p:cSld>
+    <p:spTree>
+      <p:nvGrpSpPr>
+        <p:cNvPr id="1" name=""/>
+        <p:cNvGrpSpPr/>
+        <p:nvPr/>
+      </p:nvGrpSpPr>
+      <p:grpSpPr>
+        <a:xfrm>
+          <a:off x="0" y="0"/>
+          <a:ext cx="0" cy="0"/>
+          <a:chOff x="0" y="0"/>
+          <a:chExt cx="0" cy="0"/>
+        </a:xfrm>
+      </p:grpSpPr>
+      <p:grpSp>
+        <p:nvGrpSpPr>
+          <p:cNvPr id="4" name="그룹 3">
+            <a:extLst>
+              <a:ext uri="{FF2B5EF4-FFF2-40B4-BE49-F238E27FC236}">
+                <a16:creationId xmlns:a16="http://schemas.microsoft.com/office/drawing/2014/main" id="{64F03648-392E-A011-4620-EA5D9868EBC3}"/>
+              </a:ext>
+            </a:extLst>
+          </p:cNvPr>
+          <p:cNvGrpSpPr/>
+          <p:nvPr/>
+        </p:nvGrpSpPr>
+        <p:grpSpPr>
+          <a:xfrm>
+            <a:off x="536158" y="689775"/>
+            <a:ext cx="4817166" cy="4472608"/>
+            <a:chOff x="2696818" y="967409"/>
+            <a:chExt cx="4817166" cy="4472608"/>
+          </a:xfrm>
+        </p:grpSpPr>
+        <p:pic>
+          <p:nvPicPr>
+            <p:cNvPr id="5" name="그림 4" descr="그래픽, 상징, 폰트, 로고이(가) 표시된 사진&#10;&#10;AI가 생성한 콘텐츠는 부정확할 수 있습니다.">
+              <a:extLst>
+                <a:ext uri="{FF2B5EF4-FFF2-40B4-BE49-F238E27FC236}">
+                  <a16:creationId xmlns:a16="http://schemas.microsoft.com/office/drawing/2014/main" id="{BD017FF4-88DE-6A6B-4941-6DC13D266952}"/>
+                </a:ext>
+              </a:extLst>
+            </p:cNvPr>
+            <p:cNvPicPr>
+              <a:picLocks noChangeAspect="1"/>
+            </p:cNvPicPr>
+            <p:nvPr/>
+          </p:nvPicPr>
+          <p:blipFill>
+            <a:blip r:embed="rId2">
+              <a:extLst>
+                <a:ext uri="{BEBA8EAE-BF5A-486C-A8C5-ECC9F3942E4B}">
+                  <a14:imgProps xmlns:a14="http://schemas.microsoft.com/office/drawing/2010/main">
+                    <a14:imgLayer r:embed="rId3">
+                      <a14:imgEffect>
+                        <a14:backgroundRemoval t="10000" b="90000" l="10000" r="90000"/>
+                      </a14:imgEffect>
+                    </a14:imgLayer>
+                  </a14:imgProps>
+                </a:ext>
+                <a:ext uri="{28A0092B-C50C-407E-A947-70E740481C1C}">
+                  <a14:useLocalDpi xmlns:a14="http://schemas.microsoft.com/office/drawing/2010/main" val="0"/>
+                </a:ext>
+              </a:extLst>
+            </a:blip>
+            <a:srcRect l="14831" t="17391" r="14927" b="17391"/>
+            <a:stretch/>
+          </p:blipFill>
+          <p:spPr>
+            <a:xfrm>
+              <a:off x="2696818" y="967409"/>
+              <a:ext cx="4817166" cy="4472608"/>
+            </a:xfrm>
+            <a:prstGeom prst="rect">
+              <a:avLst/>
+            </a:prstGeom>
+          </p:spPr>
+        </p:pic>
+        <p:sp>
+          <p:nvSpPr>
+            <p:cNvPr id="6" name="TextBox 5">
+              <a:extLst>
+                <a:ext uri="{FF2B5EF4-FFF2-40B4-BE49-F238E27FC236}">
+                  <a16:creationId xmlns:a16="http://schemas.microsoft.com/office/drawing/2014/main" id="{D59B2E28-23A7-7C2E-C3EF-B0F0626FEC1A}"/>
+                </a:ext>
+              </a:extLst>
+            </p:cNvPr>
+            <p:cNvSpPr txBox="1"/>
+            <p:nvPr/>
+          </p:nvSpPr>
+          <p:spPr>
+            <a:xfrm>
+              <a:off x="3505444" y="1192700"/>
+              <a:ext cx="3199915" cy="4247317"/>
+            </a:xfrm>
+            <a:prstGeom prst="rect">
+              <a:avLst/>
+            </a:prstGeom>
+            <a:noFill/>
+          </p:spPr>
+          <p:txBody>
+            <a:bodyPr wrap="none" rtlCol="0">
+              <a:spAutoFit/>
+            </a:bodyPr>
+            <a:lstStyle/>
+            <a:p>
+              <a:pPr algn="ctr"/>
+              <a:r>
+                <a:rPr lang="en-US" altLang="ko-KR" sz="27000" dirty="0">
+                  <a:solidFill>
+                    <a:srgbClr val="FD0000"/>
+                  </a:solidFill>
+                  <a:latin typeface="Yoon® 만세" panose="02020603020101020101" pitchFamily="18" charset="-127"/>
+                  <a:ea typeface="Yoon® 만세" panose="02020603020101020101" pitchFamily="18" charset="-127"/>
+                </a:rPr>
+                <a:t>D</a:t>
+              </a:r>
+              <a:r>
+                <a:rPr lang="en-US" altLang="ko-KR" sz="27000" baseline="30000" dirty="0">
+                  <a:solidFill>
+                    <a:srgbClr val="FD0000"/>
+                  </a:solidFill>
+                  <a:latin typeface="Yoon® 만세" panose="02020603020101020101" pitchFamily="18" charset="-127"/>
+                  <a:ea typeface="Yoon® 만세" panose="02020603020101020101" pitchFamily="18" charset="-127"/>
+                </a:rPr>
+                <a:t>-</a:t>
+              </a:r>
+              <a:endParaRPr lang="ko-KR" altLang="en-US" sz="27000" baseline="30000" dirty="0">
+                <a:solidFill>
+                  <a:srgbClr val="FD0000"/>
+                </a:solidFill>
+                <a:latin typeface="Yoon® 만세" panose="02020603020101020101" pitchFamily="18" charset="-127"/>
+                <a:ea typeface="Yoon® 만세" panose="02020603020101020101" pitchFamily="18" charset="-127"/>
+              </a:endParaRPr>
+            </a:p>
+          </p:txBody>
+        </p:sp>
+      </p:grpSp>
+      <p:grpSp>
+        <p:nvGrpSpPr>
+          <p:cNvPr id="7" name="그룹 6">
+            <a:extLst>
+              <a:ext uri="{FF2B5EF4-FFF2-40B4-BE49-F238E27FC236}">
+                <a16:creationId xmlns:a16="http://schemas.microsoft.com/office/drawing/2014/main" id="{5E1D0F6E-57A8-F28B-5956-26B86EF7AAA3}"/>
+              </a:ext>
+            </a:extLst>
+          </p:cNvPr>
+          <p:cNvGrpSpPr/>
+          <p:nvPr/>
+        </p:nvGrpSpPr>
+        <p:grpSpPr>
+          <a:xfrm>
+            <a:off x="3534073" y="874864"/>
+            <a:ext cx="4817166" cy="4472608"/>
+            <a:chOff x="2696818" y="967409"/>
+            <a:chExt cx="4817166" cy="4472608"/>
+          </a:xfrm>
+        </p:grpSpPr>
+        <p:pic>
+          <p:nvPicPr>
+            <p:cNvPr id="8" name="그림 7" descr="그래픽, 상징, 폰트, 로고이(가) 표시된 사진&#10;&#10;AI가 생성한 콘텐츠는 부정확할 수 있습니다.">
+              <a:extLst>
+                <a:ext uri="{FF2B5EF4-FFF2-40B4-BE49-F238E27FC236}">
+                  <a16:creationId xmlns:a16="http://schemas.microsoft.com/office/drawing/2014/main" id="{5F9E1C58-A0A7-F9B5-3EE7-B0036DAB2113}"/>
+                </a:ext>
+              </a:extLst>
+            </p:cNvPr>
+            <p:cNvPicPr>
+              <a:picLocks noChangeAspect="1"/>
+            </p:cNvPicPr>
+            <p:nvPr/>
+          </p:nvPicPr>
+          <p:blipFill>
+            <a:blip r:embed="rId2">
+              <a:extLst>
+                <a:ext uri="{BEBA8EAE-BF5A-486C-A8C5-ECC9F3942E4B}">
+                  <a14:imgProps xmlns:a14="http://schemas.microsoft.com/office/drawing/2010/main">
+                    <a14:imgLayer r:embed="rId3">
+                      <a14:imgEffect>
+                        <a14:backgroundRemoval t="10000" b="90000" l="10000" r="90000"/>
+                      </a14:imgEffect>
+                    </a14:imgLayer>
+                  </a14:imgProps>
+                </a:ext>
+                <a:ext uri="{28A0092B-C50C-407E-A947-70E740481C1C}">
+                  <a14:useLocalDpi xmlns:a14="http://schemas.microsoft.com/office/drawing/2010/main" val="0"/>
+                </a:ext>
+              </a:extLst>
+            </a:blip>
+            <a:srcRect l="14831" t="17391" r="14927" b="17391"/>
+            <a:stretch/>
+          </p:blipFill>
+          <p:spPr>
+            <a:xfrm>
+              <a:off x="2696818" y="967409"/>
+              <a:ext cx="4817166" cy="4472608"/>
+            </a:xfrm>
+            <a:prstGeom prst="rect">
+              <a:avLst/>
+            </a:prstGeom>
+          </p:spPr>
+        </p:pic>
+        <p:sp>
+          <p:nvSpPr>
+            <p:cNvPr id="9" name="TextBox 8">
+              <a:extLst>
+                <a:ext uri="{FF2B5EF4-FFF2-40B4-BE49-F238E27FC236}">
+                  <a16:creationId xmlns:a16="http://schemas.microsoft.com/office/drawing/2014/main" id="{D781C017-02A0-C895-D9EA-5E10F0CA1EB0}"/>
+                </a:ext>
+              </a:extLst>
+            </p:cNvPr>
+            <p:cNvSpPr txBox="1"/>
+            <p:nvPr/>
+          </p:nvSpPr>
+          <p:spPr>
+            <a:xfrm>
+              <a:off x="3481399" y="1192700"/>
+              <a:ext cx="3248005" cy="4247317"/>
+            </a:xfrm>
+            <a:prstGeom prst="rect">
+              <a:avLst/>
+            </a:prstGeom>
+            <a:noFill/>
+          </p:spPr>
+          <p:txBody>
+            <a:bodyPr wrap="none" rtlCol="0">
+              <a:spAutoFit/>
+            </a:bodyPr>
+            <a:lstStyle/>
+            <a:p>
+              <a:pPr algn="ctr"/>
+              <a:r>
+                <a:rPr lang="en-US" altLang="ko-KR" sz="27000" dirty="0">
+                  <a:solidFill>
+                    <a:srgbClr val="FD0000"/>
+                  </a:solidFill>
+                  <a:latin typeface="Yoon® 만세" panose="02020603020101020101" pitchFamily="18" charset="-127"/>
+                  <a:ea typeface="Yoon® 만세" panose="02020603020101020101" pitchFamily="18" charset="-127"/>
+                </a:rPr>
+                <a:t>D</a:t>
+              </a:r>
+              <a:r>
+                <a:rPr lang="en-US" altLang="ko-KR" sz="27000" baseline="30000" dirty="0">
+                  <a:solidFill>
+                    <a:srgbClr val="FD0000"/>
+                  </a:solidFill>
+                  <a:latin typeface="Yoon® 만세" panose="02020603020101020101" pitchFamily="18" charset="-127"/>
+                  <a:ea typeface="Yoon® 만세" panose="02020603020101020101" pitchFamily="18" charset="-127"/>
+                </a:rPr>
+                <a:t>+</a:t>
+              </a:r>
+              <a:endParaRPr lang="ko-KR" altLang="en-US" sz="27000" baseline="30000" dirty="0">
+                <a:solidFill>
+                  <a:srgbClr val="FD0000"/>
+                </a:solidFill>
+                <a:latin typeface="Yoon® 만세" panose="02020603020101020101" pitchFamily="18" charset="-127"/>
+                <a:ea typeface="Yoon® 만세" panose="02020603020101020101" pitchFamily="18" charset="-127"/>
+              </a:endParaRPr>
+            </a:p>
+          </p:txBody>
+        </p:sp>
+      </p:grpSp>
+      <p:grpSp>
+        <p:nvGrpSpPr>
+          <p:cNvPr id="10" name="그룹 9">
+            <a:extLst>
+              <a:ext uri="{FF2B5EF4-FFF2-40B4-BE49-F238E27FC236}">
+                <a16:creationId xmlns:a16="http://schemas.microsoft.com/office/drawing/2014/main" id="{4CCC7F99-FEA0-312C-5258-97A7A1484FD8}"/>
+              </a:ext>
+            </a:extLst>
+          </p:cNvPr>
+          <p:cNvGrpSpPr/>
+          <p:nvPr/>
+        </p:nvGrpSpPr>
+        <p:grpSpPr>
+          <a:xfrm>
+            <a:off x="7112185" y="1661160"/>
+            <a:ext cx="4817166" cy="4472608"/>
+            <a:chOff x="2696818" y="967409"/>
+            <a:chExt cx="4817166" cy="4472608"/>
+          </a:xfrm>
+        </p:grpSpPr>
+        <p:pic>
+          <p:nvPicPr>
+            <p:cNvPr id="11" name="그림 10" descr="그래픽, 상징, 폰트, 로고이(가) 표시된 사진&#10;&#10;AI가 생성한 콘텐츠는 부정확할 수 있습니다.">
+              <a:extLst>
+                <a:ext uri="{FF2B5EF4-FFF2-40B4-BE49-F238E27FC236}">
+                  <a16:creationId xmlns:a16="http://schemas.microsoft.com/office/drawing/2014/main" id="{068523AF-32A6-928D-D8E8-8F80C6CBB368}"/>
+                </a:ext>
+              </a:extLst>
+            </p:cNvPr>
+            <p:cNvPicPr>
+              <a:picLocks noChangeAspect="1"/>
+            </p:cNvPicPr>
+            <p:nvPr/>
+          </p:nvPicPr>
+          <p:blipFill>
+            <a:blip r:embed="rId2">
+              <a:extLst>
+                <a:ext uri="{BEBA8EAE-BF5A-486C-A8C5-ECC9F3942E4B}">
+                  <a14:imgProps xmlns:a14="http://schemas.microsoft.com/office/drawing/2010/main">
+                    <a14:imgLayer r:embed="rId3">
+                      <a14:imgEffect>
+                        <a14:backgroundRemoval t="10000" b="90000" l="10000" r="90000"/>
+                      </a14:imgEffect>
+                    </a14:imgLayer>
+                  </a14:imgProps>
+                </a:ext>
+                <a:ext uri="{28A0092B-C50C-407E-A947-70E740481C1C}">
+                  <a14:useLocalDpi xmlns:a14="http://schemas.microsoft.com/office/drawing/2010/main" val="0"/>
+                </a:ext>
+              </a:extLst>
+            </a:blip>
+            <a:srcRect l="14831" t="17391" r="14927" b="17391"/>
+            <a:stretch/>
+          </p:blipFill>
+          <p:spPr>
+            <a:xfrm>
+              <a:off x="2696818" y="967409"/>
+              <a:ext cx="4817166" cy="4472608"/>
+            </a:xfrm>
+            <a:prstGeom prst="rect">
+              <a:avLst/>
+            </a:prstGeom>
+          </p:spPr>
+        </p:pic>
+        <p:sp>
+          <p:nvSpPr>
+            <p:cNvPr id="12" name="TextBox 11">
+              <a:extLst>
+                <a:ext uri="{FF2B5EF4-FFF2-40B4-BE49-F238E27FC236}">
+                  <a16:creationId xmlns:a16="http://schemas.microsoft.com/office/drawing/2014/main" id="{35797E0B-6262-D079-3DC7-4C472DC2F743}"/>
+                </a:ext>
+              </a:extLst>
+            </p:cNvPr>
+            <p:cNvSpPr txBox="1"/>
+            <p:nvPr/>
+          </p:nvSpPr>
+          <p:spPr>
+            <a:xfrm>
+              <a:off x="3332320" y="1192700"/>
+              <a:ext cx="3546164" cy="4247317"/>
+            </a:xfrm>
+            <a:prstGeom prst="rect">
+              <a:avLst/>
+            </a:prstGeom>
+            <a:noFill/>
+          </p:spPr>
+          <p:txBody>
+            <a:bodyPr wrap="none" rtlCol="0">
+              <a:spAutoFit/>
+            </a:bodyPr>
+            <a:lstStyle/>
+            <a:p>
+              <a:pPr algn="ctr"/>
+              <a:r>
+                <a:rPr lang="en-US" altLang="ko-KR" sz="27000" dirty="0">
+                  <a:solidFill>
+                    <a:srgbClr val="FD0000"/>
+                  </a:solidFill>
+                  <a:latin typeface="Yoon® 만세" panose="02020603020101020101" pitchFamily="18" charset="-127"/>
+                  <a:ea typeface="Yoon® 만세" panose="02020603020101020101" pitchFamily="18" charset="-127"/>
+                </a:rPr>
+                <a:t>D0</a:t>
+              </a:r>
+              <a:endParaRPr lang="ko-KR" altLang="en-US" sz="27000" baseline="30000" dirty="0">
+                <a:solidFill>
+                  <a:srgbClr val="FD0000"/>
+                </a:solidFill>
+                <a:latin typeface="Yoon® 만세" panose="02020603020101020101" pitchFamily="18" charset="-127"/>
+                <a:ea typeface="Yoon® 만세" panose="02020603020101020101" pitchFamily="18" charset="-127"/>
+              </a:endParaRPr>
+            </a:p>
+          </p:txBody>
+        </p:sp>
+      </p:grpSp>
+      <p:grpSp>
+        <p:nvGrpSpPr>
+          <p:cNvPr id="2" name="그룹 1">
+            <a:extLst>
+              <a:ext uri="{FF2B5EF4-FFF2-40B4-BE49-F238E27FC236}">
+                <a16:creationId xmlns:a16="http://schemas.microsoft.com/office/drawing/2014/main" id="{EBE16179-7A66-4F08-4A76-30C01DE27CAA}"/>
+              </a:ext>
+            </a:extLst>
+          </p:cNvPr>
+          <p:cNvGrpSpPr/>
+          <p:nvPr/>
+        </p:nvGrpSpPr>
+        <p:grpSpPr>
+          <a:xfrm>
+            <a:off x="8202161" y="364656"/>
+            <a:ext cx="4817166" cy="4472608"/>
+            <a:chOff x="2696818" y="967409"/>
+            <a:chExt cx="4817166" cy="4472608"/>
+          </a:xfrm>
+        </p:grpSpPr>
+        <p:pic>
+          <p:nvPicPr>
+            <p:cNvPr id="3" name="그림 2" descr="그래픽, 상징, 폰트, 로고이(가) 표시된 사진&#10;&#10;AI가 생성한 콘텐츠는 부정확할 수 있습니다.">
+              <a:extLst>
+                <a:ext uri="{FF2B5EF4-FFF2-40B4-BE49-F238E27FC236}">
+                  <a16:creationId xmlns:a16="http://schemas.microsoft.com/office/drawing/2014/main" id="{90541B9F-76B2-FFCB-8024-CA2B38014434}"/>
+                </a:ext>
+              </a:extLst>
+            </p:cNvPr>
+            <p:cNvPicPr>
+              <a:picLocks noChangeAspect="1"/>
+            </p:cNvPicPr>
+            <p:nvPr/>
+          </p:nvPicPr>
+          <p:blipFill>
+            <a:blip r:embed="rId2">
+              <a:extLst>
+                <a:ext uri="{BEBA8EAE-BF5A-486C-A8C5-ECC9F3942E4B}">
+                  <a14:imgProps xmlns:a14="http://schemas.microsoft.com/office/drawing/2010/main">
+                    <a14:imgLayer r:embed="rId3">
+                      <a14:imgEffect>
+                        <a14:backgroundRemoval t="10000" b="90000" l="10000" r="90000"/>
+                      </a14:imgEffect>
+                    </a14:imgLayer>
+                  </a14:imgProps>
+                </a:ext>
+                <a:ext uri="{28A0092B-C50C-407E-A947-70E740481C1C}">
+                  <a14:useLocalDpi xmlns:a14="http://schemas.microsoft.com/office/drawing/2010/main" val="0"/>
+                </a:ext>
+              </a:extLst>
+            </a:blip>
+            <a:srcRect l="14831" t="17391" r="14927" b="17391"/>
+            <a:stretch/>
+          </p:blipFill>
+          <p:spPr>
+            <a:xfrm>
+              <a:off x="2696818" y="967409"/>
+              <a:ext cx="4817166" cy="4472608"/>
+            </a:xfrm>
+            <a:prstGeom prst="rect">
+              <a:avLst/>
+            </a:prstGeom>
+          </p:spPr>
+        </p:pic>
+        <p:sp>
+          <p:nvSpPr>
+            <p:cNvPr id="13" name="TextBox 12">
+              <a:extLst>
+                <a:ext uri="{FF2B5EF4-FFF2-40B4-BE49-F238E27FC236}">
+                  <a16:creationId xmlns:a16="http://schemas.microsoft.com/office/drawing/2014/main" id="{4B3FE639-4B10-3D0B-7B88-3D332CF7E520}"/>
+                </a:ext>
+              </a:extLst>
+            </p:cNvPr>
+            <p:cNvSpPr txBox="1"/>
+            <p:nvPr/>
+          </p:nvSpPr>
+          <p:spPr>
+            <a:xfrm>
+              <a:off x="4183515" y="1192700"/>
+              <a:ext cx="1843774" cy="4247317"/>
+            </a:xfrm>
+            <a:prstGeom prst="rect">
+              <a:avLst/>
+            </a:prstGeom>
+            <a:noFill/>
+          </p:spPr>
+          <p:txBody>
+            <a:bodyPr wrap="none" rtlCol="0">
+              <a:spAutoFit/>
+            </a:bodyPr>
+            <a:lstStyle/>
+            <a:p>
+              <a:pPr algn="ctr"/>
+              <a:r>
+                <a:rPr lang="en-US" altLang="ko-KR" sz="27000" dirty="0">
+                  <a:solidFill>
+                    <a:srgbClr val="FD0000"/>
+                  </a:solidFill>
+                  <a:latin typeface="Yoon® 만세" panose="02020603020101020101" pitchFamily="18" charset="-127"/>
+                  <a:ea typeface="Yoon® 만세" panose="02020603020101020101" pitchFamily="18" charset="-127"/>
+                </a:rPr>
+                <a:t>F</a:t>
+              </a:r>
+              <a:endParaRPr lang="ko-KR" altLang="en-US" sz="27000" baseline="30000" dirty="0">
+                <a:solidFill>
+                  <a:srgbClr val="FD0000"/>
+                </a:solidFill>
+                <a:latin typeface="Yoon® 만세" panose="02020603020101020101" pitchFamily="18" charset="-127"/>
+                <a:ea typeface="Yoon® 만세" panose="02020603020101020101" pitchFamily="18" charset="-127"/>
+              </a:endParaRPr>
+            </a:p>
+          </p:txBody>
+        </p:sp>
+      </p:grpSp>
+    </p:spTree>
+    <p:extLst>
+      <p:ext uri="{BB962C8B-B14F-4D97-AF65-F5344CB8AC3E}">
+        <p14:creationId xmlns:p14="http://schemas.microsoft.com/office/powerpoint/2010/main" val="2583220825"/>
+      </p:ext>
+    </p:extLst>
+  </p:cSld>
+  <p:clrMapOvr>
+    <a:masterClrMapping/>
+  </p:clrMapOvr>
+</p:sld>
+</file>
+
 <file path=ppt/theme/theme1.xml><?xml version="1.0" encoding="utf-8"?>
 <a:theme xmlns:a="http://schemas.openxmlformats.org/drawingml/2006/main" name="Office 테마">
   <a:themeElements>

</xml_diff>